<commit_message>
More SDR2 updates, minor.
git-svn-id: https://aeon.stsci.edu/ssb/svn/crds/trunk@757 0d8f46c8-9b30-49d0-b470-0f6283dc92e8
</commit_message>
<xml_diff>
--- a/docs/DMS_SDR2_09_CRDS_final.pptx
+++ b/docs/DMS_SDR2_09_CRDS_final.pptx
@@ -3333,26 +3333,31 @@
               <a:rPr lang="en-US" sz="1600" dirty="0" err="1" smtClean="0"/>
               <a:t>SelectVersion</a:t>
             </a:r>
-            <a:r>
-              <a:rPr lang="en-US" sz="1600" dirty="0" smtClean="0"/>
-              <a:t>, </a:t>
-            </a:r>
+            <a:endParaRPr lang="en-US" sz="1600" dirty="0"/>
+          </a:p>
+          <a:p>
+            <a:pPr lvl="1"/>
             <a:r>
               <a:rPr lang="en-US" sz="1600" dirty="0" err="1" smtClean="0"/>
               <a:t>ClosestTime</a:t>
             </a:r>
-            <a:r>
-              <a:rPr lang="en-US" sz="1600" dirty="0" smtClean="0"/>
-              <a:t>, </a:t>
-            </a:r>
+            <a:endParaRPr lang="en-US" sz="1600" dirty="0"/>
+          </a:p>
+          <a:p>
+            <a:pPr lvl="1"/>
             <a:r>
               <a:rPr lang="en-US" sz="1600" dirty="0" err="1" smtClean="0"/>
               <a:t>GeometricallyNearest</a:t>
             </a:r>
+            <a:endParaRPr lang="en-US" sz="1600" dirty="0"/>
+          </a:p>
+          <a:p>
+            <a:pPr lvl="1"/>
             <a:r>
               <a:rPr lang="en-US" sz="1600" dirty="0" smtClean="0"/>
-              <a:t>, Bracket</a:t>
-            </a:r>
+              <a:t>Bracket</a:t>
+            </a:r>
+            <a:endParaRPr lang="en-US" sz="1600" dirty="0" smtClean="0"/>
           </a:p>
           <a:p>
             <a:pPr marL="0" indent="0">
@@ -4276,7 +4281,7 @@
         </p:nvSpPr>
         <p:spPr>
           <a:xfrm rot="19709275">
-            <a:off x="5212645" y="1144539"/>
+            <a:off x="5593644" y="1754139"/>
             <a:ext cx="3121367" cy="707886"/>
           </a:xfrm>
           <a:prstGeom prst="rect">
@@ -4377,8 +4382,8 @@
         </p:nvCxnSpPr>
         <p:spPr bwMode="auto">
           <a:xfrm rot="10800000" flipV="1">
-            <a:off x="2133600" y="1676400"/>
-            <a:ext cx="4114800" cy="1447802"/>
+            <a:off x="2133600" y="1981200"/>
+            <a:ext cx="4724400" cy="1143002"/>
           </a:xfrm>
           <a:prstGeom prst="curvedConnector3">
             <a:avLst>
@@ -4408,7 +4413,7 @@
         </p:nvSpPr>
         <p:spPr>
           <a:xfrm rot="19709275">
-            <a:off x="6063374" y="3292178"/>
+            <a:off x="6139574" y="3901778"/>
             <a:ext cx="1699842" cy="646331"/>
           </a:xfrm>
           <a:prstGeom prst="rect">
@@ -4525,13 +4530,15 @@
       <p:cxnSp>
         <p:nvCxnSpPr>
           <p:cNvPr id="12" name="Curved Connector 11"/>
-          <p:cNvCxnSpPr/>
+          <p:cNvCxnSpPr>
+            <a:stCxn id="11" idx="0"/>
+          </p:cNvCxnSpPr>
           <p:nvPr/>
         </p:nvCxnSpPr>
         <p:spPr bwMode="auto">
           <a:xfrm rot="16200000" flipV="1">
-            <a:off x="5147975" y="2014824"/>
-            <a:ext cx="129052" cy="2652603"/>
+            <a:off x="5016975" y="2145826"/>
+            <a:ext cx="672835" cy="2934383"/>
           </a:xfrm>
           <a:prstGeom prst="curvedConnector2">
             <a:avLst/>
@@ -5602,8 +5609,8 @@
         </p:nvSpPr>
         <p:spPr>
           <a:xfrm>
-            <a:off x="152400" y="914400"/>
-            <a:ext cx="8610600" cy="5029200"/>
+            <a:off x="762000" y="914400"/>
+            <a:ext cx="7391400" cy="5029200"/>
           </a:xfrm>
         </p:spPr>
         <p:txBody>
@@ -6161,7 +6168,7 @@
         </p:nvSpPr>
         <p:spPr>
           <a:xfrm>
-            <a:off x="1066800" y="1143000"/>
+            <a:off x="1066800" y="990600"/>
             <a:ext cx="7162800" cy="5410200"/>
           </a:xfrm>
         </p:spPr>
@@ -6506,7 +6513,7 @@
         </p:nvSpPr>
         <p:spPr>
           <a:xfrm rot="19709275">
-            <a:off x="5969223" y="1920457"/>
+            <a:off x="5981571" y="2904662"/>
             <a:ext cx="2705939" cy="1200328"/>
           </a:xfrm>
           <a:prstGeom prst="rect">
@@ -6629,15 +6636,13 @@
       <p:cxnSp>
         <p:nvCxnSpPr>
           <p:cNvPr id="6" name="Curved Connector 5"/>
-          <p:cNvCxnSpPr>
-            <a:stCxn id="5" idx="1"/>
-          </p:cNvCxnSpPr>
+          <p:cNvCxnSpPr/>
           <p:nvPr/>
         </p:nvCxnSpPr>
         <p:spPr bwMode="auto">
           <a:xfrm rot="10800000">
-            <a:off x="3886213" y="2590819"/>
-            <a:ext cx="2282533" cy="636971"/>
+            <a:off x="4876800" y="2286000"/>
+            <a:ext cx="2206334" cy="865572"/>
           </a:xfrm>
           <a:prstGeom prst="curvedConnector3">
             <a:avLst>
@@ -6668,7 +6673,7 @@
         <p:spPr>
           <a:xfrm>
             <a:off x="1752600" y="5410200"/>
-            <a:ext cx="6019800" cy="1171732"/>
+            <a:ext cx="6019800" cy="1017844"/>
           </a:xfrm>
           <a:prstGeom prst="rect">
             <a:avLst/>
@@ -6685,7 +6690,7 @@
               <a:buChar char="•"/>
             </a:pPr>
             <a:r>
-              <a:rPr lang="en-US" sz="1400" b="1" dirty="0" smtClean="0">
+              <a:rPr lang="en-US" sz="1200" b="1" dirty="0" smtClean="0">
                 <a:solidFill>
                   <a:srgbClr val="3366FF"/>
                 </a:solidFill>
@@ -6700,7 +6705,7 @@
               <a:buChar char="•"/>
             </a:pPr>
             <a:r>
-              <a:rPr lang="en-US" sz="1400" b="1" dirty="0" smtClean="0">
+              <a:rPr lang="en-US" sz="1200" b="1" dirty="0" smtClean="0">
                 <a:solidFill>
                   <a:schemeClr val="tx1"/>
                 </a:solidFill>
@@ -6715,7 +6720,7 @@
               <a:buChar char="•"/>
             </a:pPr>
             <a:r>
-              <a:rPr lang="en-US" sz="1400" b="1" dirty="0" smtClean="0">
+              <a:rPr lang="en-US" sz="1200" b="1" dirty="0" smtClean="0">
                 <a:solidFill>
                   <a:schemeClr val="tx1"/>
                 </a:solidFill>
@@ -6730,7 +6735,7 @@
               <a:buChar char="•"/>
             </a:pPr>
             <a:r>
-              <a:rPr lang="en-US" sz="1400" b="1" dirty="0" smtClean="0">
+              <a:rPr lang="en-US" sz="1200" b="1" dirty="0" smtClean="0">
                 <a:solidFill>
                   <a:schemeClr val="tx1"/>
                 </a:solidFill>
@@ -6745,7 +6750,7 @@
               <a:buChar char="•"/>
             </a:pPr>
             <a:r>
-              <a:rPr lang="en-US" sz="1400" b="1" dirty="0" smtClean="0">
+              <a:rPr lang="en-US" sz="1200" b="1" dirty="0" smtClean="0">
                 <a:solidFill>
                   <a:schemeClr val="tx1"/>
                 </a:solidFill>
@@ -6887,7 +6892,12 @@
             <p:ph type="title"/>
           </p:nvPr>
         </p:nvSpPr>
-        <p:spPr/>
+        <p:spPr>
+          <a:xfrm>
+            <a:off x="914400" y="228600"/>
+            <a:ext cx="6934200" cy="406400"/>
+          </a:xfrm>
+        </p:spPr>
         <p:txBody>
           <a:bodyPr/>
           <a:lstStyle/>
@@ -6915,27 +6925,11 @@
             </a:r>
             <a:r>
               <a:rPr lang="en-US" dirty="0" smtClean="0"/>
-              <a:t> Relevance</a:t>
-            </a:r>
-            <a:r>
-              <a:rPr lang="en-US" sz="2800" b="1" i="0" u="none" strike="noStrike" kern="1200" dirty="0" smtClean="0">
-                <a:solidFill>
-                  <a:srgbClr val="000000"/>
-                </a:solidFill>
-                <a:effectLst/>
-                <a:latin typeface="+mj-lt"/>
-              </a:rPr>
-              <a:t>B4</a:t>
-            </a:r>
-            <a:r>
-              <a:rPr lang="en-US" sz="2800" b="1" i="0" u="none" strike="noStrike" kern="1200" baseline="0" dirty="0" smtClean="0">
-                <a:solidFill>
-                  <a:srgbClr val="000000"/>
-                </a:solidFill>
-                <a:effectLst/>
-                <a:latin typeface="+mj-lt"/>
-              </a:rPr>
-              <a:t>   april-2013</a:t>
+              <a:t> </a:t>
+            </a:r>
+            <a:r>
+              <a:rPr lang="en-US" dirty="0" smtClean="0"/>
+              <a:t>Relevance</a:t>
             </a:r>
             <a:endParaRPr lang="en-US" sz="2800" b="0" i="0" u="none" strike="noStrike" dirty="0" smtClean="0">
               <a:effectLst/>
@@ -7613,7 +7607,7 @@
         <p:spPr bwMode="auto">
           <a:xfrm rot="10800000">
             <a:off x="3810000" y="2438400"/>
-            <a:ext cx="1752600" cy="1066798"/>
+            <a:ext cx="2209800" cy="685800"/>
           </a:xfrm>
           <a:prstGeom prst="curvedConnector3">
             <a:avLst>
@@ -7643,8 +7637,8 @@
         </p:nvSpPr>
         <p:spPr>
           <a:xfrm>
-            <a:off x="1066800" y="5334000"/>
-            <a:ext cx="6858000" cy="1171732"/>
+            <a:off x="1066800" y="5410200"/>
+            <a:ext cx="6858000" cy="833178"/>
           </a:xfrm>
           <a:prstGeom prst="rect">
             <a:avLst/>
@@ -7661,7 +7655,7 @@
               <a:buChar char="•"/>
             </a:pPr>
             <a:r>
-              <a:rPr lang="en-US" sz="1400" b="1" dirty="0" smtClean="0">
+              <a:rPr lang="en-US" sz="1200" b="1" dirty="0" smtClean="0">
                 <a:solidFill>
                   <a:schemeClr val="tx1"/>
                 </a:solidFill>
@@ -7676,33 +7670,27 @@
               <a:buChar char="•"/>
             </a:pPr>
             <a:r>
-              <a:rPr lang="en-US" sz="1400" b="1" dirty="0" smtClean="0">
-                <a:solidFill>
-                  <a:schemeClr val="tx1"/>
+              <a:rPr lang="en-US" sz="1200" b="1" dirty="0" smtClean="0">
+                <a:solidFill>
+                  <a:srgbClr val="3366FF"/>
                 </a:solidFill>
                 <a:latin typeface="Helvetica"/>
                 <a:sym typeface="Wingdings"/>
               </a:rPr>
-              <a:t>If DETECTOR != “CCD” then  CCDAMP := N/A</a:t>
-            </a:r>
-          </a:p>
-          <a:p>
-            <a:pPr marL="171450" indent="-171450">
-              <a:buFont typeface="Arial"/>
-              <a:buChar char="•"/>
-            </a:pPr>
-            <a:r>
-              <a:rPr lang="en-US" sz="1400" b="1" dirty="0" smtClean="0">
+              <a:t>Prevents </a:t>
+            </a:r>
+            <a:r>
+              <a:rPr lang="en-US" sz="1200" b="1" dirty="0" smtClean="0">
                 <a:solidFill>
                   <a:srgbClr val="3366FF"/>
                 </a:solidFill>
                 <a:latin typeface="Helvetica"/>
                 <a:sym typeface="Wingdings"/>
               </a:rPr>
-              <a:t>Prevents irrelevant parameter values from affecting matching</a:t>
-            </a:r>
-            <a:r>
-              <a:rPr lang="en-US" sz="1400" b="1" dirty="0" smtClean="0">
+              <a:t>irrelevant parameter values from affecting matching</a:t>
+            </a:r>
+            <a:r>
+              <a:rPr lang="en-US" sz="1200" b="1" dirty="0" smtClean="0">
                 <a:solidFill>
                   <a:schemeClr val="tx1"/>
                 </a:solidFill>
@@ -7711,7 +7699,7 @@
               </a:rPr>
               <a:t>:</a:t>
             </a:r>
-            <a:endParaRPr lang="en-US" sz="1400" b="1" dirty="0">
+            <a:endParaRPr lang="en-US" sz="1200" b="1" dirty="0">
               <a:solidFill>
                 <a:schemeClr val="tx1"/>
               </a:solidFill>
@@ -7725,7 +7713,7 @@
               <a:buChar char="•"/>
             </a:pPr>
             <a:r>
-              <a:rPr lang="en-US" sz="1400" b="1" dirty="0" smtClean="0">
+              <a:rPr lang="en-US" sz="1200" b="1" dirty="0" smtClean="0">
                 <a:solidFill>
                   <a:schemeClr val="tx1"/>
                 </a:solidFill>
@@ -7741,7 +7729,7 @@
               <a:buChar char="•"/>
             </a:pPr>
             <a:r>
-              <a:rPr lang="en-US" sz="1400" b="1" dirty="0" smtClean="0">
+              <a:rPr lang="en-US" sz="1200" b="1" dirty="0" smtClean="0">
                 <a:solidFill>
                   <a:schemeClr val="tx1"/>
                 </a:solidFill>
@@ -13999,13 +13987,10 @@
           </a:p>
           <a:p>
             <a:r>
-              <a:rPr lang="en-US" dirty="0"/>
-              <a:t>Currently finishing </a:t>
-            </a:r>
-            <a:r>
               <a:rPr lang="en-US" dirty="0" smtClean="0"/>
-              <a:t>HST prototype</a:t>
-            </a:r>
+              <a:t>Prototyped for HST build-2</a:t>
+            </a:r>
+            <a:endParaRPr lang="en-US" dirty="0" smtClean="0"/>
           </a:p>
           <a:p>
             <a:r>
@@ -14374,7 +14359,7 @@
         <p:spPr>
           <a:xfrm>
             <a:off x="5410200" y="4572000"/>
-            <a:ext cx="3733800" cy="1202510"/>
+            <a:ext cx="3733800" cy="1110177"/>
           </a:xfrm>
           <a:prstGeom prst="rect">
             <a:avLst/>
@@ -14391,7 +14376,7 @@
               <a:buChar char="•"/>
             </a:pPr>
             <a:r>
-              <a:rPr lang="en-US" sz="1200" b="1" dirty="0" smtClean="0">
+              <a:rPr lang="en-US" sz="1100" b="1" dirty="0" smtClean="0">
                 <a:solidFill>
                   <a:schemeClr val="tx1"/>
                 </a:solidFill>
@@ -14406,7 +14391,7 @@
               <a:buChar char="•"/>
             </a:pPr>
             <a:r>
-              <a:rPr lang="en-US" sz="1200" b="1" dirty="0" smtClean="0">
+              <a:rPr lang="en-US" sz="1100" b="1" dirty="0" smtClean="0">
                 <a:solidFill>
                   <a:schemeClr val="tx1"/>
                 </a:solidFill>
@@ -14421,7 +14406,7 @@
               <a:buChar char="•"/>
             </a:pPr>
             <a:r>
-              <a:rPr lang="en-US" sz="1200" b="1" dirty="0" smtClean="0">
+              <a:rPr lang="en-US" sz="1100" b="1" dirty="0" smtClean="0">
                 <a:solidFill>
                   <a:schemeClr val="tx1"/>
                 </a:solidFill>
@@ -14436,7 +14421,7 @@
               <a:buChar char="•"/>
             </a:pPr>
             <a:r>
-              <a:rPr lang="en-US" sz="1200" b="1" dirty="0" smtClean="0">
+              <a:rPr lang="en-US" sz="1100" b="1" dirty="0" smtClean="0">
                 <a:solidFill>
                   <a:schemeClr val="tx1"/>
                 </a:solidFill>
@@ -14451,7 +14436,7 @@
               <a:buChar char="•"/>
             </a:pPr>
             <a:r>
-              <a:rPr lang="en-US" sz="1200" b="1" dirty="0" smtClean="0">
+              <a:rPr lang="en-US" sz="1100" b="1" dirty="0" smtClean="0">
                 <a:solidFill>
                   <a:schemeClr val="tx1"/>
                 </a:solidFill>
@@ -14466,7 +14451,7 @@
               <a:buChar char="•"/>
             </a:pPr>
             <a:r>
-              <a:rPr lang="en-US" sz="1200" b="1" dirty="0" smtClean="0">
+              <a:rPr lang="en-US" sz="1100" b="1" dirty="0" smtClean="0">
                 <a:solidFill>
                   <a:schemeClr val="tx1"/>
                 </a:solidFill>
@@ -14973,7 +14958,7 @@
         </p:blipFill>
         <p:spPr>
           <a:xfrm>
-            <a:off x="457200" y="1066800"/>
+            <a:off x="457200" y="914400"/>
             <a:ext cx="8077200" cy="5504667"/>
           </a:xfrm>
           <a:prstGeom prst="rect">
@@ -17581,10 +17566,10 @@
               </a:tabLst>
             </a:pPr>
             <a:r>
-              <a:rPr lang="en-US" sz="1600" smtClean="0"/>
+              <a:rPr lang="en-US" sz="1600" dirty="0" smtClean="0"/>
               <a:t>WIT Utilities</a:t>
             </a:r>
-            <a:endParaRPr lang="en-US" sz="1400" smtClean="0"/>
+            <a:endParaRPr lang="en-US" sz="1400" dirty="0" smtClean="0"/>
           </a:p>
           <a:p>
             <a:pPr lvl="1" eaLnBrk="1" hangingPunct="1">
@@ -17622,13 +17607,18 @@
               </a:tabLst>
             </a:pPr>
             <a:r>
-              <a:rPr lang="en-US" sz="1600" smtClean="0">
+              <a:rPr lang="en-US" sz="1600" dirty="0" err="1" smtClean="0">
                 <a:solidFill>
                   <a:srgbClr val="3366FF"/>
                 </a:solidFill>
               </a:rPr>
               <a:t>crds.uses</a:t>
             </a:r>
+            <a:endParaRPr lang="en-US" sz="1600" dirty="0" smtClean="0">
+              <a:solidFill>
+                <a:srgbClr val="3366FF"/>
+              </a:solidFill>
+            </a:endParaRPr>
           </a:p>
           <a:p>
             <a:pPr lvl="2" eaLnBrk="1" hangingPunct="1">
@@ -17666,11 +17656,11 @@
               </a:tabLst>
             </a:pPr>
             <a:r>
-              <a:rPr lang="en-US" sz="1400" smtClean="0"/>
+              <a:rPr lang="en-US" sz="1400" dirty="0" smtClean="0"/>
               <a:t>Which </a:t>
             </a:r>
             <a:r>
-              <a:rPr lang="en-US" sz="1400" smtClean="0">
+              <a:rPr lang="en-US" sz="1400" dirty="0" smtClean="0">
                 <a:solidFill>
                   <a:srgbClr val="FF0909"/>
                 </a:solidFill>
@@ -17678,20 +17668,24 @@
               <a:t>data sets</a:t>
             </a:r>
             <a:r>
-              <a:rPr lang="en-US" sz="1400" smtClean="0"/>
+              <a:rPr lang="en-US" sz="1400" dirty="0" smtClean="0"/>
               <a:t> or </a:t>
             </a:r>
             <a:r>
-              <a:rPr lang="en-US" sz="1400" smtClean="0">
+              <a:rPr lang="en-US" sz="1400" dirty="0" smtClean="0">
                 <a:solidFill>
                   <a:srgbClr val="00FF00"/>
                 </a:solidFill>
               </a:rPr>
-              <a:t>rule</a:t>
-            </a:r>
-            <a:r>
-              <a:rPr lang="en-US" sz="1400" smtClean="0"/>
-              <a:t>use a given reference file</a:t>
+              <a:t>rules </a:t>
+            </a:r>
+            <a:r>
+              <a:rPr lang="en-US" sz="1400" dirty="0" smtClean="0"/>
+              <a:t>use </a:t>
+            </a:r>
+            <a:r>
+              <a:rPr lang="en-US" sz="1400" dirty="0" smtClean="0"/>
+              <a:t>a given reference file</a:t>
             </a:r>
           </a:p>
           <a:p>
@@ -17730,7 +17724,7 @@
               </a:tabLst>
             </a:pPr>
             <a:r>
-              <a:rPr lang="en-US" sz="1600" smtClean="0">
+              <a:rPr lang="en-US" sz="1600" dirty="0" smtClean="0">
                 <a:solidFill>
                   <a:srgbClr val="3366FF"/>
                 </a:solidFill>
@@ -17774,7 +17768,7 @@
               </a:tabLst>
             </a:pPr>
             <a:r>
-              <a:rPr lang="en-US" sz="1400" smtClean="0"/>
+              <a:rPr lang="en-US" sz="1400" dirty="0" smtClean="0"/>
               <a:t>Mark reference file as bad,   web function.</a:t>
             </a:r>
           </a:p>
@@ -17814,13 +17808,18 @@
               </a:tabLst>
             </a:pPr>
             <a:r>
-              <a:rPr lang="en-US" sz="1600" smtClean="0">
+              <a:rPr lang="en-US" sz="1600" dirty="0" err="1" smtClean="0">
                 <a:solidFill>
                   <a:srgbClr val="3366FF"/>
                 </a:solidFill>
               </a:rPr>
               <a:t>crds.matches</a:t>
             </a:r>
+            <a:endParaRPr lang="en-US" sz="1600" dirty="0" smtClean="0">
+              <a:solidFill>
+                <a:srgbClr val="3366FF"/>
+              </a:solidFill>
+            </a:endParaRPr>
           </a:p>
           <a:p>
             <a:pPr lvl="2" eaLnBrk="1" hangingPunct="1">
@@ -17858,7 +17857,7 @@
               </a:tabLst>
             </a:pPr>
             <a:r>
-              <a:rPr lang="en-US" sz="1400" smtClean="0"/>
+              <a:rPr lang="en-US" sz="1400" dirty="0" smtClean="0"/>
               <a:t>Show what selection criteria match a given reference file</a:t>
             </a:r>
           </a:p>
@@ -17898,7 +17897,7 @@
               </a:tabLst>
             </a:pPr>
             <a:r>
-              <a:rPr lang="en-US" sz="1600" smtClean="0"/>
+              <a:rPr lang="en-US" sz="1600" dirty="0" smtClean="0"/>
               <a:t>coverage</a:t>
             </a:r>
           </a:p>
@@ -17938,9 +17937,14 @@
               </a:tabLst>
             </a:pPr>
             <a:r>
-              <a:rPr lang="en-US" sz="1400" smtClean="0"/>
-              <a:t>Show if an rmap update doesn’t cover the same cases as the previous rmap, or changes the set of selection criteria.  Related to crds.diff</a:t>
-            </a:r>
+              <a:rPr lang="en-US" sz="1400" dirty="0" smtClean="0"/>
+              <a:t>Show if an rmap update doesn’t cover the same cases as the previous rmap, or changes the set of selection criteria.  Related to </a:t>
+            </a:r>
+            <a:r>
+              <a:rPr lang="en-US" sz="1400" dirty="0" err="1" smtClean="0"/>
+              <a:t>crds.diff</a:t>
+            </a:r>
+            <a:endParaRPr lang="en-US" sz="1400" dirty="0" smtClean="0"/>
           </a:p>
           <a:p>
             <a:pPr lvl="1" eaLnBrk="1" hangingPunct="1">
@@ -17978,9 +17982,10 @@
               </a:tabLst>
             </a:pPr>
             <a:r>
-              <a:rPr lang="en-US" sz="1600" smtClean="0"/>
+              <a:rPr lang="en-US" sz="1600" dirty="0" err="1" smtClean="0"/>
               <a:t>crds.info</a:t>
             </a:r>
+            <a:endParaRPr lang="en-US" sz="1600" dirty="0" smtClean="0"/>
           </a:p>
           <a:p>
             <a:pPr lvl="2" eaLnBrk="1" hangingPunct="1">
@@ -18018,10 +18023,10 @@
               </a:tabLst>
             </a:pPr>
             <a:r>
-              <a:rPr lang="en-US" sz="1400" smtClean="0"/>
+              <a:rPr lang="en-US" sz="1400" dirty="0" smtClean="0"/>
               <a:t>Show current operational configuration</a:t>
             </a:r>
-            <a:endParaRPr lang="en-US" smtClean="0"/>
+            <a:endParaRPr lang="en-US" dirty="0" smtClean="0"/>
           </a:p>
           <a:p>
             <a:pPr lvl="1" eaLnBrk="1" hangingPunct="1">
@@ -18059,13 +18064,18 @@
               </a:tabLst>
             </a:pPr>
             <a:r>
-              <a:rPr lang="en-US" sz="1600" smtClean="0">
+              <a:rPr lang="en-US" sz="1600" dirty="0" err="1" smtClean="0">
                 <a:solidFill>
                   <a:srgbClr val="3366FF"/>
                 </a:solidFill>
               </a:rPr>
               <a:t>crds.certify</a:t>
             </a:r>
+            <a:endParaRPr lang="en-US" sz="1600" dirty="0" smtClean="0">
+              <a:solidFill>
+                <a:srgbClr val="3366FF"/>
+              </a:solidFill>
+            </a:endParaRPr>
           </a:p>
           <a:p>
             <a:pPr lvl="2" eaLnBrk="1" hangingPunct="1">
@@ -18103,7 +18113,7 @@
               </a:tabLst>
             </a:pPr>
             <a:r>
-              <a:rPr lang="en-US" sz="1400" smtClean="0"/>
+              <a:rPr lang="en-US" sz="1400" dirty="0" smtClean="0"/>
               <a:t>More sophisticated reference file comparison tool</a:t>
             </a:r>
           </a:p>
@@ -18143,10 +18153,9 @@
               </a:tabLst>
             </a:pPr>
             <a:r>
-              <a:rPr lang="en-US" sz="1400" smtClean="0"/>
+              <a:rPr lang="en-US" sz="1400" dirty="0" smtClean="0"/>
               <a:t>E.g., capable of detecting insertions or deletions of rows in tables between two versions</a:t>
             </a:r>
-            <a:endParaRPr lang="en-US" sz="1400" dirty="0" smtClean="0"/>
           </a:p>
         </p:txBody>
       </p:sp>
@@ -19176,8 +19185,13 @@
             <a:pPr lvl="1"/>
             <a:r>
               <a:rPr lang="en-US" sz="1600" dirty="0" smtClean="0"/>
-              <a:t>Automatic Instrument, Pipeline Context Updates</a:t>
-            </a:r>
+              <a:t>Automatic Instrument, Pipeline Context </a:t>
+            </a:r>
+            <a:r>
+              <a:rPr lang="en-US" sz="1600" dirty="0" smtClean="0"/>
+              <a:t>Rules Updates</a:t>
+            </a:r>
+            <a:endParaRPr lang="en-US" sz="1600" dirty="0" smtClean="0"/>
           </a:p>
           <a:p>
             <a:pPr lvl="1"/>
@@ -19344,7 +19358,7 @@
         </p:nvSpPr>
         <p:spPr>
           <a:xfrm>
-            <a:off x="76200" y="1066800"/>
+            <a:off x="76200" y="914400"/>
             <a:ext cx="8839200" cy="5486400"/>
           </a:xfrm>
         </p:spPr>
@@ -19353,76 +19367,20 @@
           <a:lstStyle/>
           <a:p>
             <a:r>
-              <a:rPr lang="en-US" sz="1400" dirty="0" smtClean="0"/>
+              <a:rPr lang="en-US" sz="1600" dirty="0" smtClean="0"/>
               <a:t>Build-3  </a:t>
-            </a:r>
-            <a:r>
-              <a:rPr lang="en-US" sz="1200" dirty="0" smtClean="0"/>
-              <a:t>(</a:t>
-            </a:r>
-            <a:r>
-              <a:rPr lang="en-US" sz="1200" dirty="0" smtClean="0">
-                <a:solidFill>
-                  <a:srgbClr val="008000"/>
-                </a:solidFill>
-              </a:rPr>
-              <a:t>January 2013</a:t>
-            </a:r>
-            <a:r>
-              <a:rPr lang="en-US" sz="1200" dirty="0" smtClean="0"/>
-              <a:t>)</a:t>
-            </a:r>
-          </a:p>
-          <a:p>
-            <a:pPr lvl="1"/>
-            <a:r>
-              <a:rPr lang="en-US" sz="1400" dirty="0" smtClean="0"/>
-              <a:t>Web</a:t>
-            </a:r>
-            <a:endParaRPr lang="en-US" sz="1200" dirty="0" smtClean="0"/>
-          </a:p>
-          <a:p>
-            <a:pPr lvl="2"/>
-            <a:r>
-              <a:rPr lang="en-US" sz="1200" dirty="0" smtClean="0"/>
-              <a:t>Generalization of automatic rules updates to more Selector types.</a:t>
-            </a:r>
-          </a:p>
-          <a:p>
-            <a:pPr lvl="2"/>
-            <a:r>
-              <a:rPr lang="en-US" sz="1200" dirty="0" smtClean="0"/>
-              <a:t>Build-2</a:t>
-            </a:r>
-            <a:r>
-              <a:rPr lang="en-US" sz="1200" baseline="0" dirty="0" smtClean="0"/>
-              <a:t> fixes and enhancements</a:t>
-            </a:r>
-            <a:r>
-              <a:rPr lang="en-US" sz="1200" dirty="0" smtClean="0"/>
-              <a:t> from feedback</a:t>
-            </a:r>
-          </a:p>
-          <a:p>
-            <a:r>
-              <a:rPr lang="en-US" sz="1400" dirty="0" smtClean="0"/>
-              <a:t>Build</a:t>
-            </a:r>
-            <a:r>
-              <a:rPr lang="en-US" sz="1400" dirty="0"/>
-              <a:t>-4  </a:t>
             </a:r>
             <a:r>
               <a:rPr lang="en-US" sz="1400" dirty="0" smtClean="0"/>
               <a:t>(</a:t>
             </a:r>
             <a:r>
-              <a:rPr lang="en-US" sz="1200" dirty="0" smtClean="0">
+              <a:rPr lang="en-US" sz="1400" dirty="0" smtClean="0">
                 <a:solidFill>
                   <a:srgbClr val="008000"/>
                 </a:solidFill>
               </a:rPr>
-              <a:t>April 2013</a:t>
+              <a:t>January 2013</a:t>
             </a:r>
             <a:r>
               <a:rPr lang="en-US" sz="1400" dirty="0" smtClean="0"/>
@@ -19432,14 +19390,70 @@
           <a:p>
             <a:pPr lvl="1"/>
             <a:r>
+              <a:rPr lang="en-US" sz="1600" dirty="0" smtClean="0"/>
+              <a:t>Web</a:t>
+            </a:r>
+            <a:endParaRPr lang="en-US" sz="1400" dirty="0" smtClean="0"/>
+          </a:p>
+          <a:p>
+            <a:pPr lvl="2"/>
+            <a:r>
               <a:rPr lang="en-US" sz="1400" dirty="0" smtClean="0"/>
+              <a:t>Generalization of automatic rules updates to more Selector types.</a:t>
+            </a:r>
+          </a:p>
+          <a:p>
+            <a:pPr lvl="2"/>
+            <a:r>
+              <a:rPr lang="en-US" sz="1400" dirty="0" smtClean="0"/>
+              <a:t>Build-2</a:t>
+            </a:r>
+            <a:r>
+              <a:rPr lang="en-US" sz="1400" baseline="0" dirty="0" smtClean="0"/>
+              <a:t> fixes and enhancements</a:t>
+            </a:r>
+            <a:r>
+              <a:rPr lang="en-US" sz="1400" dirty="0" smtClean="0"/>
+              <a:t> from feedback</a:t>
+            </a:r>
+          </a:p>
+          <a:p>
+            <a:r>
+              <a:rPr lang="en-US" sz="1600" dirty="0" smtClean="0"/>
+              <a:t>Build</a:t>
+            </a:r>
+            <a:r>
+              <a:rPr lang="en-US" sz="1600" dirty="0"/>
+              <a:t>-4  </a:t>
+            </a:r>
+            <a:r>
+              <a:rPr lang="en-US" sz="1600" dirty="0" smtClean="0"/>
+              <a:t>(</a:t>
+            </a:r>
+            <a:r>
+              <a:rPr lang="en-US" sz="1400" dirty="0" smtClean="0">
+                <a:solidFill>
+                  <a:srgbClr val="008000"/>
+                </a:solidFill>
+              </a:rPr>
+              <a:t>April 2013</a:t>
+            </a:r>
+            <a:r>
+              <a:rPr lang="en-US" sz="1600" dirty="0" smtClean="0"/>
+              <a:t>)</a:t>
+            </a:r>
+          </a:p>
+          <a:p>
+            <a:pPr lvl="1"/>
+            <a:r>
+              <a:rPr lang="en-US" sz="1600" dirty="0" smtClean="0"/>
               <a:t>Web</a:t>
             </a:r>
           </a:p>
           <a:p>
             <a:pPr lvl="2"/>
             <a:r>
-              <a:rPr lang="en-US" sz="1200" dirty="0">
+              <a:rPr lang="en-US" sz="1400" dirty="0">
                 <a:solidFill>
                   <a:srgbClr val="CC0000"/>
                 </a:solidFill>
@@ -19447,14 +19461,14 @@
               <a:t>DMS-535</a:t>
             </a:r>
             <a:r>
-              <a:rPr lang="en-US" sz="1200" dirty="0"/>
+              <a:rPr lang="en-US" sz="1400" dirty="0"/>
               <a:t> Ensure all files archived before use allowed </a:t>
             </a:r>
           </a:p>
           <a:p>
             <a:pPr lvl="2"/>
             <a:r>
-              <a:rPr lang="en-US" sz="1200" dirty="0">
+              <a:rPr lang="en-US" sz="1400" dirty="0">
                 <a:solidFill>
                   <a:srgbClr val="CC0000"/>
                 </a:solidFill>
@@ -19462,218 +19476,226 @@
               <a:t>DMS-540 </a:t>
             </a:r>
             <a:r>
-              <a:rPr lang="en-US" sz="1200" dirty="0"/>
+              <a:rPr lang="en-US" sz="1400" dirty="0"/>
               <a:t>Web interface for querying what the best reference files </a:t>
             </a:r>
             <a:r>
-              <a:rPr lang="en-US" sz="1200" dirty="0" smtClean="0"/>
+              <a:rPr lang="en-US" sz="1400" dirty="0" smtClean="0"/>
               <a:t>are</a:t>
             </a:r>
           </a:p>
           <a:p>
             <a:pPr lvl="3"/>
             <a:r>
-              <a:rPr lang="en-US" sz="1000" dirty="0" smtClean="0">
+              <a:rPr lang="en-US" sz="1050" dirty="0" smtClean="0">
                 <a:solidFill>
                   <a:srgbClr val="3366FF"/>
                 </a:solidFill>
               </a:rPr>
-              <a:t>Dataset Best References,  Explore Best References</a:t>
-            </a:r>
-            <a:endParaRPr lang="en-US" sz="1000" dirty="0" smtClean="0"/>
+              <a:t>Dataset Best References,  Explore Best </a:t>
+            </a:r>
+            <a:r>
+              <a:rPr lang="en-US" sz="1050" dirty="0" smtClean="0">
+                <a:solidFill>
+                  <a:srgbClr val="3366FF"/>
+                </a:solidFill>
+              </a:rPr>
+              <a:t>References, Service</a:t>
+            </a:r>
+            <a:endParaRPr lang="en-US" sz="1050" dirty="0" smtClean="0"/>
           </a:p>
           <a:p>
             <a:pPr lvl="1"/>
             <a:r>
+              <a:rPr lang="en-US" sz="1600" dirty="0" smtClean="0"/>
+              <a:t>Command line </a:t>
+            </a:r>
+            <a:endParaRPr lang="en-US" sz="1600" dirty="0"/>
+          </a:p>
+          <a:p>
+            <a:pPr lvl="2"/>
+            <a:r>
+              <a:rPr lang="en-US" sz="1400" dirty="0">
+                <a:solidFill>
+                  <a:srgbClr val="CC0000"/>
+                </a:solidFill>
+              </a:rPr>
+              <a:t>DMS-545 </a:t>
+            </a:r>
+            <a:r>
+              <a:rPr lang="en-US" sz="1400" dirty="0"/>
+              <a:t>Show where in list of data sets which will use different reference file due to change in </a:t>
+            </a:r>
+            <a:r>
               <a:rPr lang="en-US" sz="1400" dirty="0" smtClean="0"/>
-              <a:t>Command line </a:t>
+              <a:t>rules  (</a:t>
+            </a:r>
+            <a:r>
+              <a:rPr lang="en-US" sz="1400" dirty="0" err="1" smtClean="0">
+                <a:solidFill>
+                  <a:srgbClr val="3366FF"/>
+                </a:solidFill>
+              </a:rPr>
+              <a:t>crds.file_bestrefs</a:t>
+            </a:r>
+            <a:r>
+              <a:rPr lang="en-US" sz="1400" dirty="0" smtClean="0"/>
+              <a:t>)</a:t>
+            </a:r>
+          </a:p>
+          <a:p>
+            <a:pPr lvl="2"/>
+            <a:r>
+              <a:rPr lang="en-US" sz="1400" dirty="0" smtClean="0">
+                <a:solidFill>
+                  <a:srgbClr val="CC0000"/>
+                </a:solidFill>
+              </a:rPr>
+              <a:t>DMS-547 </a:t>
+            </a:r>
+            <a:r>
+              <a:rPr lang="en-US" sz="1400" dirty="0" smtClean="0"/>
+              <a:t>Tool to show active reference files in use for given context(s)   (</a:t>
+            </a:r>
+            <a:r>
+              <a:rPr lang="en-US" sz="1400" dirty="0" err="1" smtClean="0">
+                <a:solidFill>
+                  <a:srgbClr val="3366FF"/>
+                </a:solidFill>
+              </a:rPr>
+              <a:t>crds.list</a:t>
+            </a:r>
+            <a:r>
+              <a:rPr lang="en-US" sz="1400" dirty="0" smtClean="0"/>
+              <a:t>)</a:t>
+            </a:r>
+          </a:p>
+          <a:p>
+            <a:pPr lvl="2"/>
+            <a:r>
+              <a:rPr lang="en-US" sz="1400" dirty="0" smtClean="0">
+                <a:solidFill>
+                  <a:srgbClr val="CC0000"/>
+                </a:solidFill>
+              </a:rPr>
+              <a:t>DMS</a:t>
+            </a:r>
+            <a:r>
+              <a:rPr lang="en-US" sz="1400" dirty="0">
+                <a:solidFill>
+                  <a:srgbClr val="CC0000"/>
+                </a:solidFill>
+              </a:rPr>
+              <a:t>-548 </a:t>
+            </a:r>
+            <a:r>
+              <a:rPr lang="en-US" sz="1400" dirty="0"/>
+              <a:t>Tool to show active files associated with specific instrument modes </a:t>
+            </a:r>
+            <a:r>
+              <a:rPr lang="en-US" sz="1400" dirty="0" smtClean="0"/>
+              <a:t>  (</a:t>
+            </a:r>
+            <a:r>
+              <a:rPr lang="en-US" sz="1400" dirty="0" err="1" smtClean="0"/>
+              <a:t>crds.list</a:t>
+            </a:r>
+            <a:r>
+              <a:rPr lang="en-US" sz="1400" dirty="0" smtClean="0"/>
+              <a:t>)</a:t>
             </a:r>
             <a:endParaRPr lang="en-US" sz="1400" dirty="0"/>
           </a:p>
           <a:p>
             <a:pPr lvl="2"/>
             <a:r>
-              <a:rPr lang="en-US" sz="1200" dirty="0">
+              <a:rPr lang="en-US" sz="1400" dirty="0">
                 <a:solidFill>
                   <a:srgbClr val="CC0000"/>
                 </a:solidFill>
               </a:rPr>
-              <a:t>DMS-545 </a:t>
-            </a:r>
-            <a:r>
-              <a:rPr lang="en-US" sz="1200" dirty="0"/>
-              <a:t>Show where in list of data sets which will use different reference file due to change in </a:t>
-            </a:r>
-            <a:r>
-              <a:rPr lang="en-US" sz="1200" dirty="0" smtClean="0"/>
-              <a:t>rules  (</a:t>
-            </a:r>
-            <a:r>
-              <a:rPr lang="en-US" sz="1200" dirty="0" err="1" smtClean="0">
+              <a:t>HST-1</a:t>
+            </a:r>
+            <a:r>
+              <a:rPr lang="en-US" sz="1400" dirty="0"/>
+              <a:t> Detect file reversions on context change and supply </a:t>
+            </a:r>
+            <a:r>
+              <a:rPr lang="en-US" sz="1400" dirty="0" smtClean="0"/>
+              <a:t>warning   (</a:t>
+            </a:r>
+            <a:r>
+              <a:rPr lang="en-US" sz="1400" dirty="0" err="1" smtClean="0"/>
+              <a:t>crds.reversions</a:t>
+            </a:r>
+            <a:r>
+              <a:rPr lang="en-US" sz="1400" dirty="0" smtClean="0"/>
+              <a:t>)</a:t>
+            </a:r>
+            <a:endParaRPr lang="en-US" sz="1400" dirty="0"/>
+          </a:p>
+          <a:p>
+            <a:pPr lvl="2"/>
+            <a:r>
+              <a:rPr lang="en-US" sz="1400" dirty="0">
+                <a:solidFill>
+                  <a:srgbClr val="CC0000"/>
+                </a:solidFill>
+              </a:rPr>
+              <a:t>HST-2</a:t>
+            </a:r>
+            <a:r>
+              <a:rPr lang="en-US" sz="1400" dirty="0"/>
+              <a:t> Update local reference file directories with those needed by a context (or list of contexts</a:t>
+            </a:r>
+            <a:r>
+              <a:rPr lang="en-US" sz="1400" dirty="0" smtClean="0"/>
+              <a:t>)  (</a:t>
+            </a:r>
+            <a:r>
+              <a:rPr lang="en-US" sz="1400" dirty="0" err="1" smtClean="0">
                 <a:solidFill>
                   <a:srgbClr val="3366FF"/>
                 </a:solidFill>
               </a:rPr>
-              <a:t>crds.file_bestrefs</a:t>
-            </a:r>
-            <a:r>
-              <a:rPr lang="en-US" sz="1200" dirty="0" smtClean="0"/>
-              <a:t>)</a:t>
-            </a:r>
+              <a:t>crds.sync</a:t>
+            </a:r>
+            <a:r>
+              <a:rPr lang="en-US" sz="1400" dirty="0" smtClean="0"/>
+              <a:t>) </a:t>
+            </a:r>
+            <a:endParaRPr lang="en-US" sz="1400" dirty="0"/>
           </a:p>
           <a:p>
             <a:pPr lvl="2"/>
             <a:r>
-              <a:rPr lang="en-US" sz="1200" dirty="0" smtClean="0">
+              <a:rPr lang="en-US" sz="1400" dirty="0">
                 <a:solidFill>
                   <a:srgbClr val="CC0000"/>
                 </a:solidFill>
               </a:rPr>
-              <a:t>DMS-547 </a:t>
-            </a:r>
-            <a:r>
-              <a:rPr lang="en-US" sz="1200" dirty="0" smtClean="0"/>
-              <a:t>Tool to show active reference files in use for given context(s)   (</a:t>
-            </a:r>
-            <a:r>
-              <a:rPr lang="en-US" sz="1200" dirty="0" err="1" smtClean="0">
-                <a:solidFill>
-                  <a:srgbClr val="3366FF"/>
-                </a:solidFill>
-              </a:rPr>
-              <a:t>crds.list</a:t>
-            </a:r>
-            <a:r>
-              <a:rPr lang="en-US" sz="1200" dirty="0" smtClean="0"/>
-              <a:t>)</a:t>
+              <a:t>HST-4</a:t>
+            </a:r>
+            <a:r>
+              <a:rPr lang="en-US" sz="1400" dirty="0"/>
+              <a:t> Detect when new rule file doesn't cover modes covered in previous rule file </a:t>
             </a:r>
           </a:p>
           <a:p>
             <a:pPr lvl="2"/>
             <a:r>
-              <a:rPr lang="en-US" sz="1200" dirty="0" smtClean="0">
+              <a:rPr lang="en-US" sz="1400" dirty="0">
                 <a:solidFill>
                   <a:srgbClr val="CC0000"/>
                 </a:solidFill>
               </a:rPr>
-              <a:t>DMS</a:t>
-            </a:r>
-            <a:r>
-              <a:rPr lang="en-US" sz="1200" dirty="0">
-                <a:solidFill>
-                  <a:srgbClr val="CC0000"/>
-                </a:solidFill>
-              </a:rPr>
-              <a:t>-548 </a:t>
-            </a:r>
-            <a:r>
-              <a:rPr lang="en-US" sz="1200" dirty="0"/>
-              <a:t>Tool to show active files associated with specific instrument modes </a:t>
-            </a:r>
-            <a:r>
-              <a:rPr lang="en-US" sz="1200" dirty="0" smtClean="0"/>
-              <a:t>  (</a:t>
-            </a:r>
-            <a:r>
-              <a:rPr lang="en-US" sz="1200" dirty="0" err="1" smtClean="0"/>
-              <a:t>crds.list</a:t>
-            </a:r>
-            <a:r>
-              <a:rPr lang="en-US" sz="1200" dirty="0" smtClean="0"/>
-              <a:t>)</a:t>
-            </a:r>
-            <a:endParaRPr lang="en-US" sz="1200" dirty="0"/>
-          </a:p>
-          <a:p>
-            <a:pPr lvl="2"/>
-            <a:r>
-              <a:rPr lang="en-US" sz="1200" dirty="0">
-                <a:solidFill>
-                  <a:srgbClr val="CC0000"/>
-                </a:solidFill>
-              </a:rPr>
-              <a:t>HST-1</a:t>
-            </a:r>
-            <a:r>
-              <a:rPr lang="en-US" sz="1200" dirty="0"/>
-              <a:t> Detect file reversions on context change and supply </a:t>
-            </a:r>
-            <a:r>
-              <a:rPr lang="en-US" sz="1200" dirty="0" smtClean="0"/>
-              <a:t>warning   (</a:t>
-            </a:r>
-            <a:r>
-              <a:rPr lang="en-US" sz="1200" dirty="0" err="1" smtClean="0"/>
-              <a:t>crds.reversions</a:t>
-            </a:r>
-            <a:r>
-              <a:rPr lang="en-US" sz="1200" dirty="0" smtClean="0"/>
-              <a:t>)</a:t>
-            </a:r>
-            <a:endParaRPr lang="en-US" sz="1200" dirty="0"/>
-          </a:p>
-          <a:p>
-            <a:pPr lvl="2"/>
-            <a:r>
-              <a:rPr lang="en-US" sz="1200" dirty="0">
-                <a:solidFill>
-                  <a:srgbClr val="CC0000"/>
-                </a:solidFill>
-              </a:rPr>
-              <a:t>HST-2</a:t>
-            </a:r>
-            <a:r>
-              <a:rPr lang="en-US" sz="1200" dirty="0"/>
-              <a:t> Update local reference file directories with those needed by a context (or list of contexts</a:t>
-            </a:r>
-            <a:r>
-              <a:rPr lang="en-US" sz="1200" dirty="0" smtClean="0"/>
-              <a:t>)  (</a:t>
-            </a:r>
-            <a:r>
-              <a:rPr lang="en-US" sz="1200" dirty="0" err="1" smtClean="0">
-                <a:solidFill>
-                  <a:srgbClr val="3366FF"/>
-                </a:solidFill>
-              </a:rPr>
-              <a:t>crds.sync</a:t>
-            </a:r>
-            <a:r>
-              <a:rPr lang="en-US" sz="1200" dirty="0" smtClean="0"/>
-              <a:t>) </a:t>
-            </a:r>
-            <a:endParaRPr lang="en-US" sz="1200" dirty="0"/>
-          </a:p>
-          <a:p>
-            <a:pPr lvl="2"/>
-            <a:r>
-              <a:rPr lang="en-US" sz="1200" dirty="0">
-                <a:solidFill>
-                  <a:srgbClr val="CC0000"/>
-                </a:solidFill>
-              </a:rPr>
-              <a:t>HST-4</a:t>
-            </a:r>
-            <a:r>
-              <a:rPr lang="en-US" sz="1200" dirty="0"/>
-              <a:t> Detect when new rule file doesn't cover modes covered in previous rule file </a:t>
-            </a:r>
-          </a:p>
-          <a:p>
-            <a:pPr lvl="2"/>
-            <a:r>
-              <a:rPr lang="en-US" sz="1200" dirty="0">
-                <a:solidFill>
-                  <a:srgbClr val="CC0000"/>
-                </a:solidFill>
-              </a:rPr>
               <a:t>HST-15 </a:t>
             </a:r>
             <a:r>
-              <a:rPr lang="en-US" sz="1200" dirty="0"/>
+              <a:rPr lang="en-US" sz="1400" dirty="0"/>
               <a:t>Reject rules files with duplicate selection criteria for different files </a:t>
             </a:r>
-            <a:endParaRPr lang="en-US" sz="1200" dirty="0" smtClean="0"/>
+            <a:endParaRPr lang="en-US" sz="1400" dirty="0" smtClean="0"/>
           </a:p>
         </p:txBody>
       </p:sp>
@@ -19991,43 +20013,31 @@
             </a:r>
             <a:r>
               <a:rPr lang="en-US" sz="1200" dirty="0"/>
-              <a:t>User interface to display required selection criteria for type of reference file </a:t>
+              <a:t>User interface to display required selection criteria for type of reference </a:t>
             </a:r>
             <a:r>
               <a:rPr lang="en-US" sz="1200" dirty="0" smtClean="0"/>
-              <a:t> (</a:t>
-            </a:r>
-            <a:r>
-              <a:rPr lang="en-US" sz="1200" dirty="0" smtClean="0">
-                <a:solidFill>
-                  <a:srgbClr val="3366FF"/>
-                </a:solidFill>
-              </a:rPr>
-              <a:t>Explore Best Refs</a:t>
+              <a:t>file</a:t>
+            </a:r>
+            <a:endParaRPr lang="en-US" sz="1200" dirty="0"/>
+          </a:p>
+          <a:p>
+            <a:pPr lvl="2"/>
+            <a:r>
+              <a:rPr lang="en-US" sz="1200" dirty="0">
+                <a:solidFill>
+                  <a:srgbClr val="CC0000"/>
+                </a:solidFill>
+              </a:rPr>
+              <a:t>HST-7</a:t>
+            </a:r>
+            <a:r>
+              <a:rPr lang="en-US" sz="1200" dirty="0"/>
+              <a:t> Ability to display current operations </a:t>
             </a:r>
             <a:r>
               <a:rPr lang="en-US" sz="1200" dirty="0" smtClean="0"/>
-              <a:t>)</a:t>
-            </a:r>
-            <a:endParaRPr lang="en-US" sz="1200" dirty="0"/>
-          </a:p>
-          <a:p>
-            <a:pPr lvl="2"/>
-            <a:r>
-              <a:rPr lang="en-US" sz="1200" dirty="0">
-                <a:solidFill>
-                  <a:srgbClr val="CC0000"/>
-                </a:solidFill>
-              </a:rPr>
-              <a:t>HST-7</a:t>
-            </a:r>
-            <a:r>
-              <a:rPr lang="en-US" sz="1200" dirty="0"/>
-              <a:t> Ability to display current operations context </a:t>
-            </a:r>
-            <a:r>
-              <a:rPr lang="en-US" sz="1200" dirty="0" smtClean="0"/>
-              <a:t> (web:  none)</a:t>
+              <a:t>context</a:t>
             </a:r>
             <a:endParaRPr lang="en-US" sz="1200" dirty="0"/>
           </a:p>

</xml_diff>

<commit_message>
Added SDR2 bullet about discussed Archive interface concepts.
git-svn-id: https://aeon.stsci.edu/ssb/svn/crds/trunk@758 0d8f46c8-9b30-49d0-b470-0f6283dc92e8
</commit_message>
<xml_diff>
--- a/docs/DMS_SDR2_09_CRDS_final.pptx
+++ b/docs/DMS_SDR2_09_CRDS_final.pptx
@@ -3357,7 +3357,6 @@
               <a:rPr lang="en-US" sz="1600" dirty="0" smtClean="0"/>
               <a:t>Bracket</a:t>
             </a:r>
-            <a:endParaRPr lang="en-US" sz="1600" dirty="0" smtClean="0"/>
           </a:p>
           <a:p>
             <a:pPr marL="0" indent="0">
@@ -6003,8 +6002,34 @@
             <a:pPr lvl="2"/>
             <a:r>
               <a:rPr lang="en-US" dirty="0" smtClean="0"/>
-              <a:t>CRDS client *must* have file storage,  might as well share.</a:t>
-            </a:r>
+              <a:t>CRDS client *must* have file storage,  might as well share</a:t>
+            </a:r>
+            <a:r>
+              <a:rPr lang="en-US" dirty="0" smtClean="0"/>
+              <a:t>.</a:t>
+            </a:r>
+          </a:p>
+          <a:p>
+            <a:pPr lvl="1"/>
+            <a:r>
+              <a:rPr lang="en-US" dirty="0" smtClean="0"/>
+              <a:t>CRDS : Archive interfaces discussed for:</a:t>
+            </a:r>
+          </a:p>
+          <a:p>
+            <a:pPr lvl="2"/>
+            <a:r>
+              <a:rPr lang="en-US" dirty="0" smtClean="0"/>
+              <a:t>Distributing references and rules from the archive via simple URL’s.</a:t>
+            </a:r>
+          </a:p>
+          <a:p>
+            <a:pPr lvl="2"/>
+            <a:r>
+              <a:rPr lang="en-US" dirty="0" smtClean="0"/>
+              <a:t>Ingesting reference files into the archive using existing CDBS/OPUS file exchange protocols.</a:t>
+            </a:r>
+            <a:endParaRPr lang="en-US" dirty="0"/>
           </a:p>
         </p:txBody>
       </p:sp>
@@ -6925,11 +6950,7 @@
             </a:r>
             <a:r>
               <a:rPr lang="en-US" dirty="0" smtClean="0"/>
-              <a:t> </a:t>
-            </a:r>
-            <a:r>
-              <a:rPr lang="en-US" dirty="0" smtClean="0"/>
-              <a:t>Relevance</a:t>
+              <a:t> Relevance</a:t>
             </a:r>
             <a:endParaRPr lang="en-US" sz="2800" b="0" i="0" u="none" strike="noStrike" dirty="0" smtClean="0">
               <a:effectLst/>
@@ -7677,17 +7698,7 @@
                 <a:latin typeface="Helvetica"/>
                 <a:sym typeface="Wingdings"/>
               </a:rPr>
-              <a:t>Prevents </a:t>
-            </a:r>
-            <a:r>
-              <a:rPr lang="en-US" sz="1200" b="1" dirty="0" smtClean="0">
-                <a:solidFill>
-                  <a:srgbClr val="3366FF"/>
-                </a:solidFill>
-                <a:latin typeface="Helvetica"/>
-                <a:sym typeface="Wingdings"/>
-              </a:rPr>
-              <a:t>irrelevant parameter values from affecting matching</a:t>
+              <a:t>Prevents irrelevant parameter values from affecting matching</a:t>
             </a:r>
             <a:r>
               <a:rPr lang="en-US" sz="1200" b="1" dirty="0" smtClean="0">
@@ -11090,7 +11101,11 @@
           <a:p>
             <a:r>
               <a:rPr lang="en-US" sz="1600" dirty="0" smtClean="0"/>
-              <a:t>The server does not have to be running</a:t>
+              <a:t>The server does not have to be </a:t>
+            </a:r>
+            <a:r>
+              <a:rPr lang="en-US" sz="1600" dirty="0" smtClean="0"/>
+              <a:t>running</a:t>
             </a:r>
           </a:p>
         </p:txBody>
@@ -13990,7 +14005,6 @@
               <a:rPr lang="en-US" dirty="0" smtClean="0"/>
               <a:t>Prototyped for HST build-2</a:t>
             </a:r>
-            <a:endParaRPr lang="en-US" dirty="0" smtClean="0"/>
           </a:p>
           <a:p>
             <a:r>
@@ -17681,11 +17695,7 @@
             </a:r>
             <a:r>
               <a:rPr lang="en-US" sz="1400" dirty="0" smtClean="0"/>
-              <a:t>use </a:t>
-            </a:r>
-            <a:r>
-              <a:rPr lang="en-US" sz="1400" dirty="0" smtClean="0"/>
-              <a:t>a given reference file</a:t>
+              <a:t>use a given reference file</a:t>
             </a:r>
           </a:p>
           <a:p>
@@ -19068,7 +19078,7 @@
         </p:nvSpPr>
         <p:spPr>
           <a:xfrm>
-            <a:off x="1295400" y="914400"/>
+            <a:off x="1219200" y="1143000"/>
             <a:ext cx="6478587" cy="4953000"/>
           </a:xfrm>
         </p:spPr>
@@ -19185,13 +19195,8 @@
             <a:pPr lvl="1"/>
             <a:r>
               <a:rPr lang="en-US" sz="1600" dirty="0" smtClean="0"/>
-              <a:t>Automatic Instrument, Pipeline Context </a:t>
-            </a:r>
-            <a:r>
-              <a:rPr lang="en-US" sz="1600" dirty="0" smtClean="0"/>
-              <a:t>Rules Updates</a:t>
-            </a:r>
-            <a:endParaRPr lang="en-US" sz="1600" dirty="0" smtClean="0"/>
+              <a:t>Automatic Instrument, Pipeline Context Rules Updates</a:t>
+            </a:r>
           </a:p>
           <a:p>
             <a:pPr lvl="1"/>
@@ -19492,15 +19497,7 @@
                   <a:srgbClr val="3366FF"/>
                 </a:solidFill>
               </a:rPr>
-              <a:t>Dataset Best References,  Explore Best </a:t>
-            </a:r>
-            <a:r>
-              <a:rPr lang="en-US" sz="1050" dirty="0" smtClean="0">
-                <a:solidFill>
-                  <a:srgbClr val="3366FF"/>
-                </a:solidFill>
-              </a:rPr>
-              <a:t>References, Service</a:t>
+              <a:t>Dataset Best References,  Explore Best References, Service</a:t>
             </a:r>
             <a:endParaRPr lang="en-US" sz="1050" dirty="0" smtClean="0"/>
           </a:p>
@@ -19524,7 +19521,35 @@
             </a:r>
             <a:r>
               <a:rPr lang="en-US" sz="1400" dirty="0"/>
-              <a:t>Show where in list of data sets which will use different reference file due to change in </a:t>
+              <a:t>Show </a:t>
+            </a:r>
+            <a:r>
+              <a:rPr lang="en-US" sz="1400" dirty="0" smtClean="0"/>
+              <a:t>which </a:t>
+            </a:r>
+            <a:r>
+              <a:rPr lang="en-US" sz="1400" dirty="0" smtClean="0"/>
+              <a:t>data sets in a list </a:t>
+            </a:r>
+            <a:r>
+              <a:rPr lang="en-US" sz="1400" dirty="0"/>
+              <a:t>will use different </a:t>
+            </a:r>
+            <a:r>
+              <a:rPr lang="en-US" sz="1400" dirty="0" smtClean="0"/>
+              <a:t>references </a:t>
+            </a:r>
+            <a:r>
+              <a:rPr lang="en-US" sz="1400" dirty="0"/>
+              <a:t>file due to </a:t>
+            </a:r>
+            <a:r>
+              <a:rPr lang="en-US" sz="1400" dirty="0" smtClean="0"/>
+              <a:t>changes </a:t>
+            </a:r>
+            <a:r>
+              <a:rPr lang="en-US" sz="1400" dirty="0"/>
+              <a:t>in </a:t>
             </a:r>
             <a:r>
               <a:rPr lang="en-US" sz="1400" dirty="0" smtClean="0"/>
@@ -20004,12 +20029,20 @@
           <a:p>
             <a:pPr lvl="2"/>
             <a:r>
+              <a:rPr lang="en-US" sz="1200" dirty="0" smtClean="0">
+                <a:solidFill>
+                  <a:srgbClr val="CC0000"/>
+                </a:solidFill>
+              </a:rPr>
+              <a:t>HST</a:t>
+            </a:r>
+            <a:r>
               <a:rPr lang="en-US" sz="1200" dirty="0">
                 <a:solidFill>
                   <a:srgbClr val="CC0000"/>
                 </a:solidFill>
               </a:rPr>
-              <a:t>HST-11 </a:t>
+              <a:t>-11 </a:t>
             </a:r>
             <a:r>
               <a:rPr lang="en-US" sz="1200" dirty="0"/>

</xml_diff>

<commit_message>
More SDR2 tweaks,   nothing major.
git-svn-id: https://aeon.stsci.edu/ssb/svn/crds/trunk@759 0d8f46c8-9b30-49d0-b470-0f6283dc92e8
</commit_message>
<xml_diff>
--- a/docs/DMS_SDR2_09_CRDS_final.pptx
+++ b/docs/DMS_SDR2_09_CRDS_final.pptx
@@ -297,7 +297,7 @@
             </a:pPr>
             <a:fld id="{21EC3080-00C3-4840-8B4C-5199FEA2FD44}" type="datetime1">
               <a:rPr lang="en-US" smtClean="0"/>
-              <a:t>Nov 26 2012</a:t>
+              <a:t>Nov 27 2012</a:t>
             </a:fld>
             <a:endParaRPr lang="en-US"/>
           </a:p>
@@ -847,7 +847,7 @@
             </a:pPr>
             <a:fld id="{ED83A886-433E-6F46-86BE-4CE36E3F8C6C}" type="datetime1">
               <a:rPr lang="en-US" smtClean="0"/>
-              <a:t>Nov 26 2012</a:t>
+              <a:t>Nov 27 2012</a:t>
             </a:fld>
             <a:endParaRPr lang="en-US"/>
           </a:p>
@@ -5431,8 +5431,13 @@
           <a:p>
             <a:r>
               <a:rPr lang="en-US" sz="1800" dirty="0" smtClean="0"/>
-              <a:t>Match weights resolve ambiguities resulting from patterns.</a:t>
-            </a:r>
+              <a:t>Match weights resolve </a:t>
+            </a:r>
+            <a:r>
+              <a:rPr lang="en-US" sz="1800" dirty="0" smtClean="0"/>
+              <a:t>ambiguities from multiple pattern matches.</a:t>
+            </a:r>
+            <a:endParaRPr lang="en-US" sz="1800" dirty="0" smtClean="0"/>
           </a:p>
           <a:p>
             <a:r>
@@ -6002,11 +6007,15 @@
             <a:pPr lvl="2"/>
             <a:r>
               <a:rPr lang="en-US" dirty="0" smtClean="0"/>
-              <a:t>CRDS client *must* have file storage,  might as well share</a:t>
+              <a:t>CRDS client *must* have file storage,  </a:t>
             </a:r>
             <a:r>
               <a:rPr lang="en-US" dirty="0" smtClean="0"/>
-              <a:t>.</a:t>
+              <a:t>so might </a:t>
+            </a:r>
+            <a:r>
+              <a:rPr lang="en-US" dirty="0" smtClean="0"/>
+              <a:t>as well share.</a:t>
             </a:r>
           </a:p>
           <a:p>
@@ -6697,8 +6706,8 @@
         </p:nvSpPr>
         <p:spPr>
           <a:xfrm>
-            <a:off x="1752600" y="5410200"/>
-            <a:ext cx="6019800" cy="1017844"/>
+            <a:off x="1524000" y="5410200"/>
+            <a:ext cx="6019800" cy="940900"/>
           </a:xfrm>
           <a:prstGeom prst="rect">
             <a:avLst/>
@@ -6715,14 +6724,29 @@
               <a:buChar char="•"/>
             </a:pPr>
             <a:r>
-              <a:rPr lang="en-US" sz="1200" b="1" dirty="0" smtClean="0">
+              <a:rPr lang="en-US" sz="1100" b="1" dirty="0" smtClean="0">
                 <a:solidFill>
                   <a:srgbClr val="3366FF"/>
                 </a:solidFill>
                 <a:latin typeface="Helvetica"/>
               </a:rPr>
-              <a:t>Not all reference types are relevant to all instrument modes</a:t>
-            </a:r>
+              <a:t>Not all reference types are relevant to all instrument </a:t>
+            </a:r>
+            <a:r>
+              <a:rPr lang="en-US" sz="1100" b="1" dirty="0" smtClean="0">
+                <a:solidFill>
+                  <a:srgbClr val="3366FF"/>
+                </a:solidFill>
+                <a:latin typeface="Helvetica"/>
+              </a:rPr>
+              <a:t>modes</a:t>
+            </a:r>
+            <a:endParaRPr lang="en-US" sz="1100" b="1" dirty="0" smtClean="0">
+              <a:solidFill>
+                <a:srgbClr val="3366FF"/>
+              </a:solidFill>
+              <a:latin typeface="Helvetica"/>
+            </a:endParaRPr>
           </a:p>
           <a:p>
             <a:pPr marL="171450" indent="-171450">
@@ -6730,7 +6754,7 @@
               <a:buChar char="•"/>
             </a:pPr>
             <a:r>
-              <a:rPr lang="en-US" sz="1200" b="1" dirty="0" smtClean="0">
+              <a:rPr lang="en-US" sz="1100" b="1" dirty="0" smtClean="0">
                 <a:solidFill>
                   <a:schemeClr val="tx1"/>
                 </a:solidFill>
@@ -6745,7 +6769,7 @@
               <a:buChar char="•"/>
             </a:pPr>
             <a:r>
-              <a:rPr lang="en-US" sz="1200" b="1" dirty="0" smtClean="0">
+              <a:rPr lang="en-US" sz="1100" b="1" dirty="0" smtClean="0">
                 <a:solidFill>
                   <a:schemeClr val="tx1"/>
                 </a:solidFill>
@@ -6760,7 +6784,7 @@
               <a:buChar char="•"/>
             </a:pPr>
             <a:r>
-              <a:rPr lang="en-US" sz="1200" b="1" dirty="0" smtClean="0">
+              <a:rPr lang="en-US" sz="1100" b="1" dirty="0" smtClean="0">
                 <a:solidFill>
                   <a:schemeClr val="tx1"/>
                 </a:solidFill>
@@ -6775,7 +6799,7 @@
               <a:buChar char="•"/>
             </a:pPr>
             <a:r>
-              <a:rPr lang="en-US" sz="1200" b="1" dirty="0" smtClean="0">
+              <a:rPr lang="en-US" sz="1100" b="1" dirty="0" smtClean="0">
                 <a:solidFill>
                   <a:schemeClr val="tx1"/>
                 </a:solidFill>
@@ -7659,7 +7683,7 @@
         <p:spPr>
           <a:xfrm>
             <a:off x="1066800" y="5410200"/>
-            <a:ext cx="6858000" cy="833178"/>
+            <a:ext cx="6858000" cy="648512"/>
           </a:xfrm>
           <a:prstGeom prst="rect">
             <a:avLst/>
@@ -7678,18 +7702,13 @@
             <a:r>
               <a:rPr lang="en-US" sz="1200" b="1" dirty="0" smtClean="0">
                 <a:solidFill>
-                  <a:schemeClr val="tx1"/>
-                </a:solidFill>
-                <a:latin typeface="Helvetica"/>
-              </a:rPr>
-              <a:t>Modifies incoming matching parameters</a:t>
-            </a:r>
-          </a:p>
-          <a:p>
-            <a:pPr marL="171450" indent="-171450">
-              <a:buFont typeface="Arial"/>
-              <a:buChar char="•"/>
-            </a:pPr>
+                  <a:srgbClr val="3366FF"/>
+                </a:solidFill>
+                <a:latin typeface="Helvetica"/>
+                <a:sym typeface="Wingdings"/>
+              </a:rPr>
+              <a:t>Prevents </a:t>
+            </a:r>
             <a:r>
               <a:rPr lang="en-US" sz="1200" b="1" dirty="0" smtClean="0">
                 <a:solidFill>
@@ -7698,7 +7717,7 @@
                 <a:latin typeface="Helvetica"/>
                 <a:sym typeface="Wingdings"/>
               </a:rPr>
-              <a:t>Prevents irrelevant parameter values from affecting matching</a:t>
+              <a:t>irrelevant parameter values from affecting matching</a:t>
             </a:r>
             <a:r>
               <a:rPr lang="en-US" sz="1200" b="1" dirty="0" smtClean="0">
@@ -7719,10 +7738,7 @@
             </a:endParaRPr>
           </a:p>
           <a:p>
-            <a:pPr marL="914400" lvl="1" indent="-171450">
-              <a:buFont typeface="Arial"/>
-              <a:buChar char="•"/>
-            </a:pPr>
+            <a:pPr lvl="1" indent="0"/>
             <a:r>
               <a:rPr lang="en-US" sz="1200" b="1" dirty="0" smtClean="0">
                 <a:solidFill>
@@ -7735,10 +7751,7 @@
             </a:r>
           </a:p>
           <a:p>
-            <a:pPr marL="914400" lvl="1" indent="-171450">
-              <a:buFont typeface="Arial"/>
-              <a:buChar char="•"/>
-            </a:pPr>
+            <a:pPr lvl="1" indent="0"/>
             <a:r>
               <a:rPr lang="en-US" sz="1200" b="1" dirty="0" smtClean="0">
                 <a:solidFill>
@@ -9423,7 +9436,7 @@
         </p:nvSpPr>
         <p:spPr>
           <a:xfrm>
-            <a:off x="2438400" y="6096000"/>
+            <a:off x="2438400" y="5943600"/>
             <a:ext cx="4150981" cy="433068"/>
           </a:xfrm>
           <a:prstGeom prst="rect">
@@ -10964,7 +10977,7 @@
         </p:nvSpPr>
         <p:spPr>
           <a:xfrm>
-            <a:off x="838200" y="838200"/>
+            <a:off x="762000" y="1066800"/>
             <a:ext cx="7239000" cy="4267200"/>
           </a:xfrm>
         </p:spPr>
@@ -11101,11 +11114,7 @@
           <a:p>
             <a:r>
               <a:rPr lang="en-US" sz="1600" dirty="0" smtClean="0"/>
-              <a:t>The server does not have to be </a:t>
-            </a:r>
-            <a:r>
-              <a:rPr lang="en-US" sz="1600" dirty="0" smtClean="0"/>
-              <a:t>running</a:t>
+              <a:t>The server does not have to be running</a:t>
             </a:r>
           </a:p>
         </p:txBody>
@@ -13687,7 +13696,7 @@
         </p:blipFill>
         <p:spPr>
           <a:xfrm>
-            <a:off x="457200" y="989536"/>
+            <a:off x="457200" y="914400"/>
             <a:ext cx="8229600" cy="5448087"/>
           </a:xfrm>
           <a:prstGeom prst="rect">
@@ -13884,8 +13893,8 @@
         </p:nvSpPr>
         <p:spPr>
           <a:xfrm>
-            <a:off x="685800" y="914400"/>
-            <a:ext cx="7769225" cy="5553075"/>
+            <a:off x="685800" y="1143000"/>
+            <a:ext cx="7769225" cy="5105400"/>
           </a:xfrm>
         </p:spPr>
         <p:txBody>
@@ -13893,125 +13902,138 @@
           <a:lstStyle/>
           <a:p>
             <a:r>
-              <a:rPr lang="en-US" dirty="0" smtClean="0"/>
+              <a:rPr lang="en-US" sz="1600" dirty="0" smtClean="0"/>
               <a:t>Intended for routine reference file submissions:</a:t>
             </a:r>
           </a:p>
           <a:p>
             <a:pPr lvl="1"/>
             <a:r>
-              <a:rPr lang="en-US" dirty="0" smtClean="0"/>
+              <a:rPr lang="en-US" sz="1600" dirty="0" smtClean="0"/>
               <a:t>File replacements</a:t>
             </a:r>
           </a:p>
           <a:p>
             <a:pPr lvl="1"/>
             <a:r>
-              <a:rPr lang="en-US" dirty="0" smtClean="0"/>
+              <a:rPr lang="en-US" sz="1600" dirty="0" smtClean="0"/>
               <a:t>Date specific insert/appends</a:t>
             </a:r>
           </a:p>
           <a:p>
             <a:r>
-              <a:rPr lang="en-US" dirty="0" smtClean="0"/>
+              <a:rPr lang="en-US" sz="1600" dirty="0" smtClean="0"/>
               <a:t>Steps of File Submission</a:t>
             </a:r>
           </a:p>
           <a:p>
             <a:pPr lvl="1"/>
             <a:r>
-              <a:rPr lang="en-US" dirty="0" smtClean="0"/>
+              <a:rPr lang="en-US" sz="1600" dirty="0" smtClean="0"/>
               <a:t>Upload new </a:t>
             </a:r>
             <a:r>
-              <a:rPr lang="en-US" dirty="0"/>
+              <a:rPr lang="en-US" sz="1600" dirty="0"/>
               <a:t>r</a:t>
             </a:r>
             <a:r>
-              <a:rPr lang="en-US" dirty="0" smtClean="0"/>
+              <a:rPr lang="en-US" sz="1600" dirty="0" smtClean="0"/>
               <a:t>eference files for one type, e.g. MIRI DARK</a:t>
             </a:r>
           </a:p>
           <a:p>
             <a:pPr lvl="1"/>
             <a:r>
-              <a:rPr lang="en-US" dirty="0" smtClean="0"/>
+              <a:rPr lang="en-US" sz="1600" dirty="0" smtClean="0"/>
               <a:t>Check new references</a:t>
             </a:r>
           </a:p>
           <a:p>
             <a:pPr lvl="2"/>
             <a:r>
-              <a:rPr lang="en-US" dirty="0" smtClean="0"/>
+              <a:rPr lang="en-US" sz="1400" dirty="0" smtClean="0"/>
               <a:t>Allowed parameter values</a:t>
             </a:r>
           </a:p>
           <a:p>
             <a:pPr lvl="2"/>
             <a:r>
-              <a:rPr lang="en-US" dirty="0" smtClean="0"/>
+              <a:rPr lang="en-US" sz="1400" dirty="0" smtClean="0"/>
               <a:t>FITS table mode coverage:  mode additions and removals</a:t>
             </a:r>
           </a:p>
           <a:p>
             <a:pPr lvl="1"/>
             <a:r>
-              <a:rPr lang="en-US" i="1" dirty="0" smtClean="0"/>
+              <a:rPr lang="en-US" sz="1600" i="1" dirty="0" smtClean="0"/>
               <a:t>Automatically</a:t>
             </a:r>
             <a:r>
-              <a:rPr lang="en-US" dirty="0" smtClean="0"/>
+              <a:rPr lang="en-US" sz="1600" dirty="0" smtClean="0"/>
               <a:t> update rules hierarchy</a:t>
             </a:r>
           </a:p>
           <a:p>
             <a:pPr lvl="2"/>
             <a:r>
-              <a:rPr lang="en-US" dirty="0" smtClean="0"/>
+              <a:rPr lang="en-US" sz="1400" dirty="0" smtClean="0"/>
               <a:t>Insert / replace files in existing .rmap Match() cases</a:t>
             </a:r>
           </a:p>
           <a:p>
             <a:pPr lvl="3"/>
             <a:r>
-              <a:rPr lang="en-US" dirty="0" smtClean="0"/>
+              <a:rPr lang="en-US" sz="1200" dirty="0" smtClean="0"/>
               <a:t>Currently limited to Match() -&gt; </a:t>
             </a:r>
             <a:r>
-              <a:rPr lang="en-US" dirty="0" err="1" smtClean="0"/>
+              <a:rPr lang="en-US" sz="1200" dirty="0" err="1" smtClean="0"/>
               <a:t>UseAfter</a:t>
             </a:r>
             <a:r>
-              <a:rPr lang="en-US" dirty="0" smtClean="0"/>
+              <a:rPr lang="en-US" sz="1200" dirty="0" smtClean="0"/>
               <a:t>()</a:t>
             </a:r>
           </a:p>
           <a:p>
             <a:pPr lvl="2"/>
             <a:r>
-              <a:rPr lang="en-US" dirty="0" smtClean="0"/>
-              <a:t>Automatically regenerate higher level contexts</a:t>
-            </a:r>
+              <a:rPr lang="en-US" sz="1400" dirty="0" smtClean="0"/>
+              <a:t>Update </a:t>
+            </a:r>
+            <a:r>
+              <a:rPr lang="en-US" sz="1400" dirty="0" smtClean="0"/>
+              <a:t>higher </a:t>
+            </a:r>
+            <a:r>
+              <a:rPr lang="en-US" sz="1400" dirty="0" smtClean="0"/>
+              <a:t>level </a:t>
+            </a:r>
+            <a:r>
+              <a:rPr lang="en-US" sz="1400" dirty="0" smtClean="0"/>
+              <a:t>contexts to refer to new rmaps</a:t>
+            </a:r>
+            <a:endParaRPr lang="en-US" sz="1400" dirty="0" smtClean="0"/>
           </a:p>
           <a:p>
             <a:pPr lvl="1"/>
             <a:r>
-              <a:rPr lang="en-US" dirty="0" smtClean="0"/>
+              <a:rPr lang="en-US" sz="1600" dirty="0" smtClean="0"/>
               <a:t>Present results for review and confirmation</a:t>
             </a:r>
           </a:p>
           <a:p>
             <a:r>
-              <a:rPr lang="en-US" dirty="0" smtClean="0"/>
+              <a:rPr lang="en-US" sz="1600" dirty="0" smtClean="0"/>
               <a:t>Prototyped for HST build-2</a:t>
             </a:r>
           </a:p>
           <a:p>
             <a:r>
-              <a:rPr lang="en-US" dirty="0" smtClean="0"/>
+              <a:rPr lang="en-US" sz="1600" dirty="0" smtClean="0"/>
               <a:t>Needs generalization to support all JWST Selectors</a:t>
             </a:r>
-            <a:endParaRPr lang="en-US" dirty="0"/>
+            <a:endParaRPr lang="en-US" sz="1600" dirty="0"/>
           </a:p>
         </p:txBody>
       </p:sp>
@@ -14025,7 +14047,12 @@
             <p:ph type="ftr" sz="quarter" idx="11"/>
           </p:nvPr>
         </p:nvSpPr>
-        <p:spPr/>
+        <p:spPr>
+          <a:xfrm>
+            <a:off x="1371600" y="6580685"/>
+            <a:ext cx="6040437" cy="276225"/>
+          </a:xfrm>
+        </p:spPr>
         <p:txBody>
           <a:bodyPr/>
           <a:lstStyle/>
@@ -15312,7 +15339,7 @@
         </p:blipFill>
         <p:spPr>
           <a:xfrm>
-            <a:off x="685800" y="1143000"/>
+            <a:off x="685800" y="990600"/>
             <a:ext cx="8077200" cy="5299018"/>
           </a:xfrm>
           <a:prstGeom prst="rect">
@@ -15768,8 +15795,8 @@
         </p:nvSpPr>
         <p:spPr>
           <a:xfrm>
-            <a:off x="684213" y="914400"/>
-            <a:ext cx="7769225" cy="5543550"/>
+            <a:off x="685800" y="1219200"/>
+            <a:ext cx="7769225" cy="4419600"/>
           </a:xfrm>
           <a:prstGeom prst="rect">
             <a:avLst/>
@@ -15948,48 +15975,6 @@
               </a:defRPr>
             </a:lvl9pPr>
           </a:lstStyle>
-          <a:p>
-            <a:pPr marL="0" indent="0" eaLnBrk="1" hangingPunct="1">
-              <a:lnSpc>
-                <a:spcPct val="90000"/>
-              </a:lnSpc>
-              <a:spcBef>
-                <a:spcPts val="400"/>
-              </a:spcBef>
-              <a:spcAft>
-                <a:spcPts val="800"/>
-              </a:spcAft>
-              <a:buFont typeface="Wingdings" pitchFamily="2" charset="2"/>
-              <a:buNone/>
-              <a:tabLst>
-                <a:tab pos="330200" algn="l"/>
-                <a:tab pos="442913" algn="l"/>
-                <a:tab pos="900113" algn="l"/>
-                <a:tab pos="1357313" algn="l"/>
-                <a:tab pos="1814513" algn="l"/>
-                <a:tab pos="2271713" algn="l"/>
-                <a:tab pos="2728913" algn="l"/>
-                <a:tab pos="3186113" algn="l"/>
-                <a:tab pos="3643313" algn="l"/>
-                <a:tab pos="4100513" algn="l"/>
-                <a:tab pos="4557713" algn="l"/>
-                <a:tab pos="5014913" algn="l"/>
-                <a:tab pos="5472113" algn="l"/>
-                <a:tab pos="5929313" algn="l"/>
-                <a:tab pos="6386513" algn="l"/>
-                <a:tab pos="6843713" algn="l"/>
-                <a:tab pos="7300913" algn="l"/>
-                <a:tab pos="7758113" algn="l"/>
-                <a:tab pos="8215313" algn="l"/>
-                <a:tab pos="8672513" algn="l"/>
-                <a:tab pos="9129713" algn="l"/>
-              </a:tabLst>
-            </a:pPr>
-            <a:r>
-              <a:rPr lang="en-US" sz="1600" smtClean="0"/>
-              <a:t>(Not a complete list)</a:t>
-            </a:r>
-          </a:p>
           <a:p>
             <a:pPr eaLnBrk="1" hangingPunct="1">
               <a:lnSpc>
@@ -16026,8 +16011,12 @@
               </a:tabLst>
             </a:pPr>
             <a:r>
-              <a:rPr lang="en-US" sz="1600" smtClean="0"/>
-              <a:t>General Utilities (useful for more than one category)</a:t>
+              <a:rPr lang="en-US" sz="1600" dirty="0" smtClean="0"/>
+              <a:t>General </a:t>
+            </a:r>
+            <a:r>
+              <a:rPr lang="en-US" sz="1600" dirty="0" smtClean="0"/>
+              <a:t>Utilities (useful for more than one category)</a:t>
             </a:r>
           </a:p>
           <a:p>
@@ -16066,8 +16055,16 @@
               </a:tabLst>
             </a:pPr>
             <a:r>
-              <a:rPr lang="en-US" sz="1600" smtClean="0"/>
-              <a:t>Cache Synchronization  (crds.sync)</a:t>
+              <a:rPr lang="en-US" sz="1600" dirty="0" smtClean="0"/>
+              <a:t>Cache Synchronization  (</a:t>
+            </a:r>
+            <a:r>
+              <a:rPr lang="en-US" sz="1600" dirty="0" err="1" smtClean="0"/>
+              <a:t>crds.sync</a:t>
+            </a:r>
+            <a:r>
+              <a:rPr lang="en-US" sz="1600" dirty="0" smtClean="0"/>
+              <a:t>)</a:t>
             </a:r>
           </a:p>
           <a:p>
@@ -16106,7 +16103,7 @@
               </a:tabLst>
             </a:pPr>
             <a:r>
-              <a:rPr lang="en-US" sz="1400" smtClean="0"/>
+              <a:rPr lang="en-US" sz="1400" dirty="0" smtClean="0"/>
               <a:t>synchronize local reference file directories to contain all reference files required by given list of pipeline contexts </a:t>
             </a:r>
           </a:p>
@@ -16146,7 +16143,7 @@
               </a:tabLst>
             </a:pPr>
             <a:r>
-              <a:rPr lang="en-US" sz="1400" smtClean="0"/>
+              <a:rPr lang="en-US" sz="1400" dirty="0" smtClean="0"/>
               <a:t>Useful for Operations, WIT, and other projects (e.g., IDTs)</a:t>
             </a:r>
           </a:p>
@@ -16186,11 +16183,11 @@
               </a:tabLst>
             </a:pPr>
             <a:r>
-              <a:rPr lang="en-US" sz="1600" smtClean="0"/>
+              <a:rPr lang="en-US" sz="1600" dirty="0" smtClean="0"/>
               <a:t>File Differencing  (</a:t>
             </a:r>
             <a:r>
-              <a:rPr lang="en-US" sz="1600" smtClean="0">
+              <a:rPr lang="en-US" sz="1600" dirty="0" err="1" smtClean="0">
                 <a:solidFill>
                   <a:srgbClr val="3366FF"/>
                 </a:solidFill>
@@ -16198,7 +16195,7 @@
               <a:t>crds.diff</a:t>
             </a:r>
             <a:r>
-              <a:rPr lang="en-US" sz="1600" smtClean="0"/>
+              <a:rPr lang="en-US" sz="1600" dirty="0" smtClean="0"/>
               <a:t>)</a:t>
             </a:r>
           </a:p>
@@ -16238,7 +16235,7 @@
               </a:tabLst>
             </a:pPr>
             <a:r>
-              <a:rPr lang="en-US" sz="1400" smtClean="0"/>
+              <a:rPr lang="en-US" sz="1400" dirty="0" smtClean="0"/>
               <a:t>Highlight all differences in rules and reference files between rmaps, instrument contexts or pipeline contexts</a:t>
             </a:r>
           </a:p>
@@ -16278,11 +16275,11 @@
               </a:tabLst>
             </a:pPr>
             <a:r>
-              <a:rPr lang="en-US" sz="1600" smtClean="0"/>
+              <a:rPr lang="en-US" sz="1600" dirty="0" smtClean="0"/>
               <a:t>File Best References (</a:t>
             </a:r>
             <a:r>
-              <a:rPr lang="en-US" sz="1600" smtClean="0">
+              <a:rPr lang="en-US" sz="1600" dirty="0" err="1" smtClean="0">
                 <a:solidFill>
                   <a:srgbClr val="3366FF"/>
                 </a:solidFill>
@@ -16290,7 +16287,7 @@
               <a:t>crds.file_bestfrefs</a:t>
             </a:r>
             <a:r>
-              <a:rPr lang="en-US" sz="1600" smtClean="0"/>
+              <a:rPr lang="en-US" sz="1600" dirty="0" smtClean="0"/>
               <a:t>)</a:t>
             </a:r>
           </a:p>
@@ -16330,7 +16327,7 @@
               </a:tabLst>
             </a:pPr>
             <a:r>
-              <a:rPr lang="en-US" sz="1400" smtClean="0"/>
+              <a:rPr lang="en-US" sz="1400" dirty="0" smtClean="0"/>
               <a:t>Determines best references for a data set FITS file and/or updates header</a:t>
             </a:r>
           </a:p>
@@ -16370,8 +16367,16 @@
               </a:tabLst>
             </a:pPr>
             <a:r>
-              <a:rPr lang="en-US" sz="1600" smtClean="0"/>
-              <a:t>Database Best References  (crds.db_bestrefs)</a:t>
+              <a:rPr lang="en-US" sz="1600" dirty="0" smtClean="0"/>
+              <a:t>Database Best References  (</a:t>
+            </a:r>
+            <a:r>
+              <a:rPr lang="en-US" sz="1600" dirty="0" err="1" smtClean="0"/>
+              <a:t>crds.db_bestrefs</a:t>
+            </a:r>
+            <a:r>
+              <a:rPr lang="en-US" sz="1600" dirty="0" smtClean="0"/>
+              <a:t>)</a:t>
             </a:r>
           </a:p>
           <a:p>
@@ -16410,10 +16415,9 @@
               </a:tabLst>
             </a:pPr>
             <a:r>
-              <a:rPr lang="en-US" sz="1400" smtClean="0"/>
+              <a:rPr lang="en-US" sz="1400" dirty="0" smtClean="0"/>
               <a:t>Determines best references based on catalog parameters and/or updates catalog</a:t>
             </a:r>
-            <a:endParaRPr lang="en-US" sz="1400" dirty="0" smtClean="0"/>
           </a:p>
         </p:txBody>
       </p:sp>
@@ -16579,7 +16583,7 @@
         </p:nvSpPr>
         <p:spPr>
           <a:xfrm>
-            <a:off x="457200" y="838200"/>
+            <a:off x="457200" y="914400"/>
             <a:ext cx="8216900" cy="5367338"/>
           </a:xfrm>
           <a:prstGeom prst="rect">
@@ -16795,7 +16799,7 @@
               </a:tabLst>
             </a:pPr>
             <a:r>
-              <a:rPr lang="en-US" sz="1600" smtClean="0"/>
+              <a:rPr lang="en-US" sz="1600" dirty="0" smtClean="0"/>
               <a:t>Operational System Utilities</a:t>
             </a:r>
           </a:p>
@@ -16835,7 +16839,7 @@
               </a:tabLst>
             </a:pPr>
             <a:r>
-              <a:rPr lang="en-US" sz="1600" smtClean="0"/>
+              <a:rPr lang="en-US" sz="1600" dirty="0" smtClean="0"/>
               <a:t>Reversion Detection</a:t>
             </a:r>
           </a:p>
@@ -16875,7 +16879,7 @@
               </a:tabLst>
             </a:pPr>
             <a:r>
-              <a:rPr lang="en-US" sz="1400" smtClean="0"/>
+              <a:rPr lang="en-US" sz="1400" dirty="0" smtClean="0"/>
               <a:t>Detection of reversion of reference, rmap, or instrument context files when changing pipeline context</a:t>
             </a:r>
           </a:p>
@@ -16915,7 +16919,7 @@
               </a:tabLst>
             </a:pPr>
             <a:r>
-              <a:rPr lang="en-US" sz="1400" smtClean="0"/>
+              <a:rPr lang="en-US" sz="1400" dirty="0" smtClean="0"/>
               <a:t>Prevents inadvertent undoing of previous updates by uncoordinated modifications</a:t>
             </a:r>
           </a:p>
@@ -16955,7 +16959,7 @@
               </a:tabLst>
             </a:pPr>
             <a:r>
-              <a:rPr lang="en-US" sz="1600" smtClean="0"/>
+              <a:rPr lang="en-US" sz="1600" dirty="0" smtClean="0"/>
               <a:t>Affected Datasets</a:t>
             </a:r>
           </a:p>
@@ -16995,7 +16999,7 @@
               </a:tabLst>
             </a:pPr>
             <a:r>
-              <a:rPr lang="en-US" sz="1400" smtClean="0"/>
+              <a:rPr lang="en-US" sz="1400" dirty="0" smtClean="0"/>
               <a:t>Get list of datasets affected by pipeline context change</a:t>
             </a:r>
           </a:p>
@@ -17035,7 +17039,7 @@
               </a:tabLst>
             </a:pPr>
             <a:r>
-              <a:rPr lang="en-US" sz="1400" smtClean="0"/>
+              <a:rPr lang="en-US" sz="1400" dirty="0" smtClean="0"/>
               <a:t>Useful for identifying data sets needing reprocessing</a:t>
             </a:r>
           </a:p>
@@ -17075,7 +17079,7 @@
               </a:tabLst>
             </a:pPr>
             <a:r>
-              <a:rPr lang="en-US" sz="1400" smtClean="0"/>
+              <a:rPr lang="en-US" sz="1400" dirty="0" smtClean="0"/>
               <a:t>Design Issue: Some table reference files have rows selected by additional selection criteria. A change to the file does not necessarily affect all data sets that use that reference table. This utility must examine the contents of these tables to determine which data sets are affected (and store the selection criteria for the rows in rmaps for this utility to use in doing such checks)</a:t>
             </a:r>
           </a:p>
@@ -17115,7 +17119,7 @@
               </a:tabLst>
             </a:pPr>
             <a:r>
-              <a:rPr lang="en-US" sz="1400" smtClean="0"/>
+              <a:rPr lang="en-US" sz="1400" dirty="0" smtClean="0"/>
               <a:t>Design Issue: Selection based on severity of change of reference file change. Some desire the ability of selecting only data sets for which the change in reference files is considered to be above some specified threshold (e.g., moderate, or severe).</a:t>
             </a:r>
           </a:p>
@@ -17155,7 +17159,7 @@
               </a:tabLst>
             </a:pPr>
             <a:r>
-              <a:rPr lang="en-US" sz="1000" smtClean="0"/>
+              <a:rPr lang="en-US" sz="1000" dirty="0" smtClean="0"/>
               <a:t>Very difficult problem to do correctly and make practical</a:t>
             </a:r>
           </a:p>
@@ -17195,10 +17199,9 @@
               </a:tabLst>
             </a:pPr>
             <a:r>
-              <a:rPr lang="en-US" sz="1000" smtClean="0"/>
+              <a:rPr lang="en-US" sz="1000" dirty="0" smtClean="0"/>
               <a:t>Awaiting well defined concept for how this should work before accepting as a requirement</a:t>
             </a:r>
-            <a:endParaRPr lang="en-US" sz="1000" dirty="0" smtClean="0"/>
           </a:p>
         </p:txBody>
       </p:sp>
@@ -17364,7 +17367,7 @@
         </p:nvSpPr>
         <p:spPr>
           <a:xfrm>
-            <a:off x="457200" y="914400"/>
+            <a:off x="457200" y="990600"/>
             <a:ext cx="8216900" cy="5367338"/>
           </a:xfrm>
           <a:prstGeom prst="rect">
@@ -19078,7 +19081,7 @@
         </p:nvSpPr>
         <p:spPr>
           <a:xfrm>
-            <a:off x="1219200" y="1143000"/>
+            <a:off x="1219200" y="1066800"/>
             <a:ext cx="6478587" cy="4953000"/>
           </a:xfrm>
         </p:spPr>
@@ -19127,83 +19130,100 @@
               <a:rPr lang="en-US" sz="1600" dirty="0" smtClean="0"/>
               <a:t>) </a:t>
             </a:r>
+            <a:endParaRPr lang="en-US" sz="1600" dirty="0" smtClean="0"/>
           </a:p>
           <a:p>
             <a:pPr lvl="1"/>
             <a:r>
               <a:rPr lang="en-US" sz="1600" dirty="0" smtClean="0"/>
+              <a:t>Command Line</a:t>
+            </a:r>
+            <a:endParaRPr lang="en-US" sz="1600" dirty="0" smtClean="0"/>
+          </a:p>
+          <a:p>
+            <a:pPr lvl="2"/>
+            <a:r>
+              <a:rPr lang="en-US" sz="1400" dirty="0" smtClean="0"/>
               <a:t>Integration with STPIPE</a:t>
             </a:r>
           </a:p>
           <a:p>
+            <a:pPr lvl="2"/>
+            <a:r>
+              <a:rPr lang="en-US" sz="1400" dirty="0"/>
+              <a:t>JWST build-1 rules and references</a:t>
+            </a:r>
+          </a:p>
+          <a:p>
+            <a:pPr lvl="2"/>
+            <a:r>
+              <a:rPr lang="en-US" sz="1400" dirty="0" smtClean="0"/>
+              <a:t>HST rules generation and test (for now)</a:t>
+            </a:r>
+          </a:p>
+          <a:p>
+            <a:pPr lvl="2"/>
+            <a:r>
+              <a:rPr lang="en-US" sz="1400" dirty="0" smtClean="0"/>
+              <a:t>HST file certification</a:t>
+            </a:r>
+          </a:p>
+          <a:p>
             <a:pPr lvl="1"/>
             <a:r>
-              <a:rPr lang="en-US" sz="1600" dirty="0"/>
-              <a:t>JWST build-1 rules and references</a:t>
-            </a:r>
-          </a:p>
-          <a:p>
-            <a:pPr lvl="1"/>
-            <a:r>
               <a:rPr lang="en-US" sz="1600" dirty="0" smtClean="0"/>
-              <a:t>HST rules generation and test (for now)</a:t>
-            </a:r>
-          </a:p>
-          <a:p>
-            <a:pPr lvl="1"/>
-            <a:r>
-              <a:rPr lang="en-US" sz="1600" dirty="0" smtClean="0"/>
-              <a:t>HST file certification</a:t>
-            </a:r>
-          </a:p>
-          <a:p>
-            <a:pPr lvl="1"/>
-            <a:r>
-              <a:rPr lang="en-US" sz="1600" dirty="0" smtClean="0"/>
+              <a:t>Web</a:t>
+            </a:r>
+          </a:p>
+          <a:p>
+            <a:pPr lvl="2"/>
+            <a:r>
+              <a:rPr lang="en-US" sz="1400" dirty="0" smtClean="0"/>
               <a:t>File browsing</a:t>
             </a:r>
           </a:p>
           <a:p>
-            <a:pPr lvl="1"/>
-            <a:r>
-              <a:rPr lang="en-US" sz="1600" dirty="0" smtClean="0"/>
+            <a:pPr lvl="2"/>
+            <a:r>
+              <a:rPr lang="en-US" sz="1400" dirty="0" smtClean="0"/>
               <a:t>File differencing</a:t>
             </a:r>
           </a:p>
           <a:p>
-            <a:pPr lvl="1"/>
-            <a:r>
-              <a:rPr lang="en-US" sz="1600" dirty="0"/>
-              <a:t>Web Best Reference prototypes</a:t>
-            </a:r>
-          </a:p>
-          <a:p>
-            <a:pPr lvl="1"/>
-            <a:r>
-              <a:rPr lang="en-US" sz="1600" dirty="0" smtClean="0"/>
-              <a:t>Simple File Submission </a:t>
-            </a:r>
-          </a:p>
-          <a:p>
-            <a:pPr lvl="1"/>
-            <a:r>
-              <a:rPr lang="en-US" sz="1600" dirty="0" smtClean="0"/>
+            <a:pPr lvl="2"/>
+            <a:r>
+              <a:rPr lang="en-US" sz="1400" dirty="0" smtClean="0"/>
+              <a:t>Interactive Web Best Reference prototypes</a:t>
+            </a:r>
+          </a:p>
+          <a:p>
+            <a:pPr lvl="2"/>
+            <a:r>
+              <a:rPr lang="en-US" sz="1400" dirty="0" smtClean="0"/>
+              <a:t>Simple File Submission</a:t>
+            </a:r>
+          </a:p>
+          <a:p>
+            <a:pPr lvl="2"/>
+            <a:r>
+              <a:rPr lang="en-US" sz="1400" dirty="0" smtClean="0"/>
               <a:t>Batch File Submission (prototype,  needs generalization)</a:t>
             </a:r>
           </a:p>
           <a:p>
-            <a:pPr lvl="1"/>
-            <a:r>
-              <a:rPr lang="en-US" sz="1600" dirty="0" smtClean="0"/>
+            <a:pPr lvl="2"/>
+            <a:r>
+              <a:rPr lang="en-US" sz="1400" dirty="0" smtClean="0"/>
               <a:t>Automatic Instrument, Pipeline Context Rules Updates</a:t>
             </a:r>
           </a:p>
           <a:p>
-            <a:pPr lvl="1"/>
-            <a:r>
-              <a:rPr lang="en-US" sz="1600" dirty="0" smtClean="0"/>
+            <a:pPr lvl="2"/>
+            <a:r>
+              <a:rPr lang="en-US" sz="1400" dirty="0" smtClean="0"/>
               <a:t>Reference File Retrieval Service</a:t>
             </a:r>
+            <a:endParaRPr lang="en-US" sz="1400" dirty="0" smtClean="0"/>
           </a:p>
         </p:txBody>
       </p:sp>
@@ -19525,11 +19545,7 @@
             </a:r>
             <a:r>
               <a:rPr lang="en-US" sz="1400" dirty="0" smtClean="0"/>
-              <a:t>which </a:t>
-            </a:r>
-            <a:r>
-              <a:rPr lang="en-US" sz="1400" dirty="0" smtClean="0"/>
-              <a:t>data sets in a list </a:t>
+              <a:t>which data sets in a list </a:t>
             </a:r>
             <a:r>
               <a:rPr lang="en-US" sz="1400" dirty="0"/>
@@ -23848,8 +23864,8 @@
         </p:nvSpPr>
         <p:spPr>
           <a:xfrm>
-            <a:off x="1371600" y="1371600"/>
-            <a:ext cx="6553200" cy="4588052"/>
+            <a:off x="1143000" y="1295400"/>
+            <a:ext cx="6553200" cy="4003276"/>
           </a:xfrm>
           <a:prstGeom prst="rect">
             <a:avLst/>
@@ -23862,7 +23878,7 @@
           <a:lstStyle/>
           <a:p>
             <a:r>
-              <a:rPr lang="tr-TR" sz="1600" dirty="0" err="1">
+              <a:rPr lang="tr-TR" sz="1400" dirty="0" err="1">
                 <a:solidFill>
                   <a:schemeClr val="tx1"/>
                 </a:solidFill>
@@ -23871,7 +23887,7 @@
               <a:t>header</a:t>
             </a:r>
             <a:r>
-              <a:rPr lang="tr-TR" sz="1600" dirty="0">
+              <a:rPr lang="tr-TR" sz="1400" dirty="0">
                 <a:solidFill>
                   <a:schemeClr val="tx1"/>
                 </a:solidFill>
@@ -23882,7 +23898,7 @@
           </a:p>
           <a:p>
             <a:r>
-              <a:rPr lang="tr-TR" sz="1600" dirty="0">
+              <a:rPr lang="tr-TR" sz="1400" dirty="0">
                 <a:solidFill>
                   <a:schemeClr val="tx1"/>
                 </a:solidFill>
@@ -23891,7 +23907,7 @@
               <a:t>    '</a:t>
             </a:r>
             <a:r>
-              <a:rPr lang="tr-TR" sz="1600" dirty="0" err="1">
+              <a:rPr lang="tr-TR" sz="1400" dirty="0" err="1">
                 <a:solidFill>
                   <a:schemeClr val="tx1"/>
                 </a:solidFill>
@@ -23900,7 +23916,7 @@
               <a:t>derived_from</a:t>
             </a:r>
             <a:r>
-              <a:rPr lang="tr-TR" sz="1600" dirty="0">
+              <a:rPr lang="tr-TR" sz="1400" dirty="0">
                 <a:solidFill>
                   <a:schemeClr val="tx1"/>
                 </a:solidFill>
@@ -23909,7 +23925,7 @@
               <a:t>' : '</a:t>
             </a:r>
             <a:r>
-              <a:rPr lang="tr-TR" sz="1600" dirty="0" err="1">
+              <a:rPr lang="tr-TR" sz="1400" dirty="0" err="1">
                 <a:solidFill>
                   <a:schemeClr val="tx1"/>
                 </a:solidFill>
@@ -23918,7 +23934,7 @@
               <a:t>cloning</a:t>
             </a:r>
             <a:r>
-              <a:rPr lang="tr-TR" sz="1600" dirty="0">
+              <a:rPr lang="tr-TR" sz="1400" dirty="0">
                 <a:solidFill>
                   <a:schemeClr val="tx1"/>
                 </a:solidFill>
@@ -23927,7 +23943,7 @@
               <a:t> </a:t>
             </a:r>
             <a:r>
-              <a:rPr lang="tr-TR" sz="1600" dirty="0" err="1">
+              <a:rPr lang="tr-TR" sz="1400" dirty="0" err="1">
                 <a:solidFill>
                   <a:schemeClr val="tx1"/>
                 </a:solidFill>
@@ -23936,7 +23952,7 @@
               <a:t>tool</a:t>
             </a:r>
             <a:r>
-              <a:rPr lang="tr-TR" sz="1600" dirty="0">
+              <a:rPr lang="tr-TR" sz="1400" dirty="0">
                 <a:solidFill>
                   <a:schemeClr val="tx1"/>
                 </a:solidFill>
@@ -23947,7 +23963,7 @@
           </a:p>
           <a:p>
             <a:r>
-              <a:rPr lang="tr-TR" sz="1600" dirty="0">
+              <a:rPr lang="tr-TR" sz="1400" dirty="0">
                 <a:solidFill>
                   <a:schemeClr val="tx1"/>
                 </a:solidFill>
@@ -23956,7 +23972,7 @@
               <a:t>    '</a:t>
             </a:r>
             <a:r>
-              <a:rPr lang="tr-TR" sz="1600" dirty="0" err="1">
+              <a:rPr lang="tr-TR" sz="1400" dirty="0" err="1">
                 <a:solidFill>
                   <a:schemeClr val="tx1"/>
                 </a:solidFill>
@@ -23965,7 +23981,7 @@
               <a:t>description</a:t>
             </a:r>
             <a:r>
-              <a:rPr lang="tr-TR" sz="1600" dirty="0">
+              <a:rPr lang="tr-TR" sz="1400" dirty="0">
                 <a:solidFill>
                   <a:schemeClr val="tx1"/>
                 </a:solidFill>
@@ -23974,7 +23990,7 @@
               <a:t>' : '</a:t>
             </a:r>
             <a:r>
-              <a:rPr lang="tr-TR" sz="1600" dirty="0" err="1">
+              <a:rPr lang="tr-TR" sz="1400" dirty="0" err="1">
                 <a:solidFill>
                   <a:schemeClr val="tx1"/>
                 </a:solidFill>
@@ -23983,7 +23999,7 @@
               <a:t>rules</a:t>
             </a:r>
             <a:r>
-              <a:rPr lang="tr-TR" sz="1600" dirty="0">
+              <a:rPr lang="tr-TR" sz="1400" dirty="0">
                 <a:solidFill>
                   <a:schemeClr val="tx1"/>
                 </a:solidFill>
@@ -23992,7 +24008,7 @@
               <a:t> </a:t>
             </a:r>
             <a:r>
-              <a:rPr lang="tr-TR" sz="1600" dirty="0" err="1">
+              <a:rPr lang="tr-TR" sz="1400" dirty="0" err="1">
                 <a:solidFill>
                   <a:schemeClr val="tx1"/>
                 </a:solidFill>
@@ -24001,7 +24017,7 @@
               <a:t>from</a:t>
             </a:r>
             <a:r>
-              <a:rPr lang="tr-TR" sz="1600" dirty="0">
+              <a:rPr lang="tr-TR" sz="1400" dirty="0">
                 <a:solidFill>
                   <a:schemeClr val="tx1"/>
                 </a:solidFill>
@@ -24010,7 +24026,7 @@
               <a:t> </a:t>
             </a:r>
             <a:r>
-              <a:rPr lang="tr-TR" sz="1600" dirty="0" err="1">
+              <a:rPr lang="tr-TR" sz="1400" dirty="0" err="1">
                 <a:solidFill>
                   <a:schemeClr val="tx1"/>
                 </a:solidFill>
@@ -24019,7 +24035,7 @@
               <a:t>clone_directive.txt</a:t>
             </a:r>
             <a:r>
-              <a:rPr lang="tr-TR" sz="1600" dirty="0">
+              <a:rPr lang="tr-TR" sz="1400" dirty="0">
                 <a:solidFill>
                   <a:schemeClr val="tx1"/>
                 </a:solidFill>
@@ -24030,7 +24046,7 @@
           </a:p>
           <a:p>
             <a:r>
-              <a:rPr lang="tr-TR" sz="1600" dirty="0">
+              <a:rPr lang="tr-TR" sz="1400" dirty="0">
                 <a:solidFill>
                   <a:schemeClr val="tx1"/>
                 </a:solidFill>
@@ -24039,7 +24055,7 @@
               <a:t>    '</a:t>
             </a:r>
             <a:r>
-              <a:rPr lang="tr-TR" sz="1600" dirty="0" err="1">
+              <a:rPr lang="tr-TR" sz="1400" dirty="0" err="1">
                 <a:solidFill>
                   <a:schemeClr val="tx1"/>
                 </a:solidFill>
@@ -24048,7 +24064,7 @@
               <a:t>mapping</a:t>
             </a:r>
             <a:r>
-              <a:rPr lang="tr-TR" sz="1600" dirty="0">
+              <a:rPr lang="tr-TR" sz="1400" dirty="0">
                 <a:solidFill>
                   <a:schemeClr val="tx1"/>
                 </a:solidFill>
@@ -24059,7 +24075,7 @@
           </a:p>
           <a:p>
             <a:r>
-              <a:rPr lang="tr-TR" sz="1600" dirty="0">
+              <a:rPr lang="tr-TR" sz="1400" dirty="0">
                 <a:solidFill>
                   <a:schemeClr val="tx1"/>
                 </a:solidFill>
@@ -24070,7 +24086,7 @@
           </a:p>
           <a:p>
             <a:r>
-              <a:rPr lang="tr-TR" sz="1600" dirty="0">
+              <a:rPr lang="tr-TR" sz="1400" dirty="0">
                 <a:solidFill>
                   <a:schemeClr val="tx1"/>
                 </a:solidFill>
@@ -24079,7 +24095,7 @@
               <a:t>    '</a:t>
             </a:r>
             <a:r>
-              <a:rPr lang="tr-TR" sz="1600" dirty="0" err="1">
+              <a:rPr lang="tr-TR" sz="1400" dirty="0" err="1">
                 <a:solidFill>
                   <a:schemeClr val="tx1"/>
                 </a:solidFill>
@@ -24088,7 +24104,7 @@
               <a:t>observatory</a:t>
             </a:r>
             <a:r>
-              <a:rPr lang="tr-TR" sz="1600" dirty="0">
+              <a:rPr lang="tr-TR" sz="1400" dirty="0">
                 <a:solidFill>
                   <a:schemeClr val="tx1"/>
                 </a:solidFill>
@@ -24099,7 +24115,7 @@
           </a:p>
           <a:p>
             <a:r>
-              <a:rPr lang="tr-TR" sz="1600" dirty="0">
+              <a:rPr lang="tr-TR" sz="1400" dirty="0">
                 <a:solidFill>
                   <a:schemeClr val="tx1"/>
                 </a:solidFill>
@@ -24108,7 +24124,7 @@
               <a:t>    '</a:t>
             </a:r>
             <a:r>
-              <a:rPr lang="tr-TR" sz="1600" dirty="0" err="1">
+              <a:rPr lang="tr-TR" sz="1400" dirty="0" err="1">
                 <a:solidFill>
                   <a:schemeClr val="tx1"/>
                 </a:solidFill>
@@ -24117,7 +24133,7 @@
               <a:t>parkey</a:t>
             </a:r>
             <a:r>
-              <a:rPr lang="tr-TR" sz="1600" dirty="0">
+              <a:rPr lang="tr-TR" sz="1400" dirty="0">
                 <a:solidFill>
                   <a:schemeClr val="tx1"/>
                 </a:solidFill>
@@ -24128,7 +24144,7 @@
           </a:p>
           <a:p>
             <a:r>
-              <a:rPr lang="tr-TR" sz="1600" dirty="0">
+              <a:rPr lang="tr-TR" sz="1400" dirty="0">
                 <a:solidFill>
                   <a:schemeClr val="tx1"/>
                 </a:solidFill>
@@ -24139,7 +24155,7 @@
           </a:p>
           <a:p>
             <a:r>
-              <a:rPr lang="tr-TR" sz="1600" dirty="0">
+              <a:rPr lang="tr-TR" sz="1400" dirty="0">
                 <a:solidFill>
                   <a:schemeClr val="tx1"/>
                 </a:solidFill>
@@ -24149,7 +24165,7 @@
             </a:r>
           </a:p>
           <a:p>
-            <a:endParaRPr lang="tr-TR" sz="1600" dirty="0">
+            <a:endParaRPr lang="tr-TR" sz="1400" dirty="0">
               <a:solidFill>
                 <a:schemeClr val="tx1"/>
               </a:solidFill>
@@ -24158,7 +24174,7 @@
           </a:p>
           <a:p>
             <a:r>
-              <a:rPr lang="tr-TR" sz="1600" dirty="0" err="1">
+              <a:rPr lang="tr-TR" sz="1400" dirty="0" err="1">
                 <a:solidFill>
                   <a:schemeClr val="tx1"/>
                 </a:solidFill>
@@ -24167,58 +24183,58 @@
               <a:t>selector</a:t>
             </a:r>
             <a:r>
+              <a:rPr lang="tr-TR" sz="1400" dirty="0">
+                <a:solidFill>
+                  <a:schemeClr val="tx1"/>
+                </a:solidFill>
+                <a:latin typeface="Helvetica"/>
+              </a:rPr>
+              <a:t> = {</a:t>
+            </a:r>
+          </a:p>
+          <a:p>
+            <a:r>
+              <a:rPr lang="tr-TR" sz="1400" dirty="0">
+                <a:solidFill>
+                  <a:schemeClr val="tx1"/>
+                </a:solidFill>
+                <a:latin typeface="Helvetica"/>
+              </a:rPr>
+              <a:t>    'FGS' : 'jwst_fgs_0000.imap',</a:t>
+            </a:r>
+          </a:p>
+          <a:p>
+            <a:r>
+              <a:rPr lang="tr-TR" sz="1400" dirty="0">
+                <a:solidFill>
+                  <a:schemeClr val="tx1"/>
+                </a:solidFill>
+                <a:latin typeface="Helvetica"/>
+              </a:rPr>
+              <a:t>    </a:t>
+            </a:r>
+            <a:r>
+              <a:rPr lang="tr-TR" sz="1600" b="1" dirty="0">
+                <a:solidFill>
+                  <a:schemeClr val="tx1"/>
+                </a:solidFill>
+                <a:latin typeface="Helvetica"/>
+              </a:rPr>
+              <a:t>'MIRI' : 'jwst_miri_0000.imap'</a:t>
+            </a:r>
+            <a:r>
               <a:rPr lang="tr-TR" sz="1600" dirty="0">
                 <a:solidFill>
                   <a:schemeClr val="tx1"/>
                 </a:solidFill>
                 <a:latin typeface="Helvetica"/>
               </a:rPr>
-              <a:t> = {</a:t>
-            </a:r>
-          </a:p>
-          <a:p>
-            <a:r>
-              <a:rPr lang="tr-TR" sz="1600" dirty="0">
-                <a:solidFill>
-                  <a:schemeClr val="tx1"/>
-                </a:solidFill>
-                <a:latin typeface="Helvetica"/>
-              </a:rPr>
-              <a:t>    'FGS' : 'jwst_fgs_0000.imap',</a:t>
-            </a:r>
-          </a:p>
-          <a:p>
-            <a:r>
-              <a:rPr lang="tr-TR" sz="1600" dirty="0">
-                <a:solidFill>
-                  <a:schemeClr val="tx1"/>
-                </a:solidFill>
-                <a:latin typeface="Helvetica"/>
-              </a:rPr>
-              <a:t>    </a:t>
-            </a:r>
-            <a:r>
-              <a:rPr lang="tr-TR" sz="1800" b="1" dirty="0">
-                <a:solidFill>
-                  <a:schemeClr val="tx1"/>
-                </a:solidFill>
-                <a:latin typeface="Helvetica"/>
-              </a:rPr>
-              <a:t>'MIRI' : 'jwst_miri_0000.imap'</a:t>
-            </a:r>
-            <a:r>
-              <a:rPr lang="tr-TR" sz="1800" dirty="0">
-                <a:solidFill>
-                  <a:schemeClr val="tx1"/>
-                </a:solidFill>
-                <a:latin typeface="Helvetica"/>
-              </a:rPr>
               <a:t>,</a:t>
             </a:r>
           </a:p>
           <a:p>
             <a:r>
-              <a:rPr lang="tr-TR" sz="1600" dirty="0">
+              <a:rPr lang="tr-TR" sz="1400" dirty="0">
                 <a:solidFill>
                   <a:schemeClr val="tx1"/>
                 </a:solidFill>
@@ -24229,7 +24245,7 @@
           </a:p>
           <a:p>
             <a:r>
-              <a:rPr lang="tr-TR" sz="1600" dirty="0">
+              <a:rPr lang="tr-TR" sz="1400" dirty="0">
                 <a:solidFill>
                   <a:schemeClr val="tx1"/>
                 </a:solidFill>
@@ -24240,7 +24256,7 @@
           </a:p>
           <a:p>
             <a:r>
-              <a:rPr lang="tr-TR" sz="1600" dirty="0">
+              <a:rPr lang="tr-TR" sz="1400" dirty="0">
                 <a:solidFill>
                   <a:schemeClr val="tx1"/>
                 </a:solidFill>
@@ -24251,7 +24267,7 @@
           </a:p>
           <a:p>
             <a:r>
-              <a:rPr lang="tr-TR" sz="1600" dirty="0">
+              <a:rPr lang="tr-TR" sz="1400" dirty="0">
                 <a:solidFill>
                   <a:schemeClr val="tx1"/>
                 </a:solidFill>
@@ -24261,7 +24277,7 @@
             </a:r>
           </a:p>
           <a:p>
-            <a:endParaRPr lang="en-US" sz="1600" dirty="0" smtClean="0">
+            <a:endParaRPr lang="en-US" sz="1400" dirty="0" smtClean="0">
               <a:solidFill>
                 <a:schemeClr val="tx1"/>
               </a:solidFill>
@@ -24278,7 +24294,7 @@
         </p:nvSpPr>
         <p:spPr>
           <a:xfrm>
-            <a:off x="3276600" y="914400"/>
+            <a:off x="3276600" y="838200"/>
             <a:ext cx="1797848" cy="309958"/>
           </a:xfrm>
           <a:prstGeom prst="rect">
@@ -24311,8 +24327,8 @@
         </p:nvSpPr>
         <p:spPr>
           <a:xfrm>
-            <a:off x="990600" y="5867400"/>
-            <a:ext cx="7543800" cy="556179"/>
+            <a:off x="990600" y="5486400"/>
+            <a:ext cx="7543800" cy="579262"/>
           </a:xfrm>
           <a:prstGeom prst="rect">
             <a:avLst/>
@@ -24324,26 +24340,133 @@
           </a:bodyPr>
           <a:lstStyle/>
           <a:p>
-            <a:r>
-              <a:rPr lang="en-US" sz="1000" dirty="0" smtClean="0">
-                <a:solidFill>
-                  <a:schemeClr val="tx1"/>
-                </a:solidFill>
-                <a:latin typeface="Helvetica"/>
-              </a:rPr>
-              <a:t>Pipeline Context files,  like all CRDS mapping files,  has a versioned name.</a:t>
-            </a:r>
-          </a:p>
-          <a:p>
-            <a:r>
-              <a:rPr lang="en-US" sz="1000" dirty="0" smtClean="0">
-                <a:solidFill>
-                  <a:schemeClr val="tx1"/>
-                </a:solidFill>
-                <a:latin typeface="Helvetica"/>
-              </a:rPr>
-              <a:t>One Pipeline Context file (and the set of referred mappings) defines the configuration of CRDS,  replacing the state of the CDBS database,</a:t>
-            </a:r>
+            <a:pPr marL="171450" indent="-171450">
+              <a:buFont typeface="Arial"/>
+              <a:buChar char="•"/>
+            </a:pPr>
+            <a:r>
+              <a:rPr lang="en-US" sz="1050" dirty="0" smtClean="0">
+                <a:solidFill>
+                  <a:schemeClr val="accent2">
+                    <a:lumMod val="60000"/>
+                    <a:lumOff val="40000"/>
+                  </a:schemeClr>
+                </a:solidFill>
+                <a:latin typeface="Helvetica"/>
+              </a:rPr>
+              <a:t>All CRDS rules files have versioned names:  e.g.  jwst_0000.pmap</a:t>
+            </a:r>
+            <a:endParaRPr lang="en-US" sz="1050" dirty="0" smtClean="0">
+              <a:solidFill>
+                <a:schemeClr val="accent2">
+                  <a:lumMod val="60000"/>
+                  <a:lumOff val="40000"/>
+                </a:schemeClr>
+              </a:solidFill>
+              <a:latin typeface="Helvetica"/>
+            </a:endParaRPr>
+          </a:p>
+          <a:p>
+            <a:pPr marL="171450" indent="-171450">
+              <a:buFont typeface="Arial"/>
+              <a:buChar char="•"/>
+            </a:pPr>
+            <a:r>
+              <a:rPr lang="en-US" sz="1050" dirty="0" smtClean="0">
+                <a:solidFill>
+                  <a:schemeClr val="accent2">
+                    <a:lumMod val="60000"/>
+                    <a:lumOff val="40000"/>
+                  </a:schemeClr>
+                </a:solidFill>
+                <a:latin typeface="Helvetica"/>
+              </a:rPr>
+              <a:t>One Pipeline Context file (and the set of referred mappings) defines the configuration of </a:t>
+            </a:r>
+            <a:r>
+              <a:rPr lang="en-US" sz="1050" dirty="0" smtClean="0">
+                <a:solidFill>
+                  <a:schemeClr val="accent2">
+                    <a:lumMod val="60000"/>
+                    <a:lumOff val="40000"/>
+                  </a:schemeClr>
+                </a:solidFill>
+                <a:latin typeface="Helvetica"/>
+              </a:rPr>
+              <a:t>CRDS</a:t>
+            </a:r>
+            <a:endParaRPr lang="en-US" sz="1050" dirty="0">
+              <a:solidFill>
+                <a:schemeClr val="accent2">
+                  <a:lumMod val="60000"/>
+                  <a:lumOff val="40000"/>
+                </a:schemeClr>
+              </a:solidFill>
+              <a:latin typeface="Helvetica"/>
+            </a:endParaRPr>
+          </a:p>
+          <a:p>
+            <a:pPr marL="171450" indent="-171450">
+              <a:buFont typeface="Arial"/>
+              <a:buChar char="•"/>
+            </a:pPr>
+            <a:r>
+              <a:rPr lang="en-US" sz="1050" dirty="0" smtClean="0">
+                <a:solidFill>
+                  <a:schemeClr val="accent2">
+                    <a:lumMod val="60000"/>
+                    <a:lumOff val="40000"/>
+                  </a:schemeClr>
+                </a:solidFill>
+                <a:latin typeface="Helvetica"/>
+              </a:rPr>
+              <a:t>Replaces</a:t>
+            </a:r>
+            <a:r>
+              <a:rPr lang="en-US" sz="1050" dirty="0" smtClean="0">
+                <a:solidFill>
+                  <a:schemeClr val="accent2">
+                    <a:lumMod val="60000"/>
+                    <a:lumOff val="40000"/>
+                  </a:schemeClr>
+                </a:solidFill>
+                <a:latin typeface="Helvetica"/>
+              </a:rPr>
+              <a:t> </a:t>
+            </a:r>
+            <a:r>
+              <a:rPr lang="en-US" sz="1050" dirty="0" smtClean="0">
+                <a:solidFill>
+                  <a:schemeClr val="accent2">
+                    <a:lumMod val="60000"/>
+                    <a:lumOff val="40000"/>
+                  </a:schemeClr>
+                </a:solidFill>
+                <a:latin typeface="Helvetica"/>
+              </a:rPr>
+              <a:t>the state of the CDBS </a:t>
+            </a:r>
+            <a:r>
+              <a:rPr lang="en-US" sz="1050" dirty="0" smtClean="0">
+                <a:solidFill>
+                  <a:schemeClr val="accent2">
+                    <a:lumMod val="60000"/>
+                    <a:lumOff val="40000"/>
+                  </a:schemeClr>
+                </a:solidFill>
+                <a:latin typeface="Helvetica"/>
+              </a:rPr>
+              <a:t>database.</a:t>
+            </a:r>
+            <a:endParaRPr lang="en-US" sz="1050" dirty="0" smtClean="0">
+              <a:solidFill>
+                <a:schemeClr val="accent2">
+                  <a:lumMod val="60000"/>
+                  <a:lumOff val="40000"/>
+                </a:schemeClr>
+              </a:solidFill>
+              <a:latin typeface="Helvetica"/>
+            </a:endParaRPr>
           </a:p>
         </p:txBody>
       </p:sp>

</xml_diff>

<commit_message>
Updated slides with Joe and Gretchen's comments.
git-svn-id: https://aeon.stsci.edu/ssb/svn/crds/trunk@763 0d8f46c8-9b30-49d0-b470-0f6283dc92e8
</commit_message>
<xml_diff>
--- a/docs/DMS_SDR2_09_CRDS_final.pptx
+++ b/docs/DMS_SDR2_09_CRDS_final.pptx
@@ -297,7 +297,7 @@
             </a:pPr>
             <a:fld id="{21EC3080-00C3-4840-8B4C-5199FEA2FD44}" type="datetime1">
               <a:rPr lang="en-US" smtClean="0"/>
-              <a:t>Nov 27 2012</a:t>
+              <a:t>Nov 29 2012</a:t>
             </a:fld>
             <a:endParaRPr lang="en-US"/>
           </a:p>
@@ -847,7 +847,7 @@
             </a:pPr>
             <a:fld id="{ED83A886-433E-6F46-86BE-4CE36E3F8C6C}" type="datetime1">
               <a:rPr lang="en-US" smtClean="0"/>
-              <a:t>Nov 27 2012</a:t>
+              <a:t>Nov 29 2012</a:t>
             </a:fld>
             <a:endParaRPr lang="en-US"/>
           </a:p>
@@ -5431,13 +5431,8 @@
           <a:p>
             <a:r>
               <a:rPr lang="en-US" sz="1800" dirty="0" smtClean="0"/>
-              <a:t>Match weights resolve </a:t>
-            </a:r>
-            <a:r>
-              <a:rPr lang="en-US" sz="1800" dirty="0" smtClean="0"/>
-              <a:t>ambiguities from multiple pattern matches.</a:t>
-            </a:r>
-            <a:endParaRPr lang="en-US" sz="1800" dirty="0" smtClean="0"/>
+              <a:t>Match weights resolve ambiguities from multiple pattern matches.</a:t>
+            </a:r>
           </a:p>
           <a:p>
             <a:r>
@@ -6007,15 +6002,7 @@
             <a:pPr lvl="2"/>
             <a:r>
               <a:rPr lang="en-US" dirty="0" smtClean="0"/>
-              <a:t>CRDS client *must* have file storage,  </a:t>
-            </a:r>
-            <a:r>
-              <a:rPr lang="en-US" dirty="0" smtClean="0"/>
-              <a:t>so might </a:t>
-            </a:r>
-            <a:r>
-              <a:rPr lang="en-US" dirty="0" smtClean="0"/>
-              <a:t>as well share.</a:t>
+              <a:t>CRDS client *must* have file storage,  so might as well share.</a:t>
             </a:r>
           </a:p>
           <a:p>
@@ -6730,23 +6717,8 @@
                 </a:solidFill>
                 <a:latin typeface="Helvetica"/>
               </a:rPr>
-              <a:t>Not all reference types are relevant to all instrument </a:t>
-            </a:r>
-            <a:r>
-              <a:rPr lang="en-US" sz="1100" b="1" dirty="0" smtClean="0">
-                <a:solidFill>
-                  <a:srgbClr val="3366FF"/>
-                </a:solidFill>
-                <a:latin typeface="Helvetica"/>
-              </a:rPr>
-              <a:t>modes</a:t>
-            </a:r>
-            <a:endParaRPr lang="en-US" sz="1100" b="1" dirty="0" smtClean="0">
-              <a:solidFill>
-                <a:srgbClr val="3366FF"/>
-              </a:solidFill>
-              <a:latin typeface="Helvetica"/>
-            </a:endParaRPr>
+              <a:t>Not all reference types are relevant to all instrument modes</a:t>
+            </a:r>
           </a:p>
           <a:p>
             <a:pPr marL="171450" indent="-171450">
@@ -7707,17 +7679,7 @@
                 <a:latin typeface="Helvetica"/>
                 <a:sym typeface="Wingdings"/>
               </a:rPr>
-              <a:t>Prevents </a:t>
-            </a:r>
-            <a:r>
-              <a:rPr lang="en-US" sz="1200" b="1" dirty="0" smtClean="0">
-                <a:solidFill>
-                  <a:srgbClr val="3366FF"/>
-                </a:solidFill>
-                <a:latin typeface="Helvetica"/>
-                <a:sym typeface="Wingdings"/>
-              </a:rPr>
-              <a:t>irrelevant parameter values from affecting matching</a:t>
+              <a:t>Prevents irrelevant parameter values from affecting matching</a:t>
             </a:r>
             <a:r>
               <a:rPr lang="en-US" sz="1200" b="1" dirty="0" smtClean="0">
@@ -8155,7 +8117,6 @@
               <a:rPr lang="en-US" dirty="0" smtClean="0"/>
               <a:t>Files are cached client-side to avoid repeat network transfers</a:t>
             </a:r>
-            <a:endParaRPr lang="en-US" sz="1400" dirty="0" smtClean="0"/>
           </a:p>
           <a:p>
             <a:pPr lvl="1"/>
@@ -9281,7 +9242,7 @@
         </p:nvSpPr>
         <p:spPr>
           <a:xfrm>
-            <a:off x="3810000" y="3657600"/>
+            <a:off x="3733800" y="3733800"/>
             <a:ext cx="1752600" cy="248402"/>
           </a:xfrm>
           <a:prstGeom prst="rect">
@@ -9301,8 +9262,23 @@
                 </a:solidFill>
                 <a:latin typeface="Helvetica"/>
               </a:rPr>
-              <a:t>Best References</a:t>
-            </a:r>
+              <a:t>Best </a:t>
+            </a:r>
+            <a:r>
+              <a:rPr lang="en-US" sz="1000" dirty="0" smtClean="0">
+                <a:solidFill>
+                  <a:schemeClr val="tx1"/>
+                </a:solidFill>
+                <a:latin typeface="Helvetica"/>
+              </a:rPr>
+              <a:t>Reference Names</a:t>
+            </a:r>
+            <a:endParaRPr lang="en-US" sz="1000" dirty="0" smtClean="0">
+              <a:solidFill>
+                <a:schemeClr val="tx1"/>
+              </a:solidFill>
+              <a:latin typeface="Helvetica"/>
+            </a:endParaRPr>
           </a:p>
         </p:txBody>
       </p:sp>
@@ -10490,8 +10466,8 @@
         </p:nvSpPr>
         <p:spPr>
           <a:xfrm>
-            <a:off x="5562600" y="4114800"/>
-            <a:ext cx="1447800" cy="248402"/>
+            <a:off x="5638800" y="4114800"/>
+            <a:ext cx="1981200" cy="248402"/>
           </a:xfrm>
           <a:prstGeom prst="rect">
             <a:avLst/>
@@ -10510,8 +10486,23 @@
                 </a:solidFill>
                 <a:latin typeface="Helvetica"/>
               </a:rPr>
-              <a:t>Best References</a:t>
-            </a:r>
+              <a:t>Best </a:t>
+            </a:r>
+            <a:r>
+              <a:rPr lang="en-US" sz="1000" dirty="0" smtClean="0">
+                <a:solidFill>
+                  <a:schemeClr val="tx1"/>
+                </a:solidFill>
+                <a:latin typeface="Helvetica"/>
+              </a:rPr>
+              <a:t>References Names</a:t>
+            </a:r>
+            <a:endParaRPr lang="en-US" sz="1000" dirty="0" smtClean="0">
+              <a:solidFill>
+                <a:schemeClr val="tx1"/>
+              </a:solidFill>
+              <a:latin typeface="Helvetica"/>
+            </a:endParaRPr>
           </a:p>
         </p:txBody>
       </p:sp>
@@ -10977,8 +10968,8 @@
         </p:nvSpPr>
         <p:spPr>
           <a:xfrm>
-            <a:off x="762000" y="1066800"/>
-            <a:ext cx="7239000" cy="4267200"/>
+            <a:off x="457200" y="990600"/>
+            <a:ext cx="8305800" cy="4572000"/>
           </a:xfrm>
         </p:spPr>
         <p:txBody>
@@ -10986,135 +10977,151 @@
           <a:lstStyle/>
           <a:p>
             <a:r>
+              <a:rPr lang="en-US" sz="1600" dirty="0"/>
+              <a:t>Locally Computed </a:t>
+            </a:r>
+            <a:r>
+              <a:rPr lang="en-US" sz="1600" dirty="0" err="1"/>
+              <a:t>Bestrefs</a:t>
+            </a:r>
+            <a:endParaRPr lang="en-US" sz="1600" dirty="0"/>
+          </a:p>
+          <a:p>
+            <a:pPr lvl="1"/>
+            <a:r>
+              <a:rPr lang="en-US" sz="1600" dirty="0"/>
+              <a:t>Same CRDS core library used in STPIPE and CRDS Server</a:t>
+            </a:r>
+          </a:p>
+          <a:p>
+            <a:pPr lvl="1"/>
+            <a:r>
+              <a:rPr lang="en-US" sz="1600" dirty="0"/>
+              <a:t>Best references can be computed directly by the STPIPE process </a:t>
+            </a:r>
+            <a:r>
               <a:rPr lang="en-US" sz="1600" dirty="0" smtClean="0"/>
-              <a:t>CRDS clients cache needed reference files to avoid repeat network transfers.</a:t>
-            </a:r>
-          </a:p>
-          <a:p>
+              <a:t>by calling </a:t>
+            </a:r>
+            <a:r>
+              <a:rPr lang="en-US" sz="1600" dirty="0"/>
+              <a:t>a local CRDS library </a:t>
+            </a:r>
             <a:r>
               <a:rPr lang="en-US" sz="1600" dirty="0" smtClean="0"/>
-              <a:t>As long as client cache is correct,  it doesn’t matter where it came from:</a:t>
+              <a:t>function rather than a network service.</a:t>
+            </a:r>
+            <a:endParaRPr lang="en-US" sz="1600" dirty="0"/>
+          </a:p>
+          <a:p>
+            <a:r>
+              <a:rPr lang="en-US" sz="1600" dirty="0" smtClean="0"/>
+              <a:t>Shared Local File Cache</a:t>
             </a:r>
           </a:p>
           <a:p>
             <a:pPr lvl="1"/>
             <a:r>
               <a:rPr lang="en-US" sz="1600" dirty="0" smtClean="0"/>
-              <a:t>CRDS transparent file retrieval</a:t>
+              <a:t>CRDS clients cache reference files to avoid repeat network transfers.</a:t>
             </a:r>
           </a:p>
           <a:p>
             <a:pPr lvl="1"/>
             <a:r>
               <a:rPr lang="en-US" sz="1600" dirty="0" smtClean="0"/>
-              <a:t>CRDS cache sync command line tool</a:t>
-            </a:r>
+              <a:t>CRDS configuration defines the cache directory for each </a:t>
+            </a:r>
+            <a:r>
+              <a:rPr lang="en-US" sz="1600" dirty="0" smtClean="0"/>
+              <a:t>client/</a:t>
+            </a:r>
+            <a:r>
+              <a:rPr lang="en-US" sz="1600" dirty="0" smtClean="0"/>
+              <a:t>user</a:t>
+            </a:r>
+            <a:r>
+              <a:rPr lang="en-US" sz="1600" dirty="0" smtClean="0"/>
+              <a:t>.</a:t>
+            </a:r>
+            <a:endParaRPr lang="en-US" sz="1600" dirty="0" smtClean="0"/>
           </a:p>
           <a:p>
             <a:pPr lvl="1"/>
             <a:r>
-              <a:rPr lang="en-US" sz="1600" i="1" dirty="0" smtClean="0">
-                <a:solidFill>
-                  <a:srgbClr val="000000"/>
-                </a:solidFill>
-              </a:rPr>
-              <a:t>Network file sharing of CRDS server cache as CRDS client’s cache</a:t>
-            </a:r>
-          </a:p>
-          <a:p>
-            <a:r>
               <a:rPr lang="en-US" sz="1600" dirty="0" smtClean="0"/>
-              <a:t>Server-less mode clients share read-only file </a:t>
+              <a:t>Localized CRDS clients can share a single read only “master” cache which contains all files.</a:t>
+            </a:r>
+          </a:p>
+          <a:p>
+            <a:pPr lvl="1"/>
+            <a:r>
+              <a:rPr lang="en-US" sz="1600" dirty="0" smtClean="0"/>
+              <a:t>Since the shared cache has all files, no explicit network transfers occur.</a:t>
+            </a:r>
+          </a:p>
+          <a:p>
+            <a:pPr lvl="1"/>
+            <a:r>
+              <a:rPr lang="en-US" sz="1600" dirty="0" smtClean="0"/>
+              <a:t>Requires </a:t>
             </a:r>
             <a:r>
               <a:rPr lang="en-US" sz="1600" dirty="0"/>
-              <a:t>cache with server</a:t>
-            </a:r>
-          </a:p>
-          <a:p>
+              <a:t>access to Central Store /</a:t>
+            </a:r>
+            <a:r>
+              <a:rPr lang="en-US" sz="1600" dirty="0" err="1"/>
+              <a:t>grp</a:t>
+            </a:r>
+            <a:r>
+              <a:rPr lang="en-US" sz="1600" dirty="0"/>
+              <a:t>/</a:t>
+            </a:r>
+            <a:r>
+              <a:rPr lang="en-US" sz="1600" dirty="0" err="1"/>
+              <a:t>crds</a:t>
+            </a:r>
+            <a:r>
+              <a:rPr lang="en-US" sz="1600" dirty="0"/>
+              <a:t>/</a:t>
+            </a:r>
+            <a:r>
+              <a:rPr lang="en-US" sz="1600" dirty="0" err="1"/>
+              <a:t>jwst</a:t>
+            </a:r>
+            <a:endParaRPr lang="en-US" sz="1600" dirty="0"/>
+          </a:p>
+          <a:p>
+            <a:pPr lvl="1"/>
+            <a:r>
+              <a:rPr lang="en-US" sz="1600" dirty="0"/>
+              <a:t>Only one copy of reference files </a:t>
+            </a:r>
             <a:r>
               <a:rPr lang="en-US" sz="1600" dirty="0" smtClean="0"/>
-              <a:t>Server-less mode client cache </a:t>
-            </a:r>
-            <a:r>
-              <a:rPr lang="en-US" sz="1600" dirty="0"/>
-              <a:t>fetches </a:t>
-            </a:r>
+              <a:t>needed</a:t>
+            </a:r>
+          </a:p>
+          <a:p>
             <a:r>
               <a:rPr lang="en-US" sz="1600" dirty="0" smtClean="0"/>
-              <a:t>all automatically </a:t>
-            </a:r>
-            <a:r>
-              <a:rPr lang="en-US" sz="1600" dirty="0"/>
-              <a:t>“hit”</a:t>
-            </a:r>
-          </a:p>
-          <a:p>
-            <a:r>
-              <a:rPr lang="en-US" sz="1600" dirty="0"/>
-              <a:t>Same CRDS </a:t>
-            </a:r>
+              <a:t>The CRDS Server does not have to be running for this configuration</a:t>
+            </a:r>
+          </a:p>
+          <a:p>
+            <a:pPr lvl="1"/>
             <a:r>
               <a:rPr lang="en-US" sz="1600" dirty="0" smtClean="0"/>
-              <a:t>core library </a:t>
-            </a:r>
-            <a:r>
-              <a:rPr lang="en-US" sz="1600" dirty="0"/>
-              <a:t>used in STPIPE and CRDS Server</a:t>
-            </a:r>
-          </a:p>
-          <a:p>
-            <a:pPr lvl="1"/>
+              <a:t>No remote </a:t>
+            </a:r>
+            <a:r>
+              <a:rPr lang="en-US" sz="1600" dirty="0" err="1" smtClean="0"/>
+              <a:t>bestrefs</a:t>
+            </a:r>
             <a:r>
               <a:rPr lang="en-US" sz="1600" dirty="0" smtClean="0"/>
-              <a:t>Best references are computed directly by the </a:t>
-            </a:r>
-            <a:r>
-              <a:rPr lang="en-US" sz="1600" dirty="0" err="1" smtClean="0"/>
-              <a:t>stpipe</a:t>
-            </a:r>
-            <a:r>
-              <a:rPr lang="en-US" sz="1600" dirty="0" smtClean="0"/>
-              <a:t> process calling a local CRDS library function</a:t>
-            </a:r>
-          </a:p>
-          <a:p>
-            <a:r>
-              <a:rPr lang="en-US" sz="1600" dirty="0" smtClean="0"/>
-              <a:t>Requires access to Central Store /</a:t>
-            </a:r>
-            <a:r>
-              <a:rPr lang="en-US" sz="1600" dirty="0" err="1" smtClean="0"/>
-              <a:t>grp</a:t>
-            </a:r>
-            <a:r>
-              <a:rPr lang="en-US" sz="1600" dirty="0" smtClean="0"/>
-              <a:t>/</a:t>
-            </a:r>
-            <a:r>
-              <a:rPr lang="en-US" sz="1600" dirty="0" err="1" smtClean="0"/>
-              <a:t>crds</a:t>
-            </a:r>
-            <a:r>
-              <a:rPr lang="en-US" sz="1600" dirty="0" smtClean="0"/>
-              <a:t>/</a:t>
-            </a:r>
-            <a:r>
-              <a:rPr lang="en-US" sz="1600" dirty="0" err="1" smtClean="0"/>
-              <a:t>jwst</a:t>
-            </a:r>
-            <a:endParaRPr lang="en-US" sz="1600" dirty="0" smtClean="0"/>
-          </a:p>
-          <a:p>
-            <a:r>
-              <a:rPr lang="en-US" sz="1600" dirty="0" smtClean="0"/>
-              <a:t>Only one copy of reference files needed</a:t>
-            </a:r>
-          </a:p>
-          <a:p>
-            <a:r>
-              <a:rPr lang="en-US" sz="1600" dirty="0" smtClean="0"/>
-              <a:t>The server does not have to be running</a:t>
+              <a:t> + no explicit file transfers = no server required</a:t>
             </a:r>
           </a:p>
         </p:txBody>
@@ -11138,7 +11145,7 @@
               <a:defRPr/>
             </a:pPr>
             <a:r>
-              <a:rPr lang="en-US" smtClean="0"/>
+              <a:rPr lang="en-US" dirty="0" smtClean="0"/>
               <a:t>S&amp;OC DMS System Design Review</a:t>
             </a:r>
             <a:endParaRPr lang="en-US" dirty="0"/>
@@ -12257,7 +12264,7 @@
         <p:spPr>
           <a:xfrm>
             <a:off x="2362200" y="4191000"/>
-            <a:ext cx="1447800" cy="248402"/>
+            <a:ext cx="1828800" cy="248402"/>
           </a:xfrm>
           <a:prstGeom prst="rect">
             <a:avLst/>
@@ -12276,8 +12283,23 @@
                 </a:solidFill>
                 <a:latin typeface="Helvetica"/>
               </a:rPr>
-              <a:t>Best References</a:t>
-            </a:r>
+              <a:t>Best </a:t>
+            </a:r>
+            <a:r>
+              <a:rPr lang="en-US" sz="1000" dirty="0" smtClean="0">
+                <a:solidFill>
+                  <a:schemeClr val="tx1"/>
+                </a:solidFill>
+                <a:latin typeface="Helvetica"/>
+              </a:rPr>
+              <a:t>Reference Names</a:t>
+            </a:r>
+            <a:endParaRPr lang="en-US" sz="1000" dirty="0" smtClean="0">
+              <a:solidFill>
+                <a:schemeClr val="tx1"/>
+              </a:solidFill>
+              <a:latin typeface="Helvetica"/>
+            </a:endParaRPr>
           </a:p>
         </p:txBody>
       </p:sp>
@@ -13999,21 +14021,8 @@
             <a:pPr lvl="2"/>
             <a:r>
               <a:rPr lang="en-US" sz="1400" dirty="0" smtClean="0"/>
-              <a:t>Update </a:t>
-            </a:r>
-            <a:r>
-              <a:rPr lang="en-US" sz="1400" dirty="0" smtClean="0"/>
-              <a:t>higher </a:t>
-            </a:r>
-            <a:r>
-              <a:rPr lang="en-US" sz="1400" dirty="0" smtClean="0"/>
-              <a:t>level </a:t>
-            </a:r>
-            <a:r>
-              <a:rPr lang="en-US" sz="1400" dirty="0" smtClean="0"/>
-              <a:t>contexts to refer to new rmaps</a:t>
-            </a:r>
-            <a:endParaRPr lang="en-US" sz="1400" dirty="0" smtClean="0"/>
+              <a:t>Update higher level contexts to refer to new rmaps</a:t>
+            </a:r>
           </a:p>
           <a:p>
             <a:pPr lvl="1"/>
@@ -16012,11 +16021,7 @@
             </a:pPr>
             <a:r>
               <a:rPr lang="en-US" sz="1600" dirty="0" smtClean="0"/>
-              <a:t>General </a:t>
-            </a:r>
-            <a:r>
-              <a:rPr lang="en-US" sz="1600" dirty="0" smtClean="0"/>
-              <a:t>Utilities (useful for more than one category)</a:t>
+              <a:t>General Utilities (useful for more than one category)</a:t>
             </a:r>
           </a:p>
           <a:p>
@@ -16583,8 +16588,8 @@
         </p:nvSpPr>
         <p:spPr>
           <a:xfrm>
-            <a:off x="457200" y="914400"/>
-            <a:ext cx="8216900" cy="5367338"/>
+            <a:off x="304800" y="1066800"/>
+            <a:ext cx="8686800" cy="4876800"/>
           </a:xfrm>
           <a:prstGeom prst="rect">
             <a:avLst/>
@@ -16840,7 +16845,15 @@
             </a:pPr>
             <a:r>
               <a:rPr lang="en-US" sz="1600" dirty="0" smtClean="0"/>
-              <a:t>Reversion Detection</a:t>
+              <a:t>Reversion Detection  (</a:t>
+            </a:r>
+            <a:r>
+              <a:rPr lang="en-US" sz="1600" dirty="0" err="1" smtClean="0"/>
+              <a:t>crds.reversions</a:t>
+            </a:r>
+            <a:r>
+              <a:rPr lang="en-US" sz="1600" dirty="0" smtClean="0"/>
+              <a:t>)</a:t>
             </a:r>
           </a:p>
           <a:p>
@@ -16960,7 +16973,15 @@
             </a:pPr>
             <a:r>
               <a:rPr lang="en-US" sz="1600" dirty="0" smtClean="0"/>
-              <a:t>Affected Datasets</a:t>
+              <a:t>Affected Datasets (</a:t>
+            </a:r>
+            <a:r>
+              <a:rPr lang="en-US" sz="1600" dirty="0" err="1" smtClean="0"/>
+              <a:t>crds.reprocess</a:t>
+            </a:r>
+            <a:r>
+              <a:rPr lang="en-US" sz="1600" dirty="0" smtClean="0"/>
+              <a:t>)</a:t>
             </a:r>
           </a:p>
           <a:p>
@@ -17040,7 +17061,11 @@
             </a:pPr>
             <a:r>
               <a:rPr lang="en-US" sz="1400" dirty="0" smtClean="0"/>
-              <a:t>Useful for identifying data sets needing reprocessing</a:t>
+              <a:t>Identifies data sets </a:t>
+            </a:r>
+            <a:r>
+              <a:rPr lang="en-US" sz="1400" smtClean="0"/>
+              <a:t>needing reprocessing</a:t>
             </a:r>
           </a:p>
           <a:p>
@@ -17079,8 +17104,173 @@
               </a:tabLst>
             </a:pPr>
             <a:r>
+              <a:rPr lang="en-US" sz="1400" smtClean="0"/>
+              <a:t>One </a:t>
+            </a:r>
+            <a:r>
               <a:rPr lang="en-US" sz="1400" dirty="0" smtClean="0"/>
-              <a:t>Design Issue: Some table reference files have rows selected by additional selection criteria. A change to the file does not necessarily affect all data sets that use that reference table. This utility must examine the contents of these tables to determine which data sets are affected (and store the selection criteria for the rows in rmaps for this utility to use in doing such checks)</a:t>
+              <a:t>step beyond determining changed reference files:</a:t>
+            </a:r>
+            <a:endParaRPr lang="en-US" sz="400" dirty="0" smtClean="0"/>
+          </a:p>
+          <a:p>
+            <a:pPr lvl="3" eaLnBrk="1" hangingPunct="1">
+              <a:lnSpc>
+                <a:spcPct val="90000"/>
+              </a:lnSpc>
+              <a:spcBef>
+                <a:spcPts val="400"/>
+              </a:spcBef>
+              <a:spcAft>
+                <a:spcPts val="800"/>
+              </a:spcAft>
+              <a:tabLst>
+                <a:tab pos="330200" algn="l"/>
+                <a:tab pos="442913" algn="l"/>
+                <a:tab pos="900113" algn="l"/>
+                <a:tab pos="1357313" algn="l"/>
+                <a:tab pos="1814513" algn="l"/>
+                <a:tab pos="2271713" algn="l"/>
+                <a:tab pos="2728913" algn="l"/>
+                <a:tab pos="3186113" algn="l"/>
+                <a:tab pos="3643313" algn="l"/>
+                <a:tab pos="4100513" algn="l"/>
+                <a:tab pos="4557713" algn="l"/>
+                <a:tab pos="5014913" algn="l"/>
+                <a:tab pos="5472113" algn="l"/>
+                <a:tab pos="5929313" algn="l"/>
+                <a:tab pos="6386513" algn="l"/>
+                <a:tab pos="6843713" algn="l"/>
+                <a:tab pos="7300913" algn="l"/>
+                <a:tab pos="7758113" algn="l"/>
+                <a:tab pos="8215313" algn="l"/>
+                <a:tab pos="8672513" algn="l"/>
+                <a:tab pos="9129713" algn="l"/>
+              </a:tabLst>
+            </a:pPr>
+            <a:r>
+              <a:rPr lang="en-US" sz="1200" dirty="0" smtClean="0"/>
+              <a:t>Looks inside updated tables</a:t>
+            </a:r>
+          </a:p>
+          <a:p>
+            <a:pPr lvl="4" eaLnBrk="1" hangingPunct="1">
+              <a:lnSpc>
+                <a:spcPct val="90000"/>
+              </a:lnSpc>
+              <a:spcBef>
+                <a:spcPts val="400"/>
+              </a:spcBef>
+              <a:spcAft>
+                <a:spcPts val="800"/>
+              </a:spcAft>
+              <a:tabLst>
+                <a:tab pos="330200" algn="l"/>
+                <a:tab pos="442913" algn="l"/>
+                <a:tab pos="900113" algn="l"/>
+                <a:tab pos="1357313" algn="l"/>
+                <a:tab pos="1814513" algn="l"/>
+                <a:tab pos="2271713" algn="l"/>
+                <a:tab pos="2728913" algn="l"/>
+                <a:tab pos="3186113" algn="l"/>
+                <a:tab pos="3643313" algn="l"/>
+                <a:tab pos="4100513" algn="l"/>
+                <a:tab pos="4557713" algn="l"/>
+                <a:tab pos="5014913" algn="l"/>
+                <a:tab pos="5472113" algn="l"/>
+                <a:tab pos="5929313" algn="l"/>
+                <a:tab pos="6386513" algn="l"/>
+                <a:tab pos="6843713" algn="l"/>
+                <a:tab pos="7300913" algn="l"/>
+                <a:tab pos="7758113" algn="l"/>
+                <a:tab pos="8215313" algn="l"/>
+                <a:tab pos="8672513" algn="l"/>
+                <a:tab pos="9129713" algn="l"/>
+              </a:tabLst>
+            </a:pPr>
+            <a:r>
+              <a:rPr lang="en-US" sz="1200" dirty="0" smtClean="0"/>
+              <a:t>Some tables have rows selected by additional criteria</a:t>
+            </a:r>
+          </a:p>
+          <a:p>
+            <a:pPr lvl="4" eaLnBrk="1" hangingPunct="1">
+              <a:lnSpc>
+                <a:spcPct val="90000"/>
+              </a:lnSpc>
+              <a:spcBef>
+                <a:spcPts val="400"/>
+              </a:spcBef>
+              <a:spcAft>
+                <a:spcPts val="800"/>
+              </a:spcAft>
+              <a:tabLst>
+                <a:tab pos="330200" algn="l"/>
+                <a:tab pos="442913" algn="l"/>
+                <a:tab pos="900113" algn="l"/>
+                <a:tab pos="1357313" algn="l"/>
+                <a:tab pos="1814513" algn="l"/>
+                <a:tab pos="2271713" algn="l"/>
+                <a:tab pos="2728913" algn="l"/>
+                <a:tab pos="3186113" algn="l"/>
+                <a:tab pos="3643313" algn="l"/>
+                <a:tab pos="4100513" algn="l"/>
+                <a:tab pos="4557713" algn="l"/>
+                <a:tab pos="5014913" algn="l"/>
+                <a:tab pos="5472113" algn="l"/>
+                <a:tab pos="5929313" algn="l"/>
+                <a:tab pos="6386513" algn="l"/>
+                <a:tab pos="6843713" algn="l"/>
+                <a:tab pos="7300913" algn="l"/>
+                <a:tab pos="7758113" algn="l"/>
+                <a:tab pos="8215313" algn="l"/>
+                <a:tab pos="8672513" algn="l"/>
+                <a:tab pos="9129713" algn="l"/>
+              </a:tabLst>
+            </a:pPr>
+            <a:r>
+              <a:rPr lang="en-US" sz="1200" dirty="0" smtClean="0"/>
+              <a:t>When tables change,  ignores differences in rows irrelevant to dataset</a:t>
+            </a:r>
+          </a:p>
+          <a:p>
+            <a:pPr lvl="3" eaLnBrk="1" hangingPunct="1">
+              <a:lnSpc>
+                <a:spcPct val="90000"/>
+              </a:lnSpc>
+              <a:spcBef>
+                <a:spcPts val="400"/>
+              </a:spcBef>
+              <a:spcAft>
+                <a:spcPts val="800"/>
+              </a:spcAft>
+              <a:tabLst>
+                <a:tab pos="330200" algn="l"/>
+                <a:tab pos="442913" algn="l"/>
+                <a:tab pos="900113" algn="l"/>
+                <a:tab pos="1357313" algn="l"/>
+                <a:tab pos="1814513" algn="l"/>
+                <a:tab pos="2271713" algn="l"/>
+                <a:tab pos="2728913" algn="l"/>
+                <a:tab pos="3186113" algn="l"/>
+                <a:tab pos="3643313" algn="l"/>
+                <a:tab pos="4100513" algn="l"/>
+                <a:tab pos="4557713" algn="l"/>
+                <a:tab pos="5014913" algn="l"/>
+                <a:tab pos="5472113" algn="l"/>
+                <a:tab pos="5929313" algn="l"/>
+                <a:tab pos="6386513" algn="l"/>
+                <a:tab pos="6843713" algn="l"/>
+                <a:tab pos="7300913" algn="l"/>
+                <a:tab pos="7758113" algn="l"/>
+                <a:tab pos="8215313" algn="l"/>
+                <a:tab pos="8672513" algn="l"/>
+                <a:tab pos="9129713" algn="l"/>
+              </a:tabLst>
+            </a:pPr>
+            <a:r>
+              <a:rPr lang="en-US" sz="1200" dirty="0" smtClean="0"/>
+              <a:t>Considers severity of changes between reference file versions (moderate, severe, etc.)</a:t>
             </a:r>
           </a:p>
           <a:p>
@@ -17119,12 +17309,12 @@
               </a:tabLst>
             </a:pPr>
             <a:r>
-              <a:rPr lang="en-US" sz="1400" dirty="0" smtClean="0"/>
-              <a:t>Design Issue: Selection based on severity of change of reference file change. Some desire the ability of selecting only data sets for which the change in reference files is considered to be above some specified threshold (e.g., moderate, or severe).</a:t>
-            </a:r>
-          </a:p>
-          <a:p>
-            <a:pPr lvl="3" eaLnBrk="1" hangingPunct="1">
+              <a:rPr lang="en-US" dirty="0" smtClean="0"/>
+              <a:t>Very difficult problem to do correctly and make practical</a:t>
+            </a:r>
+          </a:p>
+          <a:p>
+            <a:pPr lvl="2" eaLnBrk="1" hangingPunct="1">
               <a:lnSpc>
                 <a:spcPct val="90000"/>
               </a:lnSpc>
@@ -17159,47 +17349,7 @@
               </a:tabLst>
             </a:pPr>
             <a:r>
-              <a:rPr lang="en-US" sz="1000" dirty="0" smtClean="0"/>
-              <a:t>Very difficult problem to do correctly and make practical</a:t>
-            </a:r>
-          </a:p>
-          <a:p>
-            <a:pPr lvl="3" eaLnBrk="1" hangingPunct="1">
-              <a:lnSpc>
-                <a:spcPct val="90000"/>
-              </a:lnSpc>
-              <a:spcBef>
-                <a:spcPts val="400"/>
-              </a:spcBef>
-              <a:spcAft>
-                <a:spcPts val="800"/>
-              </a:spcAft>
-              <a:tabLst>
-                <a:tab pos="330200" algn="l"/>
-                <a:tab pos="442913" algn="l"/>
-                <a:tab pos="900113" algn="l"/>
-                <a:tab pos="1357313" algn="l"/>
-                <a:tab pos="1814513" algn="l"/>
-                <a:tab pos="2271713" algn="l"/>
-                <a:tab pos="2728913" algn="l"/>
-                <a:tab pos="3186113" algn="l"/>
-                <a:tab pos="3643313" algn="l"/>
-                <a:tab pos="4100513" algn="l"/>
-                <a:tab pos="4557713" algn="l"/>
-                <a:tab pos="5014913" algn="l"/>
-                <a:tab pos="5472113" algn="l"/>
-                <a:tab pos="5929313" algn="l"/>
-                <a:tab pos="6386513" algn="l"/>
-                <a:tab pos="6843713" algn="l"/>
-                <a:tab pos="7300913" algn="l"/>
-                <a:tab pos="7758113" algn="l"/>
-                <a:tab pos="8215313" algn="l"/>
-                <a:tab pos="8672513" algn="l"/>
-                <a:tab pos="9129713" algn="l"/>
-              </a:tabLst>
-            </a:pPr>
-            <a:r>
-              <a:rPr lang="en-US" sz="1000" dirty="0" smtClean="0"/>
+              <a:rPr lang="en-US" dirty="0" smtClean="0"/>
               <a:t>Awaiting well defined concept for how this should work before accepting as a requirement</a:t>
             </a:r>
           </a:p>
@@ -17367,7 +17517,7 @@
         </p:nvSpPr>
         <p:spPr>
           <a:xfrm>
-            <a:off x="457200" y="990600"/>
+            <a:off x="457200" y="838200"/>
             <a:ext cx="8216900" cy="5367338"/>
           </a:xfrm>
           <a:prstGeom prst="rect">
@@ -17782,7 +17932,7 @@
             </a:pPr>
             <a:r>
               <a:rPr lang="en-US" sz="1400" dirty="0" smtClean="0"/>
-              <a:t>Mark reference file as bad,   web function.</a:t>
+              <a:t>Mark reference file as bad, web function.</a:t>
             </a:r>
           </a:p>
           <a:p>
@@ -17910,9 +18060,10 @@
               </a:tabLst>
             </a:pPr>
             <a:r>
-              <a:rPr lang="en-US" sz="1600" dirty="0" smtClean="0"/>
-              <a:t>coverage</a:t>
-            </a:r>
+              <a:rPr lang="en-US" sz="1600" dirty="0" err="1" smtClean="0"/>
+              <a:t>crds.coverage</a:t>
+            </a:r>
+            <a:endParaRPr lang="en-US" sz="1600" dirty="0" smtClean="0"/>
           </a:p>
           <a:p>
             <a:pPr lvl="2" eaLnBrk="1" hangingPunct="1">
@@ -18168,6 +18319,46 @@
             <a:r>
               <a:rPr lang="en-US" sz="1400" dirty="0" smtClean="0"/>
               <a:t>E.g., capable of detecting insertions or deletions of rows in tables between two versions</a:t>
+            </a:r>
+          </a:p>
+          <a:p>
+            <a:pPr lvl="2" eaLnBrk="1" hangingPunct="1">
+              <a:lnSpc>
+                <a:spcPct val="90000"/>
+              </a:lnSpc>
+              <a:spcBef>
+                <a:spcPts val="400"/>
+              </a:spcBef>
+              <a:spcAft>
+                <a:spcPts val="800"/>
+              </a:spcAft>
+              <a:tabLst>
+                <a:tab pos="330200" algn="l"/>
+                <a:tab pos="442913" algn="l"/>
+                <a:tab pos="900113" algn="l"/>
+                <a:tab pos="1357313" algn="l"/>
+                <a:tab pos="1814513" algn="l"/>
+                <a:tab pos="2271713" algn="l"/>
+                <a:tab pos="2728913" algn="l"/>
+                <a:tab pos="3186113" algn="l"/>
+                <a:tab pos="3643313" algn="l"/>
+                <a:tab pos="4100513" algn="l"/>
+                <a:tab pos="4557713" algn="l"/>
+                <a:tab pos="5014913" algn="l"/>
+                <a:tab pos="5472113" algn="l"/>
+                <a:tab pos="5929313" algn="l"/>
+                <a:tab pos="6386513" algn="l"/>
+                <a:tab pos="6843713" algn="l"/>
+                <a:tab pos="7300913" algn="l"/>
+                <a:tab pos="7758113" algn="l"/>
+                <a:tab pos="8215313" algn="l"/>
+                <a:tab pos="8672513" algn="l"/>
+                <a:tab pos="9129713" algn="l"/>
+              </a:tabLst>
+            </a:pPr>
+            <a:r>
+              <a:rPr lang="en-US" sz="1400" dirty="0" smtClean="0"/>
+              <a:t>Checks matching parameters for existence and valid values</a:t>
             </a:r>
           </a:p>
         </p:txBody>
@@ -19130,7 +19321,6 @@
               <a:rPr lang="en-US" sz="1600" dirty="0" smtClean="0"/>
               <a:t>) </a:t>
             </a:r>
-            <a:endParaRPr lang="en-US" sz="1600" dirty="0" smtClean="0"/>
           </a:p>
           <a:p>
             <a:pPr lvl="1"/>
@@ -19138,7 +19328,6 @@
               <a:rPr lang="en-US" sz="1600" dirty="0" smtClean="0"/>
               <a:t>Command Line</a:t>
             </a:r>
-            <a:endParaRPr lang="en-US" sz="1600" dirty="0" smtClean="0"/>
           </a:p>
           <a:p>
             <a:pPr lvl="2"/>
@@ -19223,7 +19412,6 @@
               <a:rPr lang="en-US" sz="1400" dirty="0" smtClean="0"/>
               <a:t>Reference File Retrieval Service</a:t>
             </a:r>
-            <a:endParaRPr lang="en-US" sz="1400" dirty="0" smtClean="0"/>
           </a:p>
         </p:txBody>
       </p:sp>
@@ -24356,15 +24544,6 @@
               </a:rPr>
               <a:t>All CRDS rules files have versioned names:  e.g.  jwst_0000.pmap</a:t>
             </a:r>
-            <a:endParaRPr lang="en-US" sz="1050" dirty="0" smtClean="0">
-              <a:solidFill>
-                <a:schemeClr val="accent2">
-                  <a:lumMod val="60000"/>
-                  <a:lumOff val="40000"/>
-                </a:schemeClr>
-              </a:solidFill>
-              <a:latin typeface="Helvetica"/>
-            </a:endParaRPr>
           </a:p>
           <a:p>
             <a:pPr marL="171450" indent="-171450">
@@ -24381,19 +24560,7 @@
                 </a:solidFill>
                 <a:latin typeface="Helvetica"/>
               </a:rPr>
-              <a:t>One Pipeline Context file (and the set of referred mappings) defines the configuration of </a:t>
-            </a:r>
-            <a:r>
-              <a:rPr lang="en-US" sz="1050" dirty="0" smtClean="0">
-                <a:solidFill>
-                  <a:schemeClr val="accent2">
-                    <a:lumMod val="60000"/>
-                    <a:lumOff val="40000"/>
-                  </a:schemeClr>
-                </a:solidFill>
-                <a:latin typeface="Helvetica"/>
-              </a:rPr>
-              <a:t>CRDS</a:t>
+              <a:t>One Pipeline Context file (and the set of referred mappings) defines the configuration of CRDS</a:t>
             </a:r>
             <a:endParaRPr lang="en-US" sz="1050" dirty="0">
               <a:solidFill>
@@ -24420,53 +24587,8 @@
                 </a:solidFill>
                 <a:latin typeface="Helvetica"/>
               </a:rPr>
-              <a:t>Replaces</a:t>
-            </a:r>
-            <a:r>
-              <a:rPr lang="en-US" sz="1050" dirty="0" smtClean="0">
-                <a:solidFill>
-                  <a:schemeClr val="accent2">
-                    <a:lumMod val="60000"/>
-                    <a:lumOff val="40000"/>
-                  </a:schemeClr>
-                </a:solidFill>
-                <a:latin typeface="Helvetica"/>
-              </a:rPr>
-              <a:t> </a:t>
-            </a:r>
-            <a:r>
-              <a:rPr lang="en-US" sz="1050" dirty="0" smtClean="0">
-                <a:solidFill>
-                  <a:schemeClr val="accent2">
-                    <a:lumMod val="60000"/>
-                    <a:lumOff val="40000"/>
-                  </a:schemeClr>
-                </a:solidFill>
-                <a:latin typeface="Helvetica"/>
-              </a:rPr>
-              <a:t>the state of the CDBS </a:t>
-            </a:r>
-            <a:r>
-              <a:rPr lang="en-US" sz="1050" dirty="0" smtClean="0">
-                <a:solidFill>
-                  <a:schemeClr val="accent2">
-                    <a:lumMod val="60000"/>
-                    <a:lumOff val="40000"/>
-                  </a:schemeClr>
-                </a:solidFill>
-                <a:latin typeface="Helvetica"/>
-              </a:rPr>
-              <a:t>database.</a:t>
-            </a:r>
-            <a:endParaRPr lang="en-US" sz="1050" dirty="0" smtClean="0">
-              <a:solidFill>
-                <a:schemeClr val="accent2">
-                  <a:lumMod val="60000"/>
-                  <a:lumOff val="40000"/>
-                </a:schemeClr>
-              </a:solidFill>
-              <a:latin typeface="Helvetica"/>
-            </a:endParaRPr>
+              <a:t>Replaces the state of the CDBS database.</a:t>
+            </a:r>
           </a:p>
         </p:txBody>
       </p:sp>

</xml_diff>

<commit_message>
Updated SDR2 slide section # to 10.
git-svn-id: https://aeon.stsci.edu/ssb/svn/crds/trunk@765 0d8f46c8-9b30-49d0-b470-0f6283dc92e8
</commit_message>
<xml_diff>
--- a/docs/DMS_SDR2_09_CRDS_final.pptx
+++ b/docs/DMS_SDR2_09_CRDS_final.pptx
@@ -1,6 +1,6 @@
 
 <file path=ppt/presentation.xml><?xml version="1.0" encoding="utf-8"?>
-<p:presentation xmlns:a="http://schemas.openxmlformats.org/drawingml/2006/main" xmlns:r="http://schemas.openxmlformats.org/officeDocument/2006/relationships" xmlns:p="http://schemas.openxmlformats.org/presentationml/2006/main" firstSlideNum="2" showSpecialPlsOnTitleSld="0" strictFirstAndLastChars="0" saveSubsetFonts="1">
+<p:presentation xmlns:a="http://schemas.openxmlformats.org/drawingml/2006/main" xmlns:r="http://schemas.openxmlformats.org/officeDocument/2006/relationships" xmlns:p="http://schemas.openxmlformats.org/presentationml/2006/main" showSpecialPlsOnTitleSld="0" strictFirstAndLastChars="0" saveSubsetFonts="1">
   <p:sldMasterIdLst>
     <p:sldMasterId id="2147483665" r:id="rId1"/>
   </p:sldMasterIdLst>
@@ -1249,7 +1249,7 @@
             <a:fld id="{90602CDF-C19D-4E27-B94A-4CDFA71D65C3}" type="slidenum">
               <a:rPr lang="en-US" smtClean="0"/>
               <a:pPr/>
-              <a:t>2</a:t>
+              <a:t>1</a:t>
             </a:fld>
             <a:endParaRPr lang="en-US" smtClean="0"/>
           </a:p>
@@ -1397,7 +1397,7 @@
               <a:pPr>
                 <a:defRPr/>
               </a:pPr>
-              <a:t>19</a:t>
+              <a:t>18</a:t>
             </a:fld>
             <a:endParaRPr lang="en-US"/>
           </a:p>
@@ -1605,12 +1605,8 @@
               <a:defRPr/>
             </a:pPr>
             <a:r>
-              <a:rPr lang="en-US" dirty="0"/>
-              <a:t>9</a:t>
-            </a:r>
-            <a:r>
               <a:rPr lang="en-US" dirty="0" smtClean="0"/>
-              <a:t>-</a:t>
+              <a:t>10-</a:t>
             </a:r>
             <a:fld id="{2D61C627-6E20-420F-83CB-DEA388E29667}" type="slidenum">
               <a:rPr lang="en-US"/>
@@ -1780,7 +1776,7 @@
             </a:pPr>
             <a:r>
               <a:rPr lang="en-US" dirty="0" smtClean="0"/>
-              <a:t>9-</a:t>
+              <a:t>10-</a:t>
             </a:r>
             <a:fld id="{A739F50A-8F88-4892-87E1-8D1D3A543FFC}" type="slidenum">
               <a:rPr lang="en-US" smtClean="0"/>
@@ -2018,12 +2014,8 @@
               <a:defRPr/>
             </a:pPr>
             <a:r>
-              <a:rPr lang="en-US" dirty="0"/>
-              <a:t>9</a:t>
-            </a:r>
-            <a:r>
               <a:rPr lang="en-US" dirty="0" smtClean="0"/>
-              <a:t>-</a:t>
+              <a:t>10-</a:t>
             </a:r>
             <a:fld id="{DEA1B79E-B14E-41E4-B6D3-CD206A959F7E}" type="slidenum">
               <a:rPr lang="en-US"/>
@@ -2451,7 +2443,7 @@
             </a:pPr>
             <a:r>
               <a:rPr lang="en-US" dirty="0" smtClean="0"/>
-              <a:t>9-</a:t>
+              <a:t>10-</a:t>
             </a:r>
             <a:fld id="{B2A867B3-BEE9-4608-9384-2326478CF83C}" type="slidenum">
               <a:rPr lang="en-US" smtClean="0"/>
@@ -3086,7 +3078,7 @@
       </p:sp>
       <p:sp>
         <p:nvSpPr>
-          <p:cNvPr id="5" name="Slide Number Placeholder 4"/>
+          <p:cNvPr id="6" name="Slide Number Placeholder 5"/>
           <p:cNvSpPr>
             <a:spLocks noGrp="1"/>
           </p:cNvSpPr>
@@ -3104,14 +3096,14 @@
             </a:pPr>
             <a:r>
               <a:rPr lang="en-US" smtClean="0"/>
-              <a:t>9-</a:t>
+              <a:t>10-</a:t>
             </a:r>
             <a:fld id="{DEA1B79E-B14E-41E4-B6D3-CD206A959F7E}" type="slidenum">
               <a:rPr lang="en-US" smtClean="0"/>
               <a:pPr>
                 <a:defRPr/>
               </a:pPr>
-              <a:t>2</a:t>
+              <a:t>1</a:t>
             </a:fld>
             <a:endParaRPr lang="en-US" smtClean="0"/>
           </a:p>
@@ -3420,7 +3412,7 @@
       </p:sp>
       <p:sp>
         <p:nvSpPr>
-          <p:cNvPr id="6" name="Slide Number Placeholder 5"/>
+          <p:cNvPr id="7" name="Slide Number Placeholder 6"/>
           <p:cNvSpPr>
             <a:spLocks noGrp="1"/>
           </p:cNvSpPr>
@@ -3438,14 +3430,14 @@
             </a:pPr>
             <a:r>
               <a:rPr lang="en-US" smtClean="0"/>
-              <a:t>9-</a:t>
+              <a:t>10-</a:t>
             </a:r>
             <a:fld id="{A739F50A-8F88-4892-87E1-8D1D3A543FFC}" type="slidenum">
               <a:rPr lang="en-US" smtClean="0"/>
               <a:pPr>
                 <a:defRPr/>
               </a:pPr>
-              <a:t>11</a:t>
+              <a:t>10</a:t>
             </a:fld>
             <a:endParaRPr lang="en-US" smtClean="0"/>
           </a:p>
@@ -4611,7 +4603,7 @@
       </p:sp>
       <p:sp>
         <p:nvSpPr>
-          <p:cNvPr id="5" name="Slide Number Placeholder 4"/>
+          <p:cNvPr id="9" name="Slide Number Placeholder 8"/>
           <p:cNvSpPr>
             <a:spLocks noGrp="1"/>
           </p:cNvSpPr>
@@ -4629,14 +4621,14 @@
             </a:pPr>
             <a:r>
               <a:rPr lang="en-US" smtClean="0"/>
-              <a:t>9-</a:t>
+              <a:t>10-</a:t>
             </a:r>
             <a:fld id="{A739F50A-8F88-4892-87E1-8D1D3A543FFC}" type="slidenum">
               <a:rPr lang="en-US" smtClean="0"/>
               <a:pPr>
                 <a:defRPr/>
               </a:pPr>
-              <a:t>12</a:t>
+              <a:t>11</a:t>
             </a:fld>
             <a:endParaRPr lang="en-US" smtClean="0"/>
           </a:p>
@@ -5505,7 +5497,7 @@
       </p:sp>
       <p:sp>
         <p:nvSpPr>
-          <p:cNvPr id="8" name="Slide Number Placeholder 7"/>
+          <p:cNvPr id="9" name="Slide Number Placeholder 8"/>
           <p:cNvSpPr>
             <a:spLocks noGrp="1"/>
           </p:cNvSpPr>
@@ -5523,14 +5515,14 @@
             </a:pPr>
             <a:r>
               <a:rPr lang="en-US" smtClean="0"/>
-              <a:t>9-</a:t>
+              <a:t>10-</a:t>
             </a:r>
             <a:fld id="{A739F50A-8F88-4892-87E1-8D1D3A543FFC}" type="slidenum">
               <a:rPr lang="en-US" smtClean="0"/>
               <a:pPr>
                 <a:defRPr/>
               </a:pPr>
-              <a:t>13</a:t>
+              <a:t>12</a:t>
             </a:fld>
             <a:endParaRPr lang="en-US" smtClean="0"/>
           </a:p>
@@ -5833,7 +5825,7 @@
       </p:sp>
       <p:sp>
         <p:nvSpPr>
-          <p:cNvPr id="6" name="Slide Number Placeholder 5"/>
+          <p:cNvPr id="7" name="Slide Number Placeholder 6"/>
           <p:cNvSpPr>
             <a:spLocks noGrp="1"/>
           </p:cNvSpPr>
@@ -5851,14 +5843,14 @@
             </a:pPr>
             <a:r>
               <a:rPr lang="en-US" smtClean="0"/>
-              <a:t>9-</a:t>
+              <a:t>10-</a:t>
             </a:r>
             <a:fld id="{A739F50A-8F88-4892-87E1-8D1D3A543FFC}" type="slidenum">
               <a:rPr lang="en-US" smtClean="0"/>
               <a:pPr>
                 <a:defRPr/>
               </a:pPr>
-              <a:t>14</a:t>
+              <a:t>13</a:t>
             </a:fld>
             <a:endParaRPr lang="en-US" smtClean="0"/>
           </a:p>
@@ -6083,7 +6075,7 @@
       </p:sp>
       <p:sp>
         <p:nvSpPr>
-          <p:cNvPr id="6" name="Slide Number Placeholder 5"/>
+          <p:cNvPr id="7" name="Slide Number Placeholder 6"/>
           <p:cNvSpPr>
             <a:spLocks noGrp="1"/>
           </p:cNvSpPr>
@@ -6101,14 +6093,14 @@
             </a:pPr>
             <a:r>
               <a:rPr lang="en-US" smtClean="0"/>
-              <a:t>9-</a:t>
+              <a:t>10-</a:t>
             </a:r>
             <a:fld id="{A739F50A-8F88-4892-87E1-8D1D3A543FFC}" type="slidenum">
               <a:rPr lang="en-US" smtClean="0"/>
               <a:pPr>
                 <a:defRPr/>
               </a:pPr>
-              <a:t>15</a:t>
+              <a:t>14</a:t>
             </a:fld>
             <a:endParaRPr lang="en-US" smtClean="0"/>
           </a:p>
@@ -6836,7 +6828,7 @@
       </p:sp>
       <p:sp>
         <p:nvSpPr>
-          <p:cNvPr id="8" name="Slide Number Placeholder 7"/>
+          <p:cNvPr id="10" name="Slide Number Placeholder 9"/>
           <p:cNvSpPr>
             <a:spLocks noGrp="1"/>
           </p:cNvSpPr>
@@ -6854,14 +6846,14 @@
             </a:pPr>
             <a:r>
               <a:rPr lang="en-US" smtClean="0"/>
-              <a:t>9-</a:t>
+              <a:t>10-</a:t>
             </a:r>
             <a:fld id="{A739F50A-8F88-4892-87E1-8D1D3A543FFC}" type="slidenum">
               <a:rPr lang="en-US" smtClean="0"/>
               <a:pPr>
                 <a:defRPr/>
               </a:pPr>
-              <a:t>16</a:t>
+              <a:t>15</a:t>
             </a:fld>
             <a:endParaRPr lang="en-US" smtClean="0"/>
           </a:p>
@@ -7781,7 +7773,7 @@
       </p:sp>
       <p:sp>
         <p:nvSpPr>
-          <p:cNvPr id="10" name="Slide Number Placeholder 9"/>
+          <p:cNvPr id="11" name="Slide Number Placeholder 10"/>
           <p:cNvSpPr>
             <a:spLocks noGrp="1"/>
           </p:cNvSpPr>
@@ -7799,14 +7791,14 @@
             </a:pPr>
             <a:r>
               <a:rPr lang="en-US" smtClean="0"/>
-              <a:t>9-</a:t>
+              <a:t>10-</a:t>
             </a:r>
             <a:fld id="{A739F50A-8F88-4892-87E1-8D1D3A543FFC}" type="slidenum">
               <a:rPr lang="en-US" smtClean="0"/>
               <a:pPr>
                 <a:defRPr/>
               </a:pPr>
-              <a:t>17</a:t>
+              <a:t>16</a:t>
             </a:fld>
             <a:endParaRPr lang="en-US" smtClean="0"/>
           </a:p>
@@ -7996,7 +7988,7 @@
       </p:sp>
       <p:sp>
         <p:nvSpPr>
-          <p:cNvPr id="6" name="Slide Number Placeholder 5"/>
+          <p:cNvPr id="7" name="Slide Number Placeholder 6"/>
           <p:cNvSpPr>
             <a:spLocks noGrp="1"/>
           </p:cNvSpPr>
@@ -8014,14 +8006,14 @@
             </a:pPr>
             <a:r>
               <a:rPr lang="en-US" smtClean="0"/>
-              <a:t>9-</a:t>
+              <a:t>10-</a:t>
             </a:r>
             <a:fld id="{A739F50A-8F88-4892-87E1-8D1D3A543FFC}" type="slidenum">
               <a:rPr lang="en-US" smtClean="0"/>
               <a:pPr>
                 <a:defRPr/>
               </a:pPr>
-              <a:t>18</a:t>
+              <a:t>17</a:t>
             </a:fld>
             <a:endParaRPr lang="en-US" smtClean="0"/>
           </a:p>
@@ -8233,7 +8225,7 @@
       </p:sp>
       <p:sp>
         <p:nvSpPr>
-          <p:cNvPr id="6" name="Slide Number Placeholder 5"/>
+          <p:cNvPr id="7" name="Slide Number Placeholder 6"/>
           <p:cNvSpPr>
             <a:spLocks noGrp="1"/>
           </p:cNvSpPr>
@@ -8251,14 +8243,14 @@
             </a:pPr>
             <a:r>
               <a:rPr lang="en-US" smtClean="0"/>
-              <a:t>9-</a:t>
+              <a:t>10-</a:t>
             </a:r>
             <a:fld id="{A739F50A-8F88-4892-87E1-8D1D3A543FFC}" type="slidenum">
               <a:rPr lang="en-US" smtClean="0"/>
               <a:pPr>
                 <a:defRPr/>
               </a:pPr>
-              <a:t>19</a:t>
+              <a:t>18</a:t>
             </a:fld>
             <a:endParaRPr lang="en-US" smtClean="0"/>
           </a:p>
@@ -9262,23 +9254,8 @@
                 </a:solidFill>
                 <a:latin typeface="Helvetica"/>
               </a:rPr>
-              <a:t>Best </a:t>
-            </a:r>
-            <a:r>
-              <a:rPr lang="en-US" sz="1000" dirty="0" smtClean="0">
-                <a:solidFill>
-                  <a:schemeClr val="tx1"/>
-                </a:solidFill>
-                <a:latin typeface="Helvetica"/>
-              </a:rPr>
-              <a:t>Reference Names</a:t>
-            </a:r>
-            <a:endParaRPr lang="en-US" sz="1000" dirty="0" smtClean="0">
-              <a:solidFill>
-                <a:schemeClr val="tx1"/>
-              </a:solidFill>
-              <a:latin typeface="Helvetica"/>
-            </a:endParaRPr>
+              <a:t>Best Reference Names</a:t>
+            </a:r>
           </a:p>
         </p:txBody>
       </p:sp>
@@ -9630,7 +9607,7 @@
       </p:sp>
       <p:sp>
         <p:nvSpPr>
-          <p:cNvPr id="8" name="Slide Number Placeholder 7"/>
+          <p:cNvPr id="9" name="Slide Number Placeholder 8"/>
           <p:cNvSpPr>
             <a:spLocks noGrp="1"/>
           </p:cNvSpPr>
@@ -9648,14 +9625,14 @@
             </a:pPr>
             <a:r>
               <a:rPr lang="en-US" smtClean="0"/>
-              <a:t>9-</a:t>
+              <a:t>10-</a:t>
             </a:r>
             <a:fld id="{A739F50A-8F88-4892-87E1-8D1D3A543FFC}" type="slidenum">
               <a:rPr lang="en-US" smtClean="0"/>
               <a:pPr>
                 <a:defRPr/>
               </a:pPr>
-              <a:t>20</a:t>
+              <a:t>19</a:t>
             </a:fld>
             <a:endParaRPr lang="en-US" smtClean="0"/>
           </a:p>
@@ -9784,45 +9761,6 @@
               <a:rPr lang="en-US" smtClean="0"/>
               <a:t>S&amp;OC DMS System Design Review</a:t>
             </a:r>
-            <a:endParaRPr lang="en-US" dirty="0"/>
-          </a:p>
-        </p:txBody>
-      </p:sp>
-      <p:sp>
-        <p:nvSpPr>
-          <p:cNvPr id="5" name="Slide Number Placeholder 4"/>
-          <p:cNvSpPr>
-            <a:spLocks noGrp="1"/>
-          </p:cNvSpPr>
-          <p:nvPr>
-            <p:ph type="sldNum" sz="quarter" idx="12"/>
-          </p:nvPr>
-        </p:nvSpPr>
-        <p:spPr/>
-        <p:txBody>
-          <a:bodyPr/>
-          <a:lstStyle/>
-          <a:p>
-            <a:pPr>
-              <a:defRPr/>
-            </a:pPr>
-            <a:r>
-              <a:rPr lang="en-US" smtClean="0"/>
-              <a:t>9-</a:t>
-            </a:r>
-            <a:fld id="{A739F50A-8F88-4892-87E1-8D1D3A543FFC}" type="slidenum">
-              <a:rPr lang="en-US" smtClean="0"/>
-              <a:pPr>
-                <a:defRPr/>
-              </a:pPr>
-              <a:t>3</a:t>
-            </a:fld>
-            <a:endParaRPr lang="en-US" smtClean="0"/>
-          </a:p>
-          <a:p>
-            <a:pPr>
-              <a:defRPr/>
-            </a:pPr>
             <a:endParaRPr lang="en-US" dirty="0"/>
           </a:p>
         </p:txBody>
@@ -9973,6 +9911,45 @@
               </a:solidFill>
               <a:latin typeface="Arial" charset="0"/>
             </a:endParaRPr>
+          </a:p>
+        </p:txBody>
+      </p:sp>
+      <p:sp>
+        <p:nvSpPr>
+          <p:cNvPr id="10" name="Slide Number Placeholder 9"/>
+          <p:cNvSpPr>
+            <a:spLocks noGrp="1"/>
+          </p:cNvSpPr>
+          <p:nvPr>
+            <p:ph type="sldNum" sz="quarter" idx="12"/>
+          </p:nvPr>
+        </p:nvSpPr>
+        <p:spPr/>
+        <p:txBody>
+          <a:bodyPr/>
+          <a:lstStyle/>
+          <a:p>
+            <a:pPr>
+              <a:defRPr/>
+            </a:pPr>
+            <a:r>
+              <a:rPr lang="en-US" smtClean="0"/>
+              <a:t>10-</a:t>
+            </a:r>
+            <a:fld id="{A739F50A-8F88-4892-87E1-8D1D3A543FFC}" type="slidenum">
+              <a:rPr lang="en-US" smtClean="0"/>
+              <a:pPr>
+                <a:defRPr/>
+              </a:pPr>
+              <a:t>2</a:t>
+            </a:fld>
+            <a:endParaRPr lang="en-US" smtClean="0"/>
+          </a:p>
+          <a:p>
+            <a:pPr>
+              <a:defRPr/>
+            </a:pPr>
+            <a:endParaRPr lang="en-US" dirty="0"/>
           </a:p>
         </p:txBody>
       </p:sp>
@@ -10486,23 +10463,8 @@
                 </a:solidFill>
                 <a:latin typeface="Helvetica"/>
               </a:rPr>
-              <a:t>Best </a:t>
-            </a:r>
-            <a:r>
-              <a:rPr lang="en-US" sz="1000" dirty="0" smtClean="0">
-                <a:solidFill>
-                  <a:schemeClr val="tx1"/>
-                </a:solidFill>
-                <a:latin typeface="Helvetica"/>
-              </a:rPr>
-              <a:t>References Names</a:t>
-            </a:r>
-            <a:endParaRPr lang="en-US" sz="1000" dirty="0" smtClean="0">
-              <a:solidFill>
-                <a:schemeClr val="tx1"/>
-              </a:solidFill>
-              <a:latin typeface="Helvetica"/>
-            </a:endParaRPr>
+              <a:t>Best References Names</a:t>
+            </a:r>
           </a:p>
         </p:txBody>
       </p:sp>
@@ -10859,7 +10821,7 @@
       </p:sp>
       <p:sp>
         <p:nvSpPr>
-          <p:cNvPr id="8" name="Slide Number Placeholder 7"/>
+          <p:cNvPr id="9" name="Slide Number Placeholder 8"/>
           <p:cNvSpPr>
             <a:spLocks noGrp="1"/>
           </p:cNvSpPr>
@@ -10877,14 +10839,14 @@
             </a:pPr>
             <a:r>
               <a:rPr lang="en-US" smtClean="0"/>
-              <a:t>9-</a:t>
+              <a:t>10-</a:t>
             </a:r>
             <a:fld id="{A739F50A-8F88-4892-87E1-8D1D3A543FFC}" type="slidenum">
               <a:rPr lang="en-US" smtClean="0"/>
               <a:pPr>
                 <a:defRPr/>
               </a:pPr>
-              <a:t>21</a:t>
+              <a:t>20</a:t>
             </a:fld>
             <a:endParaRPr lang="en-US" smtClean="0"/>
           </a:p>
@@ -11030,21 +10992,8 @@
             <a:pPr lvl="1"/>
             <a:r>
               <a:rPr lang="en-US" sz="1600" dirty="0" smtClean="0"/>
-              <a:t>CRDS configuration defines the cache directory for each </a:t>
-            </a:r>
-            <a:r>
-              <a:rPr lang="en-US" sz="1600" dirty="0" smtClean="0"/>
-              <a:t>client/</a:t>
-            </a:r>
-            <a:r>
-              <a:rPr lang="en-US" sz="1600" dirty="0" smtClean="0"/>
-              <a:t>user</a:t>
-            </a:r>
-            <a:r>
-              <a:rPr lang="en-US" sz="1600" dirty="0" smtClean="0"/>
-              <a:t>.</a:t>
-            </a:r>
-            <a:endParaRPr lang="en-US" sz="1600" dirty="0" smtClean="0"/>
+              <a:t>CRDS configuration defines the cache directory for each client/user.</a:t>
+            </a:r>
           </a:p>
           <a:p>
             <a:pPr lvl="1"/>
@@ -11180,7 +11129,7 @@
       </p:sp>
       <p:sp>
         <p:nvSpPr>
-          <p:cNvPr id="6" name="Slide Number Placeholder 5"/>
+          <p:cNvPr id="7" name="Slide Number Placeholder 6"/>
           <p:cNvSpPr>
             <a:spLocks noGrp="1"/>
           </p:cNvSpPr>
@@ -11198,14 +11147,14 @@
             </a:pPr>
             <a:r>
               <a:rPr lang="en-US" smtClean="0"/>
-              <a:t>9-</a:t>
+              <a:t>10-</a:t>
             </a:r>
             <a:fld id="{A739F50A-8F88-4892-87E1-8D1D3A543FFC}" type="slidenum">
               <a:rPr lang="en-US" smtClean="0"/>
               <a:pPr>
                 <a:defRPr/>
               </a:pPr>
-              <a:t>22</a:t>
+              <a:t>21</a:t>
             </a:fld>
             <a:endParaRPr lang="en-US" smtClean="0"/>
           </a:p>
@@ -12283,23 +12232,8 @@
                 </a:solidFill>
                 <a:latin typeface="Helvetica"/>
               </a:rPr>
-              <a:t>Best </a:t>
-            </a:r>
-            <a:r>
-              <a:rPr lang="en-US" sz="1000" dirty="0" smtClean="0">
-                <a:solidFill>
-                  <a:schemeClr val="tx1"/>
-                </a:solidFill>
-                <a:latin typeface="Helvetica"/>
-              </a:rPr>
-              <a:t>Reference Names</a:t>
-            </a:r>
-            <a:endParaRPr lang="en-US" sz="1000" dirty="0" smtClean="0">
-              <a:solidFill>
-                <a:schemeClr val="tx1"/>
-              </a:solidFill>
-              <a:latin typeface="Helvetica"/>
-            </a:endParaRPr>
+              <a:t>Best Reference Names</a:t>
+            </a:r>
           </a:p>
         </p:txBody>
       </p:sp>
@@ -12809,7 +12743,7 @@
       </p:sp>
       <p:sp>
         <p:nvSpPr>
-          <p:cNvPr id="8" name="Slide Number Placeholder 7"/>
+          <p:cNvPr id="9" name="Slide Number Placeholder 8"/>
           <p:cNvSpPr>
             <a:spLocks noGrp="1"/>
           </p:cNvSpPr>
@@ -12827,14 +12761,14 @@
             </a:pPr>
             <a:r>
               <a:rPr lang="en-US" smtClean="0"/>
-              <a:t>9-</a:t>
+              <a:t>10-</a:t>
             </a:r>
             <a:fld id="{A739F50A-8F88-4892-87E1-8D1D3A543FFC}" type="slidenum">
               <a:rPr lang="en-US" smtClean="0"/>
               <a:pPr>
                 <a:defRPr/>
               </a:pPr>
-              <a:t>23</a:t>
+              <a:t>22</a:t>
             </a:fld>
             <a:endParaRPr lang="en-US" smtClean="0"/>
           </a:p>
@@ -13024,7 +12958,7 @@
       </p:sp>
       <p:sp>
         <p:nvSpPr>
-          <p:cNvPr id="6" name="Slide Number Placeholder 5"/>
+          <p:cNvPr id="7" name="Slide Number Placeholder 6"/>
           <p:cNvSpPr>
             <a:spLocks noGrp="1"/>
           </p:cNvSpPr>
@@ -13042,14 +12976,14 @@
             </a:pPr>
             <a:r>
               <a:rPr lang="en-US" smtClean="0"/>
-              <a:t>9-</a:t>
+              <a:t>10-</a:t>
             </a:r>
             <a:fld id="{A739F50A-8F88-4892-87E1-8D1D3A543FFC}" type="slidenum">
               <a:rPr lang="en-US" smtClean="0"/>
               <a:pPr>
                 <a:defRPr/>
               </a:pPr>
-              <a:t>24</a:t>
+              <a:t>23</a:t>
             </a:fld>
             <a:endParaRPr lang="en-US" smtClean="0"/>
           </a:p>
@@ -13409,7 +13343,7 @@
       </p:sp>
       <p:sp>
         <p:nvSpPr>
-          <p:cNvPr id="10" name="Slide Number Placeholder 9"/>
+          <p:cNvPr id="11" name="Slide Number Placeholder 10"/>
           <p:cNvSpPr>
             <a:spLocks noGrp="1"/>
           </p:cNvSpPr>
@@ -13427,14 +13361,14 @@
             </a:pPr>
             <a:r>
               <a:rPr lang="en-US" smtClean="0"/>
-              <a:t>9-</a:t>
+              <a:t>10-</a:t>
             </a:r>
             <a:fld id="{A739F50A-8F88-4892-87E1-8D1D3A543FFC}" type="slidenum">
               <a:rPr lang="en-US" smtClean="0"/>
               <a:pPr>
                 <a:defRPr/>
               </a:pPr>
-              <a:t>25</a:t>
+              <a:t>24</a:t>
             </a:fld>
             <a:endParaRPr lang="en-US" smtClean="0"/>
           </a:p>
@@ -13546,45 +13480,6 @@
               <a:rPr lang="en-US" smtClean="0"/>
               <a:t>S&amp;OC DMS System Design Review</a:t>
             </a:r>
-            <a:endParaRPr lang="en-US" dirty="0"/>
-          </a:p>
-        </p:txBody>
-      </p:sp>
-      <p:sp>
-        <p:nvSpPr>
-          <p:cNvPr id="5" name="Slide Number Placeholder 4"/>
-          <p:cNvSpPr>
-            <a:spLocks noGrp="1"/>
-          </p:cNvSpPr>
-          <p:nvPr>
-            <p:ph type="sldNum" sz="quarter" idx="12"/>
-          </p:nvPr>
-        </p:nvSpPr>
-        <p:spPr/>
-        <p:txBody>
-          <a:bodyPr/>
-          <a:lstStyle/>
-          <a:p>
-            <a:pPr>
-              <a:defRPr/>
-            </a:pPr>
-            <a:r>
-              <a:rPr lang="en-US" smtClean="0"/>
-              <a:t>9-</a:t>
-            </a:r>
-            <a:fld id="{A739F50A-8F88-4892-87E1-8D1D3A543FFC}" type="slidenum">
-              <a:rPr lang="en-US" smtClean="0"/>
-              <a:pPr>
-                <a:defRPr/>
-              </a:pPr>
-              <a:t>26</a:t>
-            </a:fld>
-            <a:endParaRPr lang="en-US" smtClean="0"/>
-          </a:p>
-          <a:p>
-            <a:pPr>
-              <a:defRPr/>
-            </a:pPr>
             <a:endParaRPr lang="en-US" dirty="0"/>
           </a:p>
         </p:txBody>
@@ -13643,6 +13538,45 @@
           </a:extLst>
         </p:spPr>
       </p:pic>
+      <p:sp>
+        <p:nvSpPr>
+          <p:cNvPr id="7" name="Slide Number Placeholder 6"/>
+          <p:cNvSpPr>
+            <a:spLocks noGrp="1"/>
+          </p:cNvSpPr>
+          <p:nvPr>
+            <p:ph type="sldNum" sz="quarter" idx="12"/>
+          </p:nvPr>
+        </p:nvSpPr>
+        <p:spPr/>
+        <p:txBody>
+          <a:bodyPr/>
+          <a:lstStyle/>
+          <a:p>
+            <a:pPr>
+              <a:defRPr/>
+            </a:pPr>
+            <a:r>
+              <a:rPr lang="en-US" smtClean="0"/>
+              <a:t>10-</a:t>
+            </a:r>
+            <a:fld id="{A739F50A-8F88-4892-87E1-8D1D3A543FFC}" type="slidenum">
+              <a:rPr lang="en-US" smtClean="0"/>
+              <a:pPr>
+                <a:defRPr/>
+              </a:pPr>
+              <a:t>25</a:t>
+            </a:fld>
+            <a:endParaRPr lang="en-US" smtClean="0"/>
+          </a:p>
+          <a:p>
+            <a:pPr>
+              <a:defRPr/>
+            </a:pPr>
+            <a:endParaRPr lang="en-US" dirty="0"/>
+          </a:p>
+        </p:txBody>
+      </p:sp>
     </p:spTree>
     <p:extLst>
       <p:ext uri="{BB962C8B-B14F-4D97-AF65-F5344CB8AC3E}">
@@ -13813,7 +13747,7 @@
       </p:sp>
       <p:sp>
         <p:nvSpPr>
-          <p:cNvPr id="7" name="Slide Number Placeholder 6"/>
+          <p:cNvPr id="8" name="Slide Number Placeholder 7"/>
           <p:cNvSpPr>
             <a:spLocks noGrp="1"/>
           </p:cNvSpPr>
@@ -13831,14 +13765,14 @@
             </a:pPr>
             <a:r>
               <a:rPr lang="en-US" smtClean="0"/>
-              <a:t>9-</a:t>
+              <a:t>10-</a:t>
             </a:r>
             <a:fld id="{A739F50A-8F88-4892-87E1-8D1D3A543FFC}" type="slidenum">
               <a:rPr lang="en-US" smtClean="0"/>
               <a:pPr>
                 <a:defRPr/>
               </a:pPr>
-              <a:t>27</a:t>
+              <a:t>26</a:t>
             </a:fld>
             <a:endParaRPr lang="en-US" smtClean="0"/>
           </a:p>
@@ -14105,7 +14039,7 @@
       </p:sp>
       <p:sp>
         <p:nvSpPr>
-          <p:cNvPr id="6" name="Slide Number Placeholder 5"/>
+          <p:cNvPr id="7" name="Slide Number Placeholder 6"/>
           <p:cNvSpPr>
             <a:spLocks noGrp="1"/>
           </p:cNvSpPr>
@@ -14123,14 +14057,14 @@
             </a:pPr>
             <a:r>
               <a:rPr lang="en-US" smtClean="0"/>
-              <a:t>9-</a:t>
+              <a:t>10-</a:t>
             </a:r>
             <a:fld id="{A739F50A-8F88-4892-87E1-8D1D3A543FFC}" type="slidenum">
               <a:rPr lang="en-US" smtClean="0"/>
               <a:pPr>
                 <a:defRPr/>
               </a:pPr>
-              <a:t>28</a:t>
+              <a:t>27</a:t>
             </a:fld>
             <a:endParaRPr lang="en-US" smtClean="0"/>
           </a:p>
@@ -14254,45 +14188,6 @@
           </a:p>
         </p:txBody>
       </p:sp>
-      <p:sp>
-        <p:nvSpPr>
-          <p:cNvPr id="5" name="Slide Number Placeholder 4"/>
-          <p:cNvSpPr>
-            <a:spLocks noGrp="1"/>
-          </p:cNvSpPr>
-          <p:nvPr>
-            <p:ph type="sldNum" sz="quarter" idx="12"/>
-          </p:nvPr>
-        </p:nvSpPr>
-        <p:spPr/>
-        <p:txBody>
-          <a:bodyPr/>
-          <a:lstStyle/>
-          <a:p>
-            <a:pPr>
-              <a:defRPr/>
-            </a:pPr>
-            <a:r>
-              <a:rPr lang="en-US" smtClean="0"/>
-              <a:t>9-</a:t>
-            </a:r>
-            <a:fld id="{A739F50A-8F88-4892-87E1-8D1D3A543FFC}" type="slidenum">
-              <a:rPr lang="en-US" smtClean="0"/>
-              <a:pPr>
-                <a:defRPr/>
-              </a:pPr>
-              <a:t>29</a:t>
-            </a:fld>
-            <a:endParaRPr lang="en-US" smtClean="0"/>
-          </a:p>
-          <a:p>
-            <a:pPr>
-              <a:defRPr/>
-            </a:pPr>
-            <a:endParaRPr lang="en-US" dirty="0"/>
-          </a:p>
-        </p:txBody>
-      </p:sp>
       <p:pic>
         <p:nvPicPr>
           <p:cNvPr id="6" name="Picture 5" descr="web_batch_submit_references.png"/>
@@ -14323,6 +14218,45 @@
           </a:prstGeom>
         </p:spPr>
       </p:pic>
+      <p:sp>
+        <p:nvSpPr>
+          <p:cNvPr id="7" name="Slide Number Placeholder 6"/>
+          <p:cNvSpPr>
+            <a:spLocks noGrp="1"/>
+          </p:cNvSpPr>
+          <p:nvPr>
+            <p:ph type="sldNum" sz="quarter" idx="12"/>
+          </p:nvPr>
+        </p:nvSpPr>
+        <p:spPr/>
+        <p:txBody>
+          <a:bodyPr/>
+          <a:lstStyle/>
+          <a:p>
+            <a:pPr>
+              <a:defRPr/>
+            </a:pPr>
+            <a:r>
+              <a:rPr lang="en-US" smtClean="0"/>
+              <a:t>10-</a:t>
+            </a:r>
+            <a:fld id="{A739F50A-8F88-4892-87E1-8D1D3A543FFC}" type="slidenum">
+              <a:rPr lang="en-US" smtClean="0"/>
+              <a:pPr>
+                <a:defRPr/>
+              </a:pPr>
+              <a:t>28</a:t>
+            </a:fld>
+            <a:endParaRPr lang="en-US" smtClean="0"/>
+          </a:p>
+          <a:p>
+            <a:pPr>
+              <a:defRPr/>
+            </a:pPr>
+            <a:endParaRPr lang="en-US" dirty="0"/>
+          </a:p>
+        </p:txBody>
+      </p:sp>
     </p:spTree>
     <p:extLst>
       <p:ext uri="{BB962C8B-B14F-4D97-AF65-F5344CB8AC3E}">
@@ -14566,7 +14500,7 @@
       </p:sp>
       <p:sp>
         <p:nvSpPr>
-          <p:cNvPr id="7" name="Slide Number Placeholder 6"/>
+          <p:cNvPr id="8" name="Slide Number Placeholder 7"/>
           <p:cNvSpPr>
             <a:spLocks noGrp="1"/>
           </p:cNvSpPr>
@@ -14584,14 +14518,14 @@
             </a:pPr>
             <a:r>
               <a:rPr lang="en-US" smtClean="0"/>
-              <a:t>9-</a:t>
+              <a:t>10-</a:t>
             </a:r>
             <a:fld id="{A739F50A-8F88-4892-87E1-8D1D3A543FFC}" type="slidenum">
               <a:rPr lang="en-US" smtClean="0"/>
               <a:pPr>
                 <a:defRPr/>
               </a:pPr>
-              <a:t>30</a:t>
+              <a:t>29</a:t>
             </a:fld>
             <a:endParaRPr lang="en-US" smtClean="0"/>
           </a:p>
@@ -14739,7 +14673,7 @@
       </p:sp>
       <p:sp>
         <p:nvSpPr>
-          <p:cNvPr id="5" name="Slide Number Placeholder 4"/>
+          <p:cNvPr id="6" name="Slide Number Placeholder 5"/>
           <p:cNvSpPr>
             <a:spLocks noGrp="1"/>
           </p:cNvSpPr>
@@ -14757,14 +14691,14 @@
             </a:pPr>
             <a:r>
               <a:rPr lang="en-US" smtClean="0"/>
-              <a:t>9-</a:t>
+              <a:t>10-</a:t>
             </a:r>
             <a:fld id="{A739F50A-8F88-4892-87E1-8D1D3A543FFC}" type="slidenum">
               <a:rPr lang="en-US" smtClean="0"/>
               <a:pPr>
                 <a:defRPr/>
               </a:pPr>
-              <a:t>4</a:t>
+              <a:t>3</a:t>
             </a:fld>
             <a:endParaRPr lang="en-US" smtClean="0"/>
           </a:p>
@@ -14876,45 +14810,6 @@
           </a:p>
         </p:txBody>
       </p:sp>
-      <p:sp>
-        <p:nvSpPr>
-          <p:cNvPr id="5" name="Slide Number Placeholder 4"/>
-          <p:cNvSpPr>
-            <a:spLocks noGrp="1"/>
-          </p:cNvSpPr>
-          <p:nvPr>
-            <p:ph type="sldNum" sz="quarter" idx="12"/>
-          </p:nvPr>
-        </p:nvSpPr>
-        <p:spPr/>
-        <p:txBody>
-          <a:bodyPr/>
-          <a:lstStyle/>
-          <a:p>
-            <a:pPr>
-              <a:defRPr/>
-            </a:pPr>
-            <a:r>
-              <a:rPr lang="en-US" smtClean="0"/>
-              <a:t>9-</a:t>
-            </a:r>
-            <a:fld id="{A739F50A-8F88-4892-87E1-8D1D3A543FFC}" type="slidenum">
-              <a:rPr lang="en-US" smtClean="0"/>
-              <a:pPr>
-                <a:defRPr/>
-              </a:pPr>
-              <a:t>31</a:t>
-            </a:fld>
-            <a:endParaRPr lang="en-US" smtClean="0"/>
-          </a:p>
-          <a:p>
-            <a:pPr>
-              <a:defRPr/>
-            </a:pPr>
-            <a:endParaRPr lang="en-US" dirty="0"/>
-          </a:p>
-        </p:txBody>
-      </p:sp>
       <p:pic>
         <p:nvPicPr>
           <p:cNvPr id="6" name="Picture 5"/>
@@ -14939,6 +14834,45 @@
           </a:prstGeom>
         </p:spPr>
       </p:pic>
+      <p:sp>
+        <p:nvSpPr>
+          <p:cNvPr id="7" name="Slide Number Placeholder 6"/>
+          <p:cNvSpPr>
+            <a:spLocks noGrp="1"/>
+          </p:cNvSpPr>
+          <p:nvPr>
+            <p:ph type="sldNum" sz="quarter" idx="12"/>
+          </p:nvPr>
+        </p:nvSpPr>
+        <p:spPr/>
+        <p:txBody>
+          <a:bodyPr/>
+          <a:lstStyle/>
+          <a:p>
+            <a:pPr>
+              <a:defRPr/>
+            </a:pPr>
+            <a:r>
+              <a:rPr lang="en-US" smtClean="0"/>
+              <a:t>10-</a:t>
+            </a:r>
+            <a:fld id="{A739F50A-8F88-4892-87E1-8D1D3A543FFC}" type="slidenum">
+              <a:rPr lang="en-US" smtClean="0"/>
+              <a:pPr>
+                <a:defRPr/>
+              </a:pPr>
+              <a:t>30</a:t>
+            </a:fld>
+            <a:endParaRPr lang="en-US" smtClean="0"/>
+          </a:p>
+          <a:p>
+            <a:pPr>
+              <a:defRPr/>
+            </a:pPr>
+            <a:endParaRPr lang="en-US" dirty="0"/>
+          </a:p>
+        </p:txBody>
+      </p:sp>
     </p:spTree>
     <p:extLst>
       <p:ext uri="{BB962C8B-B14F-4D97-AF65-F5344CB8AC3E}">
@@ -15070,7 +15004,7 @@
       </p:sp>
       <p:sp>
         <p:nvSpPr>
-          <p:cNvPr id="6" name="Slide Number Placeholder 5"/>
+          <p:cNvPr id="7" name="Slide Number Placeholder 6"/>
           <p:cNvSpPr>
             <a:spLocks noGrp="1"/>
           </p:cNvSpPr>
@@ -15088,14 +15022,14 @@
             </a:pPr>
             <a:r>
               <a:rPr lang="en-US" smtClean="0"/>
-              <a:t>9-</a:t>
+              <a:t>10-</a:t>
             </a:r>
             <a:fld id="{A739F50A-8F88-4892-87E1-8D1D3A543FFC}" type="slidenum">
               <a:rPr lang="en-US" smtClean="0"/>
               <a:pPr>
                 <a:defRPr/>
               </a:pPr>
-              <a:t>32</a:t>
+              <a:t>31</a:t>
             </a:fld>
             <a:endParaRPr lang="en-US" smtClean="0"/>
           </a:p>
@@ -15238,7 +15172,7 @@
       </p:sp>
       <p:sp>
         <p:nvSpPr>
-          <p:cNvPr id="6" name="Slide Number Placeholder 5"/>
+          <p:cNvPr id="7" name="Slide Number Placeholder 6"/>
           <p:cNvSpPr>
             <a:spLocks noGrp="1"/>
           </p:cNvSpPr>
@@ -15256,14 +15190,14 @@
             </a:pPr>
             <a:r>
               <a:rPr lang="en-US" smtClean="0"/>
-              <a:t>9-</a:t>
+              <a:t>10-</a:t>
             </a:r>
             <a:fld id="{A739F50A-8F88-4892-87E1-8D1D3A543FFC}" type="slidenum">
               <a:rPr lang="en-US" smtClean="0"/>
               <a:pPr>
                 <a:defRPr/>
               </a:pPr>
-              <a:t>33</a:t>
+              <a:t>32</a:t>
             </a:fld>
             <a:endParaRPr lang="en-US" smtClean="0"/>
           </a:p>
@@ -15410,7 +15344,7 @@
       </p:sp>
       <p:sp>
         <p:nvSpPr>
-          <p:cNvPr id="6" name="Slide Number Placeholder 5"/>
+          <p:cNvPr id="7" name="Slide Number Placeholder 6"/>
           <p:cNvSpPr>
             <a:spLocks noGrp="1"/>
           </p:cNvSpPr>
@@ -15428,14 +15362,14 @@
             </a:pPr>
             <a:r>
               <a:rPr lang="en-US" smtClean="0"/>
-              <a:t>9-</a:t>
+              <a:t>10-</a:t>
             </a:r>
             <a:fld id="{A739F50A-8F88-4892-87E1-8D1D3A543FFC}" type="slidenum">
               <a:rPr lang="en-US" smtClean="0"/>
               <a:pPr>
                 <a:defRPr/>
               </a:pPr>
-              <a:t>34</a:t>
+              <a:t>33</a:t>
             </a:fld>
             <a:endParaRPr lang="en-US" smtClean="0"/>
           </a:p>
@@ -15606,7 +15540,7 @@
       </p:sp>
       <p:sp>
         <p:nvSpPr>
-          <p:cNvPr id="6" name="Slide Number Placeholder 5"/>
+          <p:cNvPr id="7" name="Slide Number Placeholder 6"/>
           <p:cNvSpPr>
             <a:spLocks noGrp="1"/>
           </p:cNvSpPr>
@@ -15624,14 +15558,14 @@
             </a:pPr>
             <a:r>
               <a:rPr lang="en-US" smtClean="0"/>
-              <a:t>9-</a:t>
+              <a:t>10-</a:t>
             </a:r>
             <a:fld id="{A739F50A-8F88-4892-87E1-8D1D3A543FFC}" type="slidenum">
               <a:rPr lang="en-US" smtClean="0"/>
               <a:pPr>
                 <a:defRPr/>
               </a:pPr>
-              <a:t>35</a:t>
+              <a:t>34</a:t>
             </a:fld>
             <a:endParaRPr lang="en-US" smtClean="0"/>
           </a:p>
@@ -15757,45 +15691,6 @@
       </p:sp>
       <p:sp>
         <p:nvSpPr>
-          <p:cNvPr id="5" name="Slide Number Placeholder 4"/>
-          <p:cNvSpPr>
-            <a:spLocks noGrp="1"/>
-          </p:cNvSpPr>
-          <p:nvPr>
-            <p:ph type="sldNum" sz="quarter" idx="12"/>
-          </p:nvPr>
-        </p:nvSpPr>
-        <p:spPr/>
-        <p:txBody>
-          <a:bodyPr/>
-          <a:lstStyle/>
-          <a:p>
-            <a:pPr>
-              <a:defRPr/>
-            </a:pPr>
-            <a:r>
-              <a:rPr lang="en-US" smtClean="0"/>
-              <a:t>9-</a:t>
-            </a:r>
-            <a:fld id="{A739F50A-8F88-4892-87E1-8D1D3A543FFC}" type="slidenum">
-              <a:rPr lang="en-US" smtClean="0"/>
-              <a:pPr>
-                <a:defRPr/>
-              </a:pPr>
-              <a:t>36</a:t>
-            </a:fld>
-            <a:endParaRPr lang="en-US" smtClean="0"/>
-          </a:p>
-          <a:p>
-            <a:pPr>
-              <a:defRPr/>
-            </a:pPr>
-            <a:endParaRPr lang="en-US" dirty="0"/>
-          </a:p>
-        </p:txBody>
-      </p:sp>
-      <p:sp>
-        <p:nvSpPr>
           <p:cNvPr id="7" name="Rectangle 2"/>
           <p:cNvSpPr txBox="1">
             <a:spLocks noChangeArrowheads="1"/>
@@ -16426,6 +16321,45 @@
           </a:p>
         </p:txBody>
       </p:sp>
+      <p:sp>
+        <p:nvSpPr>
+          <p:cNvPr id="6" name="Slide Number Placeholder 5"/>
+          <p:cNvSpPr>
+            <a:spLocks noGrp="1"/>
+          </p:cNvSpPr>
+          <p:nvPr>
+            <p:ph type="sldNum" sz="quarter" idx="12"/>
+          </p:nvPr>
+        </p:nvSpPr>
+        <p:spPr/>
+        <p:txBody>
+          <a:bodyPr/>
+          <a:lstStyle/>
+          <a:p>
+            <a:pPr>
+              <a:defRPr/>
+            </a:pPr>
+            <a:r>
+              <a:rPr lang="en-US" smtClean="0"/>
+              <a:t>10-</a:t>
+            </a:r>
+            <a:fld id="{A739F50A-8F88-4892-87E1-8D1D3A543FFC}" type="slidenum">
+              <a:rPr lang="en-US" smtClean="0"/>
+              <a:pPr>
+                <a:defRPr/>
+              </a:pPr>
+              <a:t>35</a:t>
+            </a:fld>
+            <a:endParaRPr lang="en-US" smtClean="0"/>
+          </a:p>
+          <a:p>
+            <a:pPr>
+              <a:defRPr/>
+            </a:pPr>
+            <a:endParaRPr lang="en-US" dirty="0"/>
+          </a:p>
+        </p:txBody>
+      </p:sp>
     </p:spTree>
     <p:extLst>
       <p:ext uri="{BB962C8B-B14F-4D97-AF65-F5344CB8AC3E}">
@@ -16535,45 +16469,6 @@
               <a:rPr lang="en-US" smtClean="0"/>
               <a:t>S&amp;OC DMS System Design Review</a:t>
             </a:r>
-            <a:endParaRPr lang="en-US" dirty="0"/>
-          </a:p>
-        </p:txBody>
-      </p:sp>
-      <p:sp>
-        <p:nvSpPr>
-          <p:cNvPr id="5" name="Slide Number Placeholder 4"/>
-          <p:cNvSpPr>
-            <a:spLocks noGrp="1"/>
-          </p:cNvSpPr>
-          <p:nvPr>
-            <p:ph type="sldNum" sz="quarter" idx="12"/>
-          </p:nvPr>
-        </p:nvSpPr>
-        <p:spPr/>
-        <p:txBody>
-          <a:bodyPr/>
-          <a:lstStyle/>
-          <a:p>
-            <a:pPr>
-              <a:defRPr/>
-            </a:pPr>
-            <a:r>
-              <a:rPr lang="en-US" smtClean="0"/>
-              <a:t>9-</a:t>
-            </a:r>
-            <a:fld id="{A739F50A-8F88-4892-87E1-8D1D3A543FFC}" type="slidenum">
-              <a:rPr lang="en-US" smtClean="0"/>
-              <a:pPr>
-                <a:defRPr/>
-              </a:pPr>
-              <a:t>37</a:t>
-            </a:fld>
-            <a:endParaRPr lang="en-US" smtClean="0"/>
-          </a:p>
-          <a:p>
-            <a:pPr>
-              <a:defRPr/>
-            </a:pPr>
             <a:endParaRPr lang="en-US" dirty="0"/>
           </a:p>
         </p:txBody>
@@ -17355,6 +17250,45 @@
           </a:p>
         </p:txBody>
       </p:sp>
+      <p:sp>
+        <p:nvSpPr>
+          <p:cNvPr id="7" name="Slide Number Placeholder 6"/>
+          <p:cNvSpPr>
+            <a:spLocks noGrp="1"/>
+          </p:cNvSpPr>
+          <p:nvPr>
+            <p:ph type="sldNum" sz="quarter" idx="12"/>
+          </p:nvPr>
+        </p:nvSpPr>
+        <p:spPr/>
+        <p:txBody>
+          <a:bodyPr/>
+          <a:lstStyle/>
+          <a:p>
+            <a:pPr>
+              <a:defRPr/>
+            </a:pPr>
+            <a:r>
+              <a:rPr lang="en-US" smtClean="0"/>
+              <a:t>10-</a:t>
+            </a:r>
+            <a:fld id="{A739F50A-8F88-4892-87E1-8D1D3A543FFC}" type="slidenum">
+              <a:rPr lang="en-US" smtClean="0"/>
+              <a:pPr>
+                <a:defRPr/>
+              </a:pPr>
+              <a:t>36</a:t>
+            </a:fld>
+            <a:endParaRPr lang="en-US" smtClean="0"/>
+          </a:p>
+          <a:p>
+            <a:pPr>
+              <a:defRPr/>
+            </a:pPr>
+            <a:endParaRPr lang="en-US" dirty="0"/>
+          </a:p>
+        </p:txBody>
+      </p:sp>
     </p:spTree>
     <p:extLst>
       <p:ext uri="{BB962C8B-B14F-4D97-AF65-F5344CB8AC3E}">
@@ -17464,45 +17398,6 @@
               <a:rPr lang="en-US" smtClean="0"/>
               <a:t>S&amp;OC DMS System Design Review</a:t>
             </a:r>
-            <a:endParaRPr lang="en-US" dirty="0"/>
-          </a:p>
-        </p:txBody>
-      </p:sp>
-      <p:sp>
-        <p:nvSpPr>
-          <p:cNvPr id="5" name="Slide Number Placeholder 4"/>
-          <p:cNvSpPr>
-            <a:spLocks noGrp="1"/>
-          </p:cNvSpPr>
-          <p:nvPr>
-            <p:ph type="sldNum" sz="quarter" idx="12"/>
-          </p:nvPr>
-        </p:nvSpPr>
-        <p:spPr/>
-        <p:txBody>
-          <a:bodyPr/>
-          <a:lstStyle/>
-          <a:p>
-            <a:pPr>
-              <a:defRPr/>
-            </a:pPr>
-            <a:r>
-              <a:rPr lang="en-US" smtClean="0"/>
-              <a:t>9-</a:t>
-            </a:r>
-            <a:fld id="{A739F50A-8F88-4892-87E1-8D1D3A543FFC}" type="slidenum">
-              <a:rPr lang="en-US" smtClean="0"/>
-              <a:pPr>
-                <a:defRPr/>
-              </a:pPr>
-              <a:t>38</a:t>
-            </a:fld>
-            <a:endParaRPr lang="en-US" smtClean="0"/>
-          </a:p>
-          <a:p>
-            <a:pPr>
-              <a:defRPr/>
-            </a:pPr>
             <a:endParaRPr lang="en-US" dirty="0"/>
           </a:p>
         </p:txBody>
@@ -18363,6 +18258,45 @@
           </a:p>
         </p:txBody>
       </p:sp>
+      <p:sp>
+        <p:nvSpPr>
+          <p:cNvPr id="7" name="Slide Number Placeholder 6"/>
+          <p:cNvSpPr>
+            <a:spLocks noGrp="1"/>
+          </p:cNvSpPr>
+          <p:nvPr>
+            <p:ph type="sldNum" sz="quarter" idx="12"/>
+          </p:nvPr>
+        </p:nvSpPr>
+        <p:spPr/>
+        <p:txBody>
+          <a:bodyPr/>
+          <a:lstStyle/>
+          <a:p>
+            <a:pPr>
+              <a:defRPr/>
+            </a:pPr>
+            <a:r>
+              <a:rPr lang="en-US" smtClean="0"/>
+              <a:t>10-</a:t>
+            </a:r>
+            <a:fld id="{A739F50A-8F88-4892-87E1-8D1D3A543FFC}" type="slidenum">
+              <a:rPr lang="en-US" smtClean="0"/>
+              <a:pPr>
+                <a:defRPr/>
+              </a:pPr>
+              <a:t>37</a:t>
+            </a:fld>
+            <a:endParaRPr lang="en-US" smtClean="0"/>
+          </a:p>
+          <a:p>
+            <a:pPr>
+              <a:defRPr/>
+            </a:pPr>
+            <a:endParaRPr lang="en-US" dirty="0"/>
+          </a:p>
+        </p:txBody>
+      </p:sp>
     </p:spTree>
     <p:extLst>
       <p:ext uri="{BB962C8B-B14F-4D97-AF65-F5344CB8AC3E}">
@@ -18529,12 +18463,8 @@
               <a:defRPr/>
             </a:pPr>
             <a:r>
-              <a:rPr lang="en-US" dirty="0" smtClean="0"/>
-              <a:t>Dec 7-8</a:t>
-            </a:r>
-            <a:r>
               <a:rPr lang="en-US" smtClean="0"/>
-              <a:t>, 2012</a:t>
+              <a:t>Dec 7-8, 2012</a:t>
             </a:r>
             <a:endParaRPr lang="en-US" dirty="0"/>
           </a:p>
@@ -18542,7 +18472,7 @@
       </p:sp>
       <p:sp>
         <p:nvSpPr>
-          <p:cNvPr id="6" name="Slide Number Placeholder 5"/>
+          <p:cNvPr id="7" name="Slide Number Placeholder 6"/>
           <p:cNvSpPr>
             <a:spLocks noGrp="1"/>
           </p:cNvSpPr>
@@ -18560,14 +18490,14 @@
             </a:pPr>
             <a:r>
               <a:rPr lang="en-US" smtClean="0"/>
-              <a:t>9-</a:t>
+              <a:t>10-</a:t>
             </a:r>
             <a:fld id="{A739F50A-8F88-4892-87E1-8D1D3A543FFC}" type="slidenum">
               <a:rPr lang="en-US" smtClean="0"/>
               <a:pPr>
                 <a:defRPr/>
               </a:pPr>
-              <a:t>39</a:t>
+              <a:t>38</a:t>
             </a:fld>
             <a:endParaRPr lang="en-US" smtClean="0"/>
           </a:p>
@@ -18812,7 +18742,7 @@
       </p:sp>
       <p:sp>
         <p:nvSpPr>
-          <p:cNvPr id="6" name="Slide Number Placeholder 5"/>
+          <p:cNvPr id="7" name="Slide Number Placeholder 6"/>
           <p:cNvSpPr>
             <a:spLocks noGrp="1"/>
           </p:cNvSpPr>
@@ -18830,14 +18760,14 @@
             </a:pPr>
             <a:r>
               <a:rPr lang="en-US" smtClean="0"/>
-              <a:t>9-</a:t>
+              <a:t>10-</a:t>
             </a:r>
             <a:fld id="{A739F50A-8F88-4892-87E1-8D1D3A543FFC}" type="slidenum">
               <a:rPr lang="en-US" smtClean="0"/>
               <a:pPr>
                 <a:defRPr/>
               </a:pPr>
-              <a:t>40</a:t>
+              <a:t>39</a:t>
             </a:fld>
             <a:endParaRPr lang="en-US" smtClean="0"/>
           </a:p>
@@ -19170,7 +19100,7 @@
       </p:sp>
       <p:sp>
         <p:nvSpPr>
-          <p:cNvPr id="6" name="Slide Number Placeholder 5"/>
+          <p:cNvPr id="7" name="Slide Number Placeholder 6"/>
           <p:cNvSpPr>
             <a:spLocks noGrp="1"/>
           </p:cNvSpPr>
@@ -19188,14 +19118,14 @@
             </a:pPr>
             <a:r>
               <a:rPr lang="en-US" smtClean="0"/>
-              <a:t>9-</a:t>
+              <a:t>10-</a:t>
             </a:r>
             <a:fld id="{A739F50A-8F88-4892-87E1-8D1D3A543FFC}" type="slidenum">
               <a:rPr lang="en-US" smtClean="0"/>
               <a:pPr>
                 <a:defRPr/>
               </a:pPr>
-              <a:t>5</a:t>
+              <a:t>4</a:t>
             </a:fld>
             <a:endParaRPr lang="en-US" smtClean="0"/>
           </a:p>
@@ -19469,7 +19399,7 @@
       </p:sp>
       <p:sp>
         <p:nvSpPr>
-          <p:cNvPr id="6" name="Slide Number Placeholder 5"/>
+          <p:cNvPr id="7" name="Slide Number Placeholder 6"/>
           <p:cNvSpPr>
             <a:spLocks noGrp="1"/>
           </p:cNvSpPr>
@@ -19487,14 +19417,14 @@
             </a:pPr>
             <a:r>
               <a:rPr lang="en-US" smtClean="0"/>
-              <a:t>9-</a:t>
+              <a:t>10-</a:t>
             </a:r>
             <a:fld id="{A739F50A-8F88-4892-87E1-8D1D3A543FFC}" type="slidenum">
               <a:rPr lang="en-US" smtClean="0"/>
               <a:pPr>
                 <a:defRPr/>
               </a:pPr>
-              <a:t>41</a:t>
+              <a:t>40</a:t>
             </a:fld>
             <a:endParaRPr lang="en-US" smtClean="0"/>
           </a:p>
@@ -19982,7 +19912,7 @@
       </p:sp>
       <p:sp>
         <p:nvSpPr>
-          <p:cNvPr id="6" name="Slide Number Placeholder 5"/>
+          <p:cNvPr id="7" name="Slide Number Placeholder 6"/>
           <p:cNvSpPr>
             <a:spLocks noGrp="1"/>
           </p:cNvSpPr>
@@ -20000,14 +19930,14 @@
             </a:pPr>
             <a:r>
               <a:rPr lang="en-US" smtClean="0"/>
-              <a:t>9-</a:t>
+              <a:t>10-</a:t>
             </a:r>
             <a:fld id="{A739F50A-8F88-4892-87E1-8D1D3A543FFC}" type="slidenum">
               <a:rPr lang="en-US" smtClean="0"/>
               <a:pPr>
                 <a:defRPr/>
               </a:pPr>
-              <a:t>42</a:t>
+              <a:t>41</a:t>
             </a:fld>
             <a:endParaRPr lang="en-US" smtClean="0"/>
           </a:p>
@@ -20583,7 +20513,7 @@
       </p:sp>
       <p:sp>
         <p:nvSpPr>
-          <p:cNvPr id="6" name="Slide Number Placeholder 5"/>
+          <p:cNvPr id="7" name="Slide Number Placeholder 6"/>
           <p:cNvSpPr>
             <a:spLocks noGrp="1"/>
           </p:cNvSpPr>
@@ -20601,14 +20531,14 @@
             </a:pPr>
             <a:r>
               <a:rPr lang="en-US" smtClean="0"/>
-              <a:t>9-</a:t>
+              <a:t>10-</a:t>
             </a:r>
             <a:fld id="{A739F50A-8F88-4892-87E1-8D1D3A543FFC}" type="slidenum">
               <a:rPr lang="en-US" smtClean="0"/>
               <a:pPr>
                 <a:defRPr/>
               </a:pPr>
-              <a:t>43</a:t>
+              <a:t>42</a:t>
             </a:fld>
             <a:endParaRPr lang="en-US" smtClean="0"/>
           </a:p>
@@ -20907,7 +20837,7 @@
       </p:sp>
       <p:sp>
         <p:nvSpPr>
-          <p:cNvPr id="6" name="Slide Number Placeholder 5"/>
+          <p:cNvPr id="7" name="Slide Number Placeholder 6"/>
           <p:cNvSpPr>
             <a:spLocks noGrp="1"/>
           </p:cNvSpPr>
@@ -20925,14 +20855,14 @@
             </a:pPr>
             <a:r>
               <a:rPr lang="en-US" smtClean="0"/>
-              <a:t>9-</a:t>
+              <a:t>10-</a:t>
             </a:r>
             <a:fld id="{A739F50A-8F88-4892-87E1-8D1D3A543FFC}" type="slidenum">
               <a:rPr lang="en-US" smtClean="0"/>
               <a:pPr>
                 <a:defRPr/>
               </a:pPr>
-              <a:t>6</a:t>
+              <a:t>5</a:t>
             </a:fld>
             <a:endParaRPr lang="en-US" smtClean="0"/>
           </a:p>
@@ -23949,7 +23879,7 @@
       </p:sp>
       <p:sp>
         <p:nvSpPr>
-          <p:cNvPr id="10" name="Slide Number Placeholder 9"/>
+          <p:cNvPr id="11" name="Slide Number Placeholder 10"/>
           <p:cNvSpPr>
             <a:spLocks noGrp="1"/>
           </p:cNvSpPr>
@@ -23967,14 +23897,14 @@
             </a:pPr>
             <a:r>
               <a:rPr lang="en-US" smtClean="0"/>
-              <a:t>9-</a:t>
+              <a:t>10-</a:t>
             </a:r>
             <a:fld id="{A739F50A-8F88-4892-87E1-8D1D3A543FFC}" type="slidenum">
               <a:rPr lang="en-US" smtClean="0"/>
               <a:pPr>
                 <a:defRPr/>
               </a:pPr>
-              <a:t>7</a:t>
+              <a:t>6</a:t>
             </a:fld>
             <a:endParaRPr lang="en-US" smtClean="0"/>
           </a:p>
@@ -24646,7 +24576,7 @@
       </p:sp>
       <p:sp>
         <p:nvSpPr>
-          <p:cNvPr id="8" name="Slide Number Placeholder 7"/>
+          <p:cNvPr id="9" name="Slide Number Placeholder 8"/>
           <p:cNvSpPr>
             <a:spLocks noGrp="1"/>
           </p:cNvSpPr>
@@ -24664,14 +24594,14 @@
             </a:pPr>
             <a:r>
               <a:rPr lang="en-US" smtClean="0"/>
-              <a:t>9-</a:t>
+              <a:t>10-</a:t>
             </a:r>
             <a:fld id="{A739F50A-8F88-4892-87E1-8D1D3A543FFC}" type="slidenum">
               <a:rPr lang="en-US" smtClean="0"/>
               <a:pPr>
                 <a:defRPr/>
               </a:pPr>
-              <a:t>8</a:t>
+              <a:t>7</a:t>
             </a:fld>
             <a:endParaRPr lang="en-US" smtClean="0"/>
           </a:p>
@@ -25240,7 +25170,7 @@
       </p:sp>
       <p:sp>
         <p:nvSpPr>
-          <p:cNvPr id="7" name="Slide Number Placeholder 6"/>
+          <p:cNvPr id="8" name="Slide Number Placeholder 7"/>
           <p:cNvSpPr>
             <a:spLocks noGrp="1"/>
           </p:cNvSpPr>
@@ -25258,14 +25188,14 @@
             </a:pPr>
             <a:r>
               <a:rPr lang="en-US" smtClean="0"/>
-              <a:t>9-</a:t>
+              <a:t>10-</a:t>
             </a:r>
             <a:fld id="{A739F50A-8F88-4892-87E1-8D1D3A543FFC}" type="slidenum">
               <a:rPr lang="en-US" smtClean="0"/>
               <a:pPr>
                 <a:defRPr/>
               </a:pPr>
-              <a:t>9</a:t>
+              <a:t>8</a:t>
             </a:fld>
             <a:endParaRPr lang="en-US" smtClean="0"/>
           </a:p>
@@ -25742,7 +25672,7 @@
       </p:sp>
       <p:sp>
         <p:nvSpPr>
-          <p:cNvPr id="7" name="Slide Number Placeholder 6"/>
+          <p:cNvPr id="8" name="Slide Number Placeholder 7"/>
           <p:cNvSpPr>
             <a:spLocks noGrp="1"/>
           </p:cNvSpPr>
@@ -25760,14 +25690,14 @@
             </a:pPr>
             <a:r>
               <a:rPr lang="en-US" smtClean="0"/>
-              <a:t>9-</a:t>
+              <a:t>10-</a:t>
             </a:r>
             <a:fld id="{A739F50A-8F88-4892-87E1-8D1D3A543FFC}" type="slidenum">
               <a:rPr lang="en-US" smtClean="0"/>
               <a:pPr>
                 <a:defRPr/>
               </a:pPr>
-              <a:t>10</a:t>
+              <a:t>9</a:t>
             </a:fld>
             <a:endParaRPr lang="en-US" smtClean="0"/>
           </a:p>

</xml_diff>